<commit_message>
v.1.1 revised to send to usr
</commit_message>
<xml_diff>
--- a/Utility/USR_Test_HW_Support/Documentation/C780_HW_TEST.pptx
+++ b/Utility/USR_Test_HW_Support/Documentation/C780_HW_TEST.pptx
@@ -7,11 +7,12 @@
   <p:sldIdLst>
     <p:sldId id="258" r:id="rId2"/>
     <p:sldId id="259" r:id="rId3"/>
-    <p:sldId id="256" r:id="rId4"/>
-    <p:sldId id="260" r:id="rId5"/>
-    <p:sldId id="261" r:id="rId6"/>
-    <p:sldId id="262" r:id="rId7"/>
-    <p:sldId id="257" r:id="rId8"/>
+    <p:sldId id="263" r:id="rId4"/>
+    <p:sldId id="256" r:id="rId5"/>
+    <p:sldId id="260" r:id="rId6"/>
+    <p:sldId id="261" r:id="rId7"/>
+    <p:sldId id="262" r:id="rId8"/>
+    <p:sldId id="257" r:id="rId9"/>
   </p:sldIdLst>
   <p:sldSz cx="12192000" cy="6858000"/>
   <p:notesSz cx="6797675" cy="9926638"/>
@@ -249,7 +250,7 @@
           <a:p>
             <a:fld id="{31921840-1B76-44BB-98DD-5857A1343252}" type="datetimeFigureOut">
               <a:rPr lang="it-IT" smtClean="0"/>
-              <a:t>30/06/2020</a:t>
+              <a:t>01/07/2020</a:t>
             </a:fld>
             <a:endParaRPr lang="it-IT"/>
           </a:p>
@@ -419,7 +420,7 @@
           <a:p>
             <a:fld id="{31921840-1B76-44BB-98DD-5857A1343252}" type="datetimeFigureOut">
               <a:rPr lang="it-IT" smtClean="0"/>
-              <a:t>30/06/2020</a:t>
+              <a:t>01/07/2020</a:t>
             </a:fld>
             <a:endParaRPr lang="it-IT"/>
           </a:p>
@@ -599,7 +600,7 @@
           <a:p>
             <a:fld id="{31921840-1B76-44BB-98DD-5857A1343252}" type="datetimeFigureOut">
               <a:rPr lang="it-IT" smtClean="0"/>
-              <a:t>30/06/2020</a:t>
+              <a:t>01/07/2020</a:t>
             </a:fld>
             <a:endParaRPr lang="it-IT"/>
           </a:p>
@@ -769,7 +770,7 @@
           <a:p>
             <a:fld id="{31921840-1B76-44BB-98DD-5857A1343252}" type="datetimeFigureOut">
               <a:rPr lang="it-IT" smtClean="0"/>
-              <a:t>30/06/2020</a:t>
+              <a:t>01/07/2020</a:t>
             </a:fld>
             <a:endParaRPr lang="it-IT"/>
           </a:p>
@@ -1015,7 +1016,7 @@
           <a:p>
             <a:fld id="{31921840-1B76-44BB-98DD-5857A1343252}" type="datetimeFigureOut">
               <a:rPr lang="it-IT" smtClean="0"/>
-              <a:t>30/06/2020</a:t>
+              <a:t>01/07/2020</a:t>
             </a:fld>
             <a:endParaRPr lang="it-IT"/>
           </a:p>
@@ -1247,7 +1248,7 @@
           <a:p>
             <a:fld id="{31921840-1B76-44BB-98DD-5857A1343252}" type="datetimeFigureOut">
               <a:rPr lang="it-IT" smtClean="0"/>
-              <a:t>30/06/2020</a:t>
+              <a:t>01/07/2020</a:t>
             </a:fld>
             <a:endParaRPr lang="it-IT"/>
           </a:p>
@@ -1614,7 +1615,7 @@
           <a:p>
             <a:fld id="{31921840-1B76-44BB-98DD-5857A1343252}" type="datetimeFigureOut">
               <a:rPr lang="it-IT" smtClean="0"/>
-              <a:t>30/06/2020</a:t>
+              <a:t>01/07/2020</a:t>
             </a:fld>
             <a:endParaRPr lang="it-IT"/>
           </a:p>
@@ -1732,7 +1733,7 @@
           <a:p>
             <a:fld id="{31921840-1B76-44BB-98DD-5857A1343252}" type="datetimeFigureOut">
               <a:rPr lang="it-IT" smtClean="0"/>
-              <a:t>30/06/2020</a:t>
+              <a:t>01/07/2020</a:t>
             </a:fld>
             <a:endParaRPr lang="it-IT"/>
           </a:p>
@@ -1827,7 +1828,7 @@
           <a:p>
             <a:fld id="{31921840-1B76-44BB-98DD-5857A1343252}" type="datetimeFigureOut">
               <a:rPr lang="it-IT" smtClean="0"/>
-              <a:t>30/06/2020</a:t>
+              <a:t>01/07/2020</a:t>
             </a:fld>
             <a:endParaRPr lang="it-IT"/>
           </a:p>
@@ -2104,7 +2105,7 @@
           <a:p>
             <a:fld id="{31921840-1B76-44BB-98DD-5857A1343252}" type="datetimeFigureOut">
               <a:rPr lang="it-IT" smtClean="0"/>
-              <a:t>30/06/2020</a:t>
+              <a:t>01/07/2020</a:t>
             </a:fld>
             <a:endParaRPr lang="it-IT"/>
           </a:p>
@@ -2357,7 +2358,7 @@
           <a:p>
             <a:fld id="{31921840-1B76-44BB-98DD-5857A1343252}" type="datetimeFigureOut">
               <a:rPr lang="it-IT" smtClean="0"/>
-              <a:t>30/06/2020</a:t>
+              <a:t>01/07/2020</a:t>
             </a:fld>
             <a:endParaRPr lang="it-IT"/>
           </a:p>
@@ -2570,7 +2571,7 @@
           <a:p>
             <a:fld id="{31921840-1B76-44BB-98DD-5857A1343252}" type="datetimeFigureOut">
               <a:rPr lang="it-IT" smtClean="0"/>
-              <a:t>30/06/2020</a:t>
+              <a:t>01/07/2020</a:t>
             </a:fld>
             <a:endParaRPr lang="it-IT"/>
           </a:p>
@@ -3085,7 +3086,15 @@
                   <a:schemeClr val="bg1"/>
                 </a:solidFill>
               </a:rPr>
-              <a:t>V.1.0</a:t>
+              <a:t>V.1.1</a:t>
+            </a:r>
+            <a:r>
+              <a:rPr lang="it-IT" dirty="0" smtClean="0">
+                <a:solidFill>
+                  <a:schemeClr val="bg1"/>
+                </a:solidFill>
+              </a:rPr>
+              <a:t/>
             </a:r>
             <a:br>
               <a:rPr lang="it-IT" dirty="0" smtClean="0">
@@ -3120,6 +3129,13 @@
   <p:clrMapOvr>
     <a:masterClrMapping/>
   </p:clrMapOvr>
+  <p:timing>
+    <p:tnLst>
+      <p:par>
+        <p:cTn id="1" dur="indefinite" restart="never" nodeType="tmRoot"/>
+      </p:par>
+    </p:tnLst>
+  </p:timing>
 </p:sld>
 </file>
 
@@ -3166,6 +3182,10 @@
               <a:rPr lang="it-IT" sz="2400" dirty="0" err="1" smtClean="0"/>
               <a:t>Overview</a:t>
             </a:r>
+            <a:r>
+              <a:rPr lang="it-IT" sz="2400" dirty="0" smtClean="0"/>
+              <a:t> – HW part</a:t>
+            </a:r>
             <a:endParaRPr lang="it-IT" sz="2400" dirty="0"/>
           </a:p>
         </p:txBody>
@@ -3179,7 +3199,7 @@
         <p:spPr>
           <a:xfrm>
             <a:off x="147782" y="748145"/>
-            <a:ext cx="11979563" cy="4801314"/>
+            <a:ext cx="11979563" cy="3970318"/>
           </a:xfrm>
           <a:prstGeom prst="rect">
             <a:avLst/>
@@ -3551,13 +3571,53 @@
             </a:r>
           </a:p>
           <a:p>
-            <a:endParaRPr lang="it-IT" dirty="0" smtClean="0"/>
-          </a:p>
-          <a:p>
             <a:endParaRPr lang="it-IT" dirty="0"/>
           </a:p>
           <a:p>
-            <a:endParaRPr lang="it-IT" dirty="0" smtClean="0"/>
+            <a:r>
+              <a:rPr lang="it-IT" dirty="0" smtClean="0"/>
+              <a:t>The </a:t>
+            </a:r>
+            <a:r>
+              <a:rPr lang="it-IT" dirty="0" err="1" smtClean="0"/>
+              <a:t>system</a:t>
+            </a:r>
+            <a:r>
+              <a:rPr lang="it-IT" dirty="0" smtClean="0"/>
+              <a:t> </a:t>
+            </a:r>
+            <a:r>
+              <a:rPr lang="it-IT" dirty="0" err="1" smtClean="0"/>
+              <a:t>require</a:t>
+            </a:r>
+            <a:r>
+              <a:rPr lang="it-IT" dirty="0" smtClean="0"/>
+              <a:t> a test bed to </a:t>
+            </a:r>
+            <a:r>
+              <a:rPr lang="it-IT" dirty="0" err="1" smtClean="0"/>
+              <a:t>connect</a:t>
+            </a:r>
+            <a:r>
+              <a:rPr lang="it-IT" dirty="0" smtClean="0"/>
+              <a:t> with </a:t>
+            </a:r>
+            <a:r>
+              <a:rPr lang="it-IT" dirty="0" err="1" smtClean="0"/>
+              <a:t>nails</a:t>
+            </a:r>
+            <a:r>
+              <a:rPr lang="it-IT" dirty="0" smtClean="0"/>
+              <a:t> some test </a:t>
+            </a:r>
+            <a:r>
+              <a:rPr lang="it-IT" dirty="0" err="1" smtClean="0"/>
+              <a:t>points</a:t>
+            </a:r>
+            <a:r>
+              <a:rPr lang="it-IT" dirty="0" smtClean="0"/>
+              <a:t> to the test machine.</a:t>
+            </a:r>
           </a:p>
           <a:p>
             <a:r>
@@ -3567,12 +3627,6 @@
             <a:br>
               <a:rPr lang="it-IT" dirty="0" smtClean="0"/>
             </a:br>
-            <a:endParaRPr lang="it-IT" dirty="0"/>
-          </a:p>
-          <a:p>
-            <a:endParaRPr lang="it-IT" dirty="0" smtClean="0"/>
-          </a:p>
-          <a:p>
             <a:endParaRPr lang="it-IT" dirty="0"/>
           </a:p>
         </p:txBody>
@@ -3587,6 +3641,13 @@
   <p:clrMapOvr>
     <a:masterClrMapping/>
   </p:clrMapOvr>
+  <p:timing>
+    <p:tnLst>
+      <p:par>
+        <p:cTn id="1" dur="indefinite" restart="never" nodeType="tmRoot"/>
+      </p:par>
+    </p:tnLst>
+  </p:timing>
 </p:sld>
 </file>
 
@@ -3609,6 +3670,302 @@
       </p:grpSpPr>
       <p:sp>
         <p:nvSpPr>
+          <p:cNvPr id="4" name="CasellaDiTesto 3"/>
+          <p:cNvSpPr txBox="1"/>
+          <p:nvPr/>
+        </p:nvSpPr>
+        <p:spPr>
+          <a:xfrm>
+            <a:off x="147782" y="138545"/>
+            <a:ext cx="11684000" cy="461665"/>
+          </a:xfrm>
+          <a:prstGeom prst="rect">
+            <a:avLst/>
+          </a:prstGeom>
+          <a:noFill/>
+        </p:spPr>
+        <p:txBody>
+          <a:bodyPr wrap="square" rtlCol="0">
+            <a:spAutoFit/>
+          </a:bodyPr>
+          <a:lstStyle/>
+          <a:p>
+            <a:r>
+              <a:rPr lang="it-IT" sz="2400" dirty="0" err="1" smtClean="0"/>
+              <a:t>Overview</a:t>
+            </a:r>
+            <a:r>
+              <a:rPr lang="it-IT" sz="2400" dirty="0" smtClean="0"/>
+              <a:t> – SW part</a:t>
+            </a:r>
+            <a:endParaRPr lang="it-IT" sz="2400" dirty="0"/>
+          </a:p>
+        </p:txBody>
+      </p:sp>
+      <p:sp>
+        <p:nvSpPr>
+          <p:cNvPr id="5" name="CasellaDiTesto 4"/>
+          <p:cNvSpPr txBox="1"/>
+          <p:nvPr/>
+        </p:nvSpPr>
+        <p:spPr>
+          <a:xfrm>
+            <a:off x="147782" y="748145"/>
+            <a:ext cx="11979563" cy="8248412"/>
+          </a:xfrm>
+          <a:prstGeom prst="rect">
+            <a:avLst/>
+          </a:prstGeom>
+          <a:noFill/>
+        </p:spPr>
+        <p:txBody>
+          <a:bodyPr wrap="square" rtlCol="0">
+            <a:spAutoFit/>
+          </a:bodyPr>
+          <a:lstStyle/>
+          <a:p>
+            <a:r>
+              <a:rPr lang="en-US" sz="1600" dirty="0" smtClean="0"/>
+              <a:t>About the SW  to drive the test </a:t>
+            </a:r>
+          </a:p>
+          <a:p>
+            <a:r>
+              <a:rPr lang="en-US" sz="1600" dirty="0" smtClean="0"/>
+              <a:t>- we have made a demo program to perform the </a:t>
+            </a:r>
+            <a:r>
+              <a:rPr lang="en-US" sz="1600" dirty="0" err="1" smtClean="0"/>
+              <a:t>programmation</a:t>
+            </a:r>
+            <a:r>
+              <a:rPr lang="en-US" sz="1600" dirty="0" smtClean="0"/>
+              <a:t> and test of the device, is written in C# to have a simple user interface, some part of test program will be in Python due to the fact that these part are developed by </a:t>
+            </a:r>
+            <a:r>
+              <a:rPr lang="en-US" sz="1600" dirty="0" err="1" smtClean="0"/>
+              <a:t>Espressif</a:t>
+            </a:r>
+            <a:r>
+              <a:rPr lang="en-US" sz="1600" dirty="0" smtClean="0"/>
+              <a:t>.</a:t>
+            </a:r>
+          </a:p>
+          <a:p>
+            <a:endParaRPr lang="en-US" sz="1600" dirty="0" smtClean="0"/>
+          </a:p>
+          <a:p>
+            <a:r>
+              <a:rPr lang="en-US" sz="1600" dirty="0" smtClean="0"/>
+              <a:t>-  Below the documentation of </a:t>
+            </a:r>
+          </a:p>
+          <a:p>
+            <a:r>
+              <a:rPr lang="en-US" sz="1600" dirty="0" smtClean="0"/>
+              <a:t>   1 - the serial protocol used to interact with the HW platform of point 1.   </a:t>
+            </a:r>
+          </a:p>
+          <a:p>
+            <a:r>
+              <a:rPr lang="en-US" sz="1600" dirty="0" smtClean="0"/>
+              <a:t>   2 - documentation about the serial response of the GME in test mode</a:t>
+            </a:r>
+          </a:p>
+          <a:p>
+            <a:r>
+              <a:rPr lang="en-US" sz="1600" dirty="0" smtClean="0"/>
+              <a:t>         </a:t>
+            </a:r>
+            <a:r>
+              <a:rPr lang="en-US" sz="1600" dirty="0" err="1" smtClean="0"/>
+              <a:t>ie</a:t>
+            </a:r>
+            <a:r>
+              <a:rPr lang="en-US" sz="1600" dirty="0" smtClean="0"/>
+              <a:t>. format of the response about MAC address value, connection test etc.</a:t>
+            </a:r>
+          </a:p>
+          <a:p>
+            <a:r>
+              <a:rPr lang="en-US" sz="1600" dirty="0" smtClean="0"/>
+              <a:t>   3 - the test list (under </a:t>
+            </a:r>
+            <a:r>
+              <a:rPr lang="en-US" sz="1600" dirty="0" err="1" smtClean="0"/>
+              <a:t>costruction</a:t>
+            </a:r>
+            <a:r>
+              <a:rPr lang="en-US" sz="1600" dirty="0" smtClean="0"/>
+              <a:t>)</a:t>
+            </a:r>
+            <a:br>
+              <a:rPr lang="en-US" sz="1600" dirty="0" smtClean="0"/>
+            </a:br>
+            <a:endParaRPr lang="en-US" sz="1600" dirty="0" smtClean="0"/>
+          </a:p>
+          <a:p>
+            <a:r>
+              <a:rPr lang="en-US" sz="1600" dirty="0" smtClean="0"/>
+              <a:t>- Some exclusion;</a:t>
+            </a:r>
+          </a:p>
+          <a:p>
+            <a:r>
+              <a:rPr lang="en-US" sz="1600" dirty="0" smtClean="0"/>
+              <a:t>  The test system is not complete because some pieces are impossible to made by CAREL :</a:t>
+            </a:r>
+          </a:p>
+          <a:p>
+            <a:r>
+              <a:rPr lang="en-US" sz="1600" dirty="0" smtClean="0"/>
+              <a:t>   5 - Label print;  the mechanism to print is in charge to USR, in fact depends on printer type,  template definition, </a:t>
+            </a:r>
+            <a:br>
+              <a:rPr lang="en-US" sz="1600" dirty="0" smtClean="0"/>
+            </a:br>
+            <a:r>
+              <a:rPr lang="en-US" sz="1600" dirty="0" smtClean="0"/>
+              <a:t>        and so on.</a:t>
+            </a:r>
+          </a:p>
+          <a:p>
+            <a:r>
+              <a:rPr lang="en-US" sz="1600" dirty="0"/>
+              <a:t> </a:t>
+            </a:r>
+            <a:r>
+              <a:rPr lang="en-US" sz="1600" dirty="0" smtClean="0"/>
+              <a:t>  6 </a:t>
+            </a:r>
+            <a:r>
+              <a:rPr lang="en-US" sz="1600" dirty="0"/>
+              <a:t>- Serial Number;   typically the S/N is retrieved by a call to the factory management system that return the data, </a:t>
+            </a:r>
+          </a:p>
+          <a:p>
+            <a:r>
+              <a:rPr lang="en-US" sz="1600" dirty="0"/>
+              <a:t>   so that, only USR know how it works.  Fortunately this data is present only in the label and not programmed inside </a:t>
+            </a:r>
+            <a:br>
+              <a:rPr lang="en-US" sz="1600" dirty="0"/>
+            </a:br>
+            <a:r>
+              <a:rPr lang="en-US" sz="1600" dirty="0"/>
+              <a:t>   the GME, so is possible to call an external program to retrieve it </a:t>
+            </a:r>
+            <a:r>
+              <a:rPr lang="en-US" sz="1600" dirty="0" smtClean="0"/>
+              <a:t>and print the label.</a:t>
+            </a:r>
+          </a:p>
+          <a:p>
+            <a:r>
+              <a:rPr lang="en-US" sz="1600" dirty="0" smtClean="0"/>
+              <a:t>      </a:t>
+            </a:r>
+          </a:p>
+          <a:p>
+            <a:r>
+              <a:rPr lang="en-US" sz="1600" dirty="0" smtClean="0"/>
+              <a:t>At the end USR have two possibility :</a:t>
+            </a:r>
+          </a:p>
+          <a:p>
+            <a:r>
+              <a:rPr lang="en-US" sz="1600" dirty="0" smtClean="0"/>
+              <a:t>a - read the documentation and implements the test suite with the scripting method they like,</a:t>
+            </a:r>
+          </a:p>
+          <a:p>
+            <a:r>
+              <a:rPr lang="en-US" sz="1600" dirty="0" smtClean="0"/>
+              <a:t>     and use the test demo SW as n implementation reference. </a:t>
+            </a:r>
+          </a:p>
+          <a:p>
+            <a:r>
+              <a:rPr lang="en-US" sz="1600" dirty="0" smtClean="0"/>
+              <a:t>b - complete the CAREL SW with the missing parts of point 5, 6</a:t>
+            </a:r>
+          </a:p>
+          <a:p>
+            <a:r>
+              <a:rPr lang="it-IT" dirty="0"/>
+              <a:t/>
+            </a:r>
+            <a:br>
+              <a:rPr lang="it-IT" dirty="0"/>
+            </a:br>
+            <a:endParaRPr lang="it-IT" dirty="0"/>
+          </a:p>
+          <a:p>
+            <a:endParaRPr lang="it-IT" dirty="0"/>
+          </a:p>
+          <a:p>
+            <a:endParaRPr lang="it-IT" dirty="0"/>
+          </a:p>
+          <a:p>
+            <a:endParaRPr lang="it-IT" dirty="0"/>
+          </a:p>
+          <a:p>
+            <a:r>
+              <a:rPr lang="it-IT" dirty="0"/>
+              <a:t/>
+            </a:r>
+            <a:br>
+              <a:rPr lang="it-IT" dirty="0"/>
+            </a:br>
+            <a:endParaRPr lang="it-IT" dirty="0"/>
+          </a:p>
+          <a:p>
+            <a:endParaRPr lang="it-IT" dirty="0"/>
+          </a:p>
+          <a:p>
+            <a:endParaRPr lang="it-IT" dirty="0"/>
+          </a:p>
+        </p:txBody>
+      </p:sp>
+    </p:spTree>
+    <p:extLst>
+      <p:ext uri="{BB962C8B-B14F-4D97-AF65-F5344CB8AC3E}">
+        <p14:creationId xmlns:p14="http://schemas.microsoft.com/office/powerpoint/2010/main" val="1696587176"/>
+      </p:ext>
+    </p:extLst>
+  </p:cSld>
+  <p:clrMapOvr>
+    <a:masterClrMapping/>
+  </p:clrMapOvr>
+  <p:timing>
+    <p:tnLst>
+      <p:par>
+        <p:cTn id="1" dur="indefinite" restart="never" nodeType="tmRoot"/>
+      </p:par>
+    </p:tnLst>
+  </p:timing>
+</p:sld>
+</file>
+
+<file path=ppt/slides/slide4.xml><?xml version="1.0" encoding="utf-8"?>
+<p:sld xmlns:a="http://schemas.openxmlformats.org/drawingml/2006/main" xmlns:r="http://schemas.openxmlformats.org/officeDocument/2006/relationships" xmlns:p="http://schemas.openxmlformats.org/presentationml/2006/main">
+  <p:cSld>
+    <p:spTree>
+      <p:nvGrpSpPr>
+        <p:cNvPr id="1" name=""/>
+        <p:cNvGrpSpPr/>
+        <p:nvPr/>
+      </p:nvGrpSpPr>
+      <p:grpSpPr>
+        <a:xfrm>
+          <a:off x="0" y="0"/>
+          <a:ext cx="0" cy="0"/>
+          <a:chOff x="0" y="0"/>
+          <a:chExt cx="0" cy="0"/>
+        </a:xfrm>
+      </p:grpSpPr>
+      <p:sp>
+        <p:nvSpPr>
           <p:cNvPr id="4" name="Rettangolo 3"/>
           <p:cNvSpPr/>
           <p:nvPr/>
@@ -5045,11 +5402,7 @@
             </a:r>
             <a:r>
               <a:rPr lang="it-IT" sz="1200" dirty="0" smtClean="0"/>
-              <a:t> </a:t>
-            </a:r>
-            <a:r>
-              <a:rPr lang="it-IT" sz="1200" dirty="0" smtClean="0"/>
-              <a:t>Connector</a:t>
+              <a:t> Connector</a:t>
             </a:r>
             <a:endParaRPr lang="it-IT" sz="1200" dirty="0"/>
           </a:p>
@@ -6317,10 +6670,17 @@
   <p:clrMapOvr>
     <a:masterClrMapping/>
   </p:clrMapOvr>
+  <p:timing>
+    <p:tnLst>
+      <p:par>
+        <p:cTn id="1" dur="indefinite" restart="never" nodeType="tmRoot"/>
+      </p:par>
+    </p:tnLst>
+  </p:timing>
 </p:sld>
 </file>
 
-<file path=ppt/slides/slide4.xml><?xml version="1.0" encoding="utf-8"?>
+<file path=ppt/slides/slide5.xml><?xml version="1.0" encoding="utf-8"?>
 <p:sld xmlns:a="http://schemas.openxmlformats.org/drawingml/2006/main" xmlns:r="http://schemas.openxmlformats.org/officeDocument/2006/relationships" xmlns:p="http://schemas.openxmlformats.org/presentationml/2006/main">
   <p:cSld>
     <p:spTree>
@@ -7434,10 +7794,17 @@
   <p:clrMapOvr>
     <a:masterClrMapping/>
   </p:clrMapOvr>
+  <p:timing>
+    <p:tnLst>
+      <p:par>
+        <p:cTn id="1" dur="indefinite" restart="never" nodeType="tmRoot"/>
+      </p:par>
+    </p:tnLst>
+  </p:timing>
 </p:sld>
 </file>
 
-<file path=ppt/slides/slide5.xml><?xml version="1.0" encoding="utf-8"?>
+<file path=ppt/slides/slide6.xml><?xml version="1.0" encoding="utf-8"?>
 <p:sld xmlns:a="http://schemas.openxmlformats.org/drawingml/2006/main" xmlns:r="http://schemas.openxmlformats.org/officeDocument/2006/relationships" xmlns:p="http://schemas.openxmlformats.org/presentationml/2006/main">
   <p:cSld>
     <p:spTree>
@@ -7694,7 +8061,7 @@
 </p:sld>
 </file>
 
-<file path=ppt/slides/slide6.xml><?xml version="1.0" encoding="utf-8"?>
+<file path=ppt/slides/slide7.xml><?xml version="1.0" encoding="utf-8"?>
 <p:sld xmlns:a="http://schemas.openxmlformats.org/drawingml/2006/main" xmlns:r="http://schemas.openxmlformats.org/officeDocument/2006/relationships" xmlns:p="http://schemas.openxmlformats.org/presentationml/2006/main">
   <p:cSld>
     <p:spTree>
@@ -8111,7 +8478,7 @@
 </p:sld>
 </file>
 
-<file path=ppt/slides/slide7.xml><?xml version="1.0" encoding="utf-8"?>
+<file path=ppt/slides/slide8.xml><?xml version="1.0" encoding="utf-8"?>
 <p:sld xmlns:a="http://schemas.openxmlformats.org/drawingml/2006/main" xmlns:r="http://schemas.openxmlformats.org/officeDocument/2006/relationships" xmlns:p="http://schemas.openxmlformats.org/presentationml/2006/main">
   <p:cSld>
     <p:spTree>
@@ -8137,7 +8504,7 @@
         <p:spPr>
           <a:xfrm>
             <a:off x="161925" y="142875"/>
-            <a:ext cx="11744325" cy="3970318"/>
+            <a:ext cx="11744325" cy="4339650"/>
           </a:xfrm>
           <a:prstGeom prst="rect">
             <a:avLst/>
@@ -8161,6 +8528,14 @@
             <a:r>
               <a:rPr lang="it-IT" sz="2400" dirty="0" smtClean="0"/>
               <a:t>  </a:t>
+            </a:r>
+            <a:r>
+              <a:rPr lang="it-IT" sz="2400" dirty="0" err="1" smtClean="0">
+                <a:solidFill>
+                  <a:srgbClr val="FF0000"/>
+                </a:solidFill>
+              </a:rPr>
+              <a:t>Not</a:t>
             </a:r>
             <a:r>
               <a:rPr lang="it-IT" sz="2400" dirty="0" smtClean="0">
@@ -8168,16 +8543,65 @@
                   <a:srgbClr val="FF0000"/>
                 </a:solidFill>
               </a:rPr>
-              <a:t>DA AGGIORNARE </a:t>
-            </a:r>
-            <a:r>
-              <a:rPr lang="it-IT" sz="1200" dirty="0" smtClean="0"/>
-              <a:t/>
-            </a:r>
-            <a:br>
-              <a:rPr lang="it-IT" sz="1200" dirty="0" smtClean="0"/>
-            </a:br>
-            <a:endParaRPr lang="it-IT" sz="1200" dirty="0" smtClean="0"/>
+              <a:t> </a:t>
+            </a:r>
+            <a:r>
+              <a:rPr lang="it-IT" sz="2400" dirty="0" err="1" smtClean="0">
+                <a:solidFill>
+                  <a:srgbClr val="FF0000"/>
+                </a:solidFill>
+              </a:rPr>
+              <a:t>completed</a:t>
+            </a:r>
+            <a:r>
+              <a:rPr lang="it-IT" sz="2400" dirty="0" smtClean="0"/>
+              <a:t> </a:t>
+            </a:r>
+            <a:r>
+              <a:rPr lang="it-IT" sz="2400" dirty="0" err="1" smtClean="0">
+                <a:solidFill>
+                  <a:srgbClr val="FF0000"/>
+                </a:solidFill>
+              </a:rPr>
+              <a:t>will</a:t>
+            </a:r>
+            <a:r>
+              <a:rPr lang="it-IT" sz="2400" dirty="0" smtClean="0">
+                <a:solidFill>
+                  <a:srgbClr val="FF0000"/>
+                </a:solidFill>
+              </a:rPr>
+              <a:t> update </a:t>
+            </a:r>
+            <a:r>
+              <a:rPr lang="it-IT" sz="2400" dirty="0" err="1" smtClean="0">
+                <a:solidFill>
+                  <a:srgbClr val="FF0000"/>
+                </a:solidFill>
+              </a:rPr>
+              <a:t>at</a:t>
+            </a:r>
+            <a:r>
+              <a:rPr lang="it-IT" sz="2400" dirty="0" smtClean="0">
+                <a:solidFill>
+                  <a:srgbClr val="FF0000"/>
+                </a:solidFill>
+              </a:rPr>
+              <a:t> the end of </a:t>
+            </a:r>
+            <a:r>
+              <a:rPr lang="it-IT" sz="2400" dirty="0" err="1" smtClean="0">
+                <a:solidFill>
+                  <a:srgbClr val="FF0000"/>
+                </a:solidFill>
+              </a:rPr>
+              <a:t>development</a:t>
+            </a:r>
+            <a:endParaRPr lang="it-IT" sz="1200" dirty="0" smtClean="0">
+              <a:solidFill>
+                <a:srgbClr val="FF0000"/>
+              </a:solidFill>
+            </a:endParaRPr>
           </a:p>
           <a:p>
             <a:pPr marL="228600" indent="-228600">
@@ -8234,7 +8658,15 @@
             </a:r>
             <a:r>
               <a:rPr lang="it-IT" sz="1200" dirty="0" smtClean="0"/>
-              <a:t> 1 sec.</a:t>
+              <a:t> </a:t>
+            </a:r>
+            <a:r>
+              <a:rPr lang="it-IT" sz="1200" dirty="0" smtClean="0"/>
+              <a:t>0,5 </a:t>
+            </a:r>
+            <a:r>
+              <a:rPr lang="it-IT" sz="1200" dirty="0" smtClean="0"/>
+              <a:t>sec.</a:t>
             </a:r>
           </a:p>
           <a:p>
@@ -8394,7 +8826,23 @@
             </a:r>
             <a:r>
               <a:rPr lang="it-IT" sz="1200" dirty="0" smtClean="0"/>
-              <a:t> an take a look to the status led, «Press ..»</a:t>
+              <a:t> </a:t>
+            </a:r>
+            <a:r>
+              <a:rPr lang="it-IT" sz="1200" dirty="0" smtClean="0"/>
+              <a:t>on a </a:t>
+            </a:r>
+            <a:r>
+              <a:rPr lang="it-IT" sz="1200" dirty="0" err="1" smtClean="0"/>
+              <a:t>messagebox</a:t>
+            </a:r>
+            <a:r>
+              <a:rPr lang="it-IT" sz="1200" dirty="0" smtClean="0"/>
+              <a:t> an </a:t>
+            </a:r>
+            <a:r>
+              <a:rPr lang="it-IT" sz="1200" dirty="0" smtClean="0"/>
+              <a:t>take a look to the status led, «Press ..»</a:t>
             </a:r>
           </a:p>
           <a:p>
@@ -8411,8 +8859,16 @@
               <a:t>wait</a:t>
             </a:r>
             <a:r>
+              <a:rPr lang="it-IT" sz="1200" smtClean="0"/>
+              <a:t> </a:t>
+            </a:r>
+            <a:r>
+              <a:rPr lang="it-IT" sz="1200" smtClean="0"/>
+              <a:t>0,5 </a:t>
+            </a:r>
+            <a:r>
               <a:rPr lang="it-IT" sz="1200" dirty="0" smtClean="0"/>
-              <a:t> 1 sec. , Open R2 (reset)</a:t>
+              <a:t>sec. , Open R2 (reset)</a:t>
             </a:r>
           </a:p>
           <a:p>
@@ -8454,8 +8910,80 @@
             </a:r>
             <a:r>
               <a:rPr lang="it-IT" sz="1200" dirty="0" smtClean="0"/>
-              <a:t> stop the test</a:t>
-            </a:r>
+              <a:t> stop the </a:t>
+            </a:r>
+            <a:r>
+              <a:rPr lang="it-IT" sz="1200" dirty="0" smtClean="0"/>
+              <a:t>test</a:t>
+            </a:r>
+          </a:p>
+          <a:p>
+            <a:pPr marL="228600" indent="-228600">
+              <a:buFont typeface="+mj-lt"/>
+              <a:buAutoNum type="arabicPeriod"/>
+            </a:pPr>
+            <a:r>
+              <a:rPr lang="it-IT" sz="1200" dirty="0" err="1" smtClean="0"/>
+              <a:t>Retrieve</a:t>
+            </a:r>
+            <a:r>
+              <a:rPr lang="it-IT" sz="1200" dirty="0" smtClean="0"/>
+              <a:t> the MAC </a:t>
+            </a:r>
+            <a:r>
+              <a:rPr lang="it-IT" sz="1200" dirty="0" err="1" smtClean="0"/>
+              <a:t>address</a:t>
+            </a:r>
+            <a:r>
+              <a:rPr lang="it-IT" sz="1200" dirty="0" smtClean="0"/>
+              <a:t> from the </a:t>
+            </a:r>
+            <a:r>
+              <a:rPr lang="it-IT" sz="1200" dirty="0" err="1" smtClean="0"/>
+              <a:t>device</a:t>
+            </a:r>
+            <a:endParaRPr lang="it-IT" sz="1200" dirty="0" smtClean="0"/>
+          </a:p>
+          <a:p>
+            <a:pPr marL="228600" indent="-228600">
+              <a:buFont typeface="+mj-lt"/>
+              <a:buAutoNum type="arabicPeriod"/>
+            </a:pPr>
+            <a:r>
+              <a:rPr lang="it-IT" sz="1200" dirty="0" err="1" smtClean="0"/>
+              <a:t>Check</a:t>
+            </a:r>
+            <a:r>
+              <a:rPr lang="it-IT" sz="1200" dirty="0" smtClean="0"/>
+              <a:t> </a:t>
+            </a:r>
+            <a:r>
+              <a:rPr lang="it-IT" sz="1200" dirty="0" err="1" smtClean="0"/>
+              <a:t>if</a:t>
+            </a:r>
+            <a:r>
+              <a:rPr lang="it-IT" sz="1200" dirty="0" smtClean="0"/>
+              <a:t> the RS485 </a:t>
+            </a:r>
+            <a:r>
+              <a:rPr lang="it-IT" sz="1200" dirty="0" err="1" smtClean="0"/>
+              <a:t>works</a:t>
+            </a:r>
+            <a:r>
+              <a:rPr lang="it-IT" sz="1200" dirty="0" smtClean="0"/>
+              <a:t> </a:t>
+            </a:r>
+          </a:p>
+          <a:p>
+            <a:pPr marL="228600" indent="-228600">
+              <a:buFont typeface="+mj-lt"/>
+              <a:buAutoNum type="arabicPeriod"/>
+            </a:pPr>
+            <a:r>
+              <a:rPr lang="it-IT" sz="1200" dirty="0" smtClean="0"/>
+              <a:t>End of test </a:t>
+            </a:r>
+            <a:endParaRPr lang="it-IT" sz="1200" dirty="0" smtClean="0"/>
           </a:p>
           <a:p>
             <a:pPr marL="228600" indent="-228600">

</xml_diff>

<commit_message>
Intermediate version added support for MB simulator
</commit_message>
<xml_diff>
--- a/Utility/USR_Test_HW_Support/Documentation/C780_HW_TEST.pptx
+++ b/Utility/USR_Test_HW_Support/Documentation/C780_HW_TEST.pptx
@@ -13,6 +13,7 @@
     <p:sldId id="261" r:id="rId7"/>
     <p:sldId id="262" r:id="rId8"/>
     <p:sldId id="257" r:id="rId9"/>
+    <p:sldId id="264" r:id="rId10"/>
   </p:sldIdLst>
   <p:sldSz cx="12192000" cy="6858000"/>
   <p:notesSz cx="6797675" cy="9926638"/>
@@ -3087,14 +3088,6 @@
                 </a:solidFill>
               </a:rPr>
               <a:t>V.1.1</a:t>
-            </a:r>
-            <a:r>
-              <a:rPr lang="it-IT" dirty="0" smtClean="0">
-                <a:solidFill>
-                  <a:schemeClr val="bg1"/>
-                </a:solidFill>
-              </a:rPr>
-              <a:t/>
             </a:r>
             <a:br>
               <a:rPr lang="it-IT" dirty="0" smtClean="0">
@@ -8658,15 +8651,7 @@
             </a:r>
             <a:r>
               <a:rPr lang="it-IT" sz="1200" dirty="0" smtClean="0"/>
-              <a:t> </a:t>
-            </a:r>
-            <a:r>
-              <a:rPr lang="it-IT" sz="1200" dirty="0" smtClean="0"/>
-              <a:t>0,5 </a:t>
-            </a:r>
-            <a:r>
-              <a:rPr lang="it-IT" sz="1200" dirty="0" smtClean="0"/>
-              <a:t>sec.</a:t>
+              <a:t> 0,5 sec.</a:t>
             </a:r>
           </a:p>
           <a:p>
@@ -8826,11 +8811,7 @@
             </a:r>
             <a:r>
               <a:rPr lang="it-IT" sz="1200" dirty="0" smtClean="0"/>
-              <a:t> </a:t>
-            </a:r>
-            <a:r>
-              <a:rPr lang="it-IT" sz="1200" dirty="0" smtClean="0"/>
-              <a:t>on a </a:t>
+              <a:t> on a </a:t>
             </a:r>
             <a:r>
               <a:rPr lang="it-IT" sz="1200" dirty="0" err="1" smtClean="0"/>
@@ -8838,11 +8819,7 @@
             </a:r>
             <a:r>
               <a:rPr lang="it-IT" sz="1200" dirty="0" smtClean="0"/>
-              <a:t> an </a:t>
-            </a:r>
-            <a:r>
-              <a:rPr lang="it-IT" sz="1200" dirty="0" smtClean="0"/>
-              <a:t>take a look to the status led, «Press ..»</a:t>
+              <a:t> an take a look to the status led, «Press ..»</a:t>
             </a:r>
           </a:p>
           <a:p>
@@ -8860,11 +8837,7 @@
             </a:r>
             <a:r>
               <a:rPr lang="it-IT" sz="1200" smtClean="0"/>
-              <a:t> </a:t>
-            </a:r>
-            <a:r>
-              <a:rPr lang="it-IT" sz="1200" smtClean="0"/>
-              <a:t>0,5 </a:t>
+              <a:t> 0,5 </a:t>
             </a:r>
             <a:r>
               <a:rPr lang="it-IT" sz="1200" dirty="0" smtClean="0"/>
@@ -8910,11 +8883,7 @@
             </a:r>
             <a:r>
               <a:rPr lang="it-IT" sz="1200" dirty="0" smtClean="0"/>
-              <a:t> stop the </a:t>
-            </a:r>
-            <a:r>
-              <a:rPr lang="it-IT" sz="1200" dirty="0" smtClean="0"/>
-              <a:t>test</a:t>
+              <a:t> stop the test</a:t>
             </a:r>
           </a:p>
           <a:p>
@@ -8983,7 +8952,6 @@
               <a:rPr lang="it-IT" sz="1200" dirty="0" smtClean="0"/>
               <a:t>End of test </a:t>
             </a:r>
-            <a:endParaRPr lang="it-IT" sz="1200" dirty="0" smtClean="0"/>
           </a:p>
           <a:p>
             <a:pPr marL="228600" indent="-228600">
@@ -9026,6 +8994,302 @@
     <p:extLst>
       <p:ext uri="{BB962C8B-B14F-4D97-AF65-F5344CB8AC3E}">
         <p14:creationId xmlns:p14="http://schemas.microsoft.com/office/powerpoint/2010/main" val="4078384206"/>
+      </p:ext>
+    </p:extLst>
+  </p:cSld>
+  <p:clrMapOvr>
+    <a:masterClrMapping/>
+  </p:clrMapOvr>
+</p:sld>
+</file>
+
+<file path=ppt/slides/slide9.xml><?xml version="1.0" encoding="utf-8"?>
+<p:sld xmlns:a="http://schemas.openxmlformats.org/drawingml/2006/main" xmlns:r="http://schemas.openxmlformats.org/officeDocument/2006/relationships" xmlns:p="http://schemas.openxmlformats.org/presentationml/2006/main">
+  <p:cSld>
+    <p:spTree>
+      <p:nvGrpSpPr>
+        <p:cNvPr id="1" name=""/>
+        <p:cNvGrpSpPr/>
+        <p:nvPr/>
+      </p:nvGrpSpPr>
+      <p:grpSpPr>
+        <a:xfrm>
+          <a:off x="0" y="0"/>
+          <a:ext cx="0" cy="0"/>
+          <a:chOff x="0" y="0"/>
+          <a:chExt cx="0" cy="0"/>
+        </a:xfrm>
+      </p:grpSpPr>
+      <p:sp>
+        <p:nvSpPr>
+          <p:cNvPr id="4" name="CasellaDiTesto 3"/>
+          <p:cNvSpPr txBox="1"/>
+          <p:nvPr/>
+        </p:nvSpPr>
+        <p:spPr>
+          <a:xfrm>
+            <a:off x="175491" y="147782"/>
+            <a:ext cx="11914909" cy="369332"/>
+          </a:xfrm>
+          <a:prstGeom prst="rect">
+            <a:avLst/>
+          </a:prstGeom>
+          <a:noFill/>
+        </p:spPr>
+        <p:txBody>
+          <a:bodyPr wrap="square" rtlCol="0">
+            <a:spAutoFit/>
+          </a:bodyPr>
+          <a:lstStyle/>
+          <a:p>
+            <a:r>
+              <a:rPr lang="it-IT" dirty="0" smtClean="0"/>
+              <a:t>SW </a:t>
+            </a:r>
+            <a:r>
+              <a:rPr lang="it-IT" dirty="0" err="1" smtClean="0"/>
+              <a:t>Prerequisite</a:t>
+            </a:r>
+            <a:endParaRPr lang="it-IT" dirty="0"/>
+          </a:p>
+        </p:txBody>
+      </p:sp>
+      <p:sp>
+        <p:nvSpPr>
+          <p:cNvPr id="5" name="CasellaDiTesto 4"/>
+          <p:cNvSpPr txBox="1"/>
+          <p:nvPr/>
+        </p:nvSpPr>
+        <p:spPr>
+          <a:xfrm>
+            <a:off x="175491" y="600364"/>
+            <a:ext cx="11914909" cy="3539430"/>
+          </a:xfrm>
+          <a:prstGeom prst="rect">
+            <a:avLst/>
+          </a:prstGeom>
+          <a:noFill/>
+        </p:spPr>
+        <p:txBody>
+          <a:bodyPr wrap="square" rtlCol="0">
+            <a:spAutoFit/>
+          </a:bodyPr>
+          <a:lstStyle/>
+          <a:p>
+            <a:r>
+              <a:rPr lang="it-IT" sz="1600" dirty="0" smtClean="0"/>
+              <a:t>In </a:t>
+            </a:r>
+            <a:r>
+              <a:rPr lang="it-IT" sz="1600" dirty="0" err="1" smtClean="0"/>
+              <a:t>order</a:t>
+            </a:r>
+            <a:r>
+              <a:rPr lang="it-IT" sz="1600" dirty="0" smtClean="0"/>
+              <a:t> to </a:t>
+            </a:r>
+            <a:r>
+              <a:rPr lang="it-IT" sz="1600" dirty="0" err="1" smtClean="0"/>
+              <a:t>run</a:t>
+            </a:r>
+            <a:r>
+              <a:rPr lang="it-IT" sz="1600" dirty="0" smtClean="0"/>
+              <a:t> the SW the </a:t>
+            </a:r>
+            <a:r>
+              <a:rPr lang="it-IT" sz="1600" dirty="0" err="1" smtClean="0"/>
+              <a:t>following</a:t>
+            </a:r>
+            <a:r>
+              <a:rPr lang="it-IT" sz="1600" dirty="0" smtClean="0"/>
+              <a:t> </a:t>
+            </a:r>
+            <a:r>
+              <a:rPr lang="it-IT" sz="1600" dirty="0" err="1" smtClean="0"/>
+              <a:t>prerequisite</a:t>
+            </a:r>
+            <a:r>
+              <a:rPr lang="it-IT" sz="1600" dirty="0" smtClean="0"/>
+              <a:t> are </a:t>
+            </a:r>
+            <a:r>
+              <a:rPr lang="it-IT" sz="1600" dirty="0" err="1" smtClean="0"/>
+              <a:t>needed</a:t>
+            </a:r>
+            <a:endParaRPr lang="it-IT" sz="1600" dirty="0" smtClean="0"/>
+          </a:p>
+          <a:p>
+            <a:endParaRPr lang="it-IT" sz="1600" dirty="0" smtClean="0"/>
+          </a:p>
+          <a:p>
+            <a:r>
+              <a:rPr lang="it-IT" sz="1600" dirty="0" err="1" smtClean="0"/>
+              <a:t>Modbus_PC_Simulator</a:t>
+            </a:r>
+            <a:endParaRPr lang="it-IT" sz="1600" dirty="0" smtClean="0"/>
+          </a:p>
+          <a:p>
+            <a:r>
+              <a:rPr lang="it-IT" sz="1600" dirty="0" smtClean="0"/>
+              <a:t>- </a:t>
+            </a:r>
+            <a:r>
+              <a:rPr lang="it-IT" sz="1600" dirty="0" err="1" smtClean="0"/>
+              <a:t>Python</a:t>
+            </a:r>
+            <a:r>
+              <a:rPr lang="it-IT" sz="1600" dirty="0" smtClean="0"/>
+              <a:t> V.2.7.x</a:t>
+            </a:r>
+          </a:p>
+          <a:p>
+            <a:r>
+              <a:rPr lang="it-IT" sz="1600" dirty="0" smtClean="0"/>
+              <a:t>- </a:t>
+            </a:r>
+            <a:r>
+              <a:rPr lang="it-IT" sz="1600" dirty="0" err="1" smtClean="0"/>
+              <a:t>pymodbus</a:t>
+            </a:r>
+            <a:r>
+              <a:rPr lang="it-IT" sz="1600" dirty="0" smtClean="0"/>
+              <a:t> (</a:t>
+            </a:r>
+            <a:r>
+              <a:rPr lang="it-IT" sz="1600" dirty="0" smtClean="0">
+                <a:hlinkClick r:id="rId2"/>
+              </a:rPr>
+              <a:t>https</a:t>
+            </a:r>
+            <a:r>
+              <a:rPr lang="it-IT" sz="1600" dirty="0">
+                <a:hlinkClick r:id="rId2"/>
+              </a:rPr>
+              <a:t>://</a:t>
+            </a:r>
+            <a:r>
+              <a:rPr lang="it-IT" sz="1600" dirty="0" smtClean="0">
+                <a:hlinkClick r:id="rId2"/>
+              </a:rPr>
+              <a:t>pymodbus.readthedocs.io/en/latest/readme.html#installing</a:t>
+            </a:r>
+            <a:r>
+              <a:rPr lang="it-IT" sz="1600" dirty="0" smtClean="0"/>
+              <a:t>)</a:t>
+            </a:r>
+          </a:p>
+          <a:p>
+            <a:r>
+              <a:rPr lang="it-IT" sz="1600" dirty="0" smtClean="0"/>
+              <a:t>- </a:t>
+            </a:r>
+            <a:r>
+              <a:rPr lang="it-IT" sz="1600" dirty="0" err="1" smtClean="0"/>
+              <a:t>pyserial</a:t>
+            </a:r>
+            <a:r>
+              <a:rPr lang="it-IT" sz="1600" dirty="0" smtClean="0"/>
+              <a:t> </a:t>
+            </a:r>
+            <a:r>
+              <a:rPr lang="it-IT" sz="1600" dirty="0"/>
+              <a:t>(</a:t>
+            </a:r>
+            <a:r>
+              <a:rPr lang="it-IT" sz="1600" dirty="0">
+                <a:hlinkClick r:id="rId3"/>
+              </a:rPr>
+              <a:t>https://pypi.org/project/pyserial</a:t>
+            </a:r>
+            <a:r>
+              <a:rPr lang="it-IT" sz="1600" dirty="0" smtClean="0">
+                <a:hlinkClick r:id="rId3"/>
+              </a:rPr>
+              <a:t>/</a:t>
+            </a:r>
+            <a:r>
+              <a:rPr lang="it-IT" sz="1600" dirty="0" smtClean="0"/>
+              <a:t>)</a:t>
+            </a:r>
+          </a:p>
+          <a:p>
+            <a:endParaRPr lang="it-IT" sz="1600" dirty="0" smtClean="0"/>
+          </a:p>
+          <a:p>
+            <a:r>
+              <a:rPr lang="it-IT" sz="1600" dirty="0" err="1" smtClean="0"/>
+              <a:t>CAREL_GME_Test</a:t>
+            </a:r>
+            <a:endParaRPr lang="it-IT" sz="1600" dirty="0" smtClean="0"/>
+          </a:p>
+          <a:p>
+            <a:r>
+              <a:rPr lang="it-IT" sz="1600" dirty="0" smtClean="0"/>
+              <a:t>- </a:t>
+            </a:r>
+            <a:r>
+              <a:rPr lang="it-IT" sz="1600" dirty="0" err="1" smtClean="0"/>
+              <a:t>Launch</a:t>
+            </a:r>
+            <a:r>
+              <a:rPr lang="it-IT" sz="1600" dirty="0" smtClean="0"/>
+              <a:t> the </a:t>
+            </a:r>
+            <a:r>
+              <a:rPr lang="it-IT" sz="1600" dirty="0" err="1" smtClean="0"/>
+              <a:t>program</a:t>
+            </a:r>
+            <a:r>
+              <a:rPr lang="it-IT" sz="1600" dirty="0" smtClean="0"/>
+              <a:t> and download and </a:t>
+            </a:r>
+            <a:r>
+              <a:rPr lang="it-IT" sz="1600" smtClean="0"/>
+              <a:t>install</a:t>
+            </a:r>
+            <a:r>
+              <a:rPr lang="it-IT" sz="1600" dirty="0" smtClean="0"/>
+              <a:t> the .NET </a:t>
+            </a:r>
+            <a:r>
+              <a:rPr lang="it-IT" sz="1600" dirty="0" err="1" smtClean="0"/>
+              <a:t>Framwork</a:t>
+            </a:r>
+            <a:r>
+              <a:rPr lang="it-IT" sz="1600" dirty="0" smtClean="0"/>
+              <a:t> </a:t>
+            </a:r>
+            <a:r>
+              <a:rPr lang="it-IT" sz="1600" dirty="0" err="1" smtClean="0"/>
+              <a:t>requested</a:t>
+            </a:r>
+            <a:r>
+              <a:rPr lang="it-IT" sz="1600" dirty="0" smtClean="0"/>
+              <a:t> </a:t>
+            </a:r>
+            <a:endParaRPr lang="it-IT" sz="1600" dirty="0"/>
+          </a:p>
+          <a:p>
+            <a:endParaRPr lang="it-IT" sz="1600" dirty="0"/>
+          </a:p>
+          <a:p>
+            <a:endParaRPr lang="it-IT" sz="1600" dirty="0" smtClean="0"/>
+          </a:p>
+          <a:p>
+            <a:endParaRPr lang="it-IT" sz="1600" dirty="0"/>
+          </a:p>
+          <a:p>
+            <a:endParaRPr lang="it-IT" sz="1600" dirty="0" smtClean="0"/>
+          </a:p>
+          <a:p>
+            <a:endParaRPr lang="it-IT" sz="1600" dirty="0"/>
+          </a:p>
+        </p:txBody>
+      </p:sp>
+    </p:spTree>
+    <p:extLst>
+      <p:ext uri="{BB962C8B-B14F-4D97-AF65-F5344CB8AC3E}">
+        <p14:creationId xmlns:p14="http://schemas.microsoft.com/office/powerpoint/2010/main" val="3272224210"/>
       </p:ext>
     </p:extLst>
   </p:cSld>

</xml_diff>

<commit_message>
update the documentation and added comments to the .ini file
</commit_message>
<xml_diff>
--- a/Utility/USR_Test_HW_Support/Documentation/C780_HW_TEST.pptx
+++ b/Utility/USR_Test_HW_Support/Documentation/C780_HW_TEST.pptx
@@ -14,6 +14,7 @@
     <p:sldId id="262" r:id="rId8"/>
     <p:sldId id="257" r:id="rId9"/>
     <p:sldId id="264" r:id="rId10"/>
+    <p:sldId id="265" r:id="rId11"/>
   </p:sldIdLst>
   <p:sldSz cx="12192000" cy="6858000"/>
   <p:notesSz cx="6797675" cy="9926638"/>
@@ -251,7 +252,7 @@
           <a:p>
             <a:fld id="{31921840-1B76-44BB-98DD-5857A1343252}" type="datetimeFigureOut">
               <a:rPr lang="it-IT" smtClean="0"/>
-              <a:t>01/07/2020</a:t>
+              <a:t>02/07/2020</a:t>
             </a:fld>
             <a:endParaRPr lang="it-IT"/>
           </a:p>
@@ -421,7 +422,7 @@
           <a:p>
             <a:fld id="{31921840-1B76-44BB-98DD-5857A1343252}" type="datetimeFigureOut">
               <a:rPr lang="it-IT" smtClean="0"/>
-              <a:t>01/07/2020</a:t>
+              <a:t>02/07/2020</a:t>
             </a:fld>
             <a:endParaRPr lang="it-IT"/>
           </a:p>
@@ -601,7 +602,7 @@
           <a:p>
             <a:fld id="{31921840-1B76-44BB-98DD-5857A1343252}" type="datetimeFigureOut">
               <a:rPr lang="it-IT" smtClean="0"/>
-              <a:t>01/07/2020</a:t>
+              <a:t>02/07/2020</a:t>
             </a:fld>
             <a:endParaRPr lang="it-IT"/>
           </a:p>
@@ -771,7 +772,7 @@
           <a:p>
             <a:fld id="{31921840-1B76-44BB-98DD-5857A1343252}" type="datetimeFigureOut">
               <a:rPr lang="it-IT" smtClean="0"/>
-              <a:t>01/07/2020</a:t>
+              <a:t>02/07/2020</a:t>
             </a:fld>
             <a:endParaRPr lang="it-IT"/>
           </a:p>
@@ -1017,7 +1018,7 @@
           <a:p>
             <a:fld id="{31921840-1B76-44BB-98DD-5857A1343252}" type="datetimeFigureOut">
               <a:rPr lang="it-IT" smtClean="0"/>
-              <a:t>01/07/2020</a:t>
+              <a:t>02/07/2020</a:t>
             </a:fld>
             <a:endParaRPr lang="it-IT"/>
           </a:p>
@@ -1249,7 +1250,7 @@
           <a:p>
             <a:fld id="{31921840-1B76-44BB-98DD-5857A1343252}" type="datetimeFigureOut">
               <a:rPr lang="it-IT" smtClean="0"/>
-              <a:t>01/07/2020</a:t>
+              <a:t>02/07/2020</a:t>
             </a:fld>
             <a:endParaRPr lang="it-IT"/>
           </a:p>
@@ -1616,7 +1617,7 @@
           <a:p>
             <a:fld id="{31921840-1B76-44BB-98DD-5857A1343252}" type="datetimeFigureOut">
               <a:rPr lang="it-IT" smtClean="0"/>
-              <a:t>01/07/2020</a:t>
+              <a:t>02/07/2020</a:t>
             </a:fld>
             <a:endParaRPr lang="it-IT"/>
           </a:p>
@@ -1734,7 +1735,7 @@
           <a:p>
             <a:fld id="{31921840-1B76-44BB-98DD-5857A1343252}" type="datetimeFigureOut">
               <a:rPr lang="it-IT" smtClean="0"/>
-              <a:t>01/07/2020</a:t>
+              <a:t>02/07/2020</a:t>
             </a:fld>
             <a:endParaRPr lang="it-IT"/>
           </a:p>
@@ -1829,7 +1830,7 @@
           <a:p>
             <a:fld id="{31921840-1B76-44BB-98DD-5857A1343252}" type="datetimeFigureOut">
               <a:rPr lang="it-IT" smtClean="0"/>
-              <a:t>01/07/2020</a:t>
+              <a:t>02/07/2020</a:t>
             </a:fld>
             <a:endParaRPr lang="it-IT"/>
           </a:p>
@@ -2106,7 +2107,7 @@
           <a:p>
             <a:fld id="{31921840-1B76-44BB-98DD-5857A1343252}" type="datetimeFigureOut">
               <a:rPr lang="it-IT" smtClean="0"/>
-              <a:t>01/07/2020</a:t>
+              <a:t>02/07/2020</a:t>
             </a:fld>
             <a:endParaRPr lang="it-IT"/>
           </a:p>
@@ -2359,7 +2360,7 @@
           <a:p>
             <a:fld id="{31921840-1B76-44BB-98DD-5857A1343252}" type="datetimeFigureOut">
               <a:rPr lang="it-IT" smtClean="0"/>
-              <a:t>01/07/2020</a:t>
+              <a:t>02/07/2020</a:t>
             </a:fld>
             <a:endParaRPr lang="it-IT"/>
           </a:p>
@@ -2572,7 +2573,7 @@
           <a:p>
             <a:fld id="{31921840-1B76-44BB-98DD-5857A1343252}" type="datetimeFigureOut">
               <a:rPr lang="it-IT" smtClean="0"/>
-              <a:t>01/07/2020</a:t>
+              <a:t>02/07/2020</a:t>
             </a:fld>
             <a:endParaRPr lang="it-IT"/>
           </a:p>
@@ -3082,27 +3083,35 @@
           <a:lstStyle/>
           <a:p>
             <a:r>
-              <a:rPr lang="it-IT" dirty="0" smtClean="0">
+              <a:rPr lang="it-IT" smtClean="0">
                 <a:solidFill>
                   <a:schemeClr val="bg1"/>
                 </a:solidFill>
               </a:rPr>
-              <a:t>V.1.1</a:t>
+              <a:t>V.1.2</a:t>
+            </a:r>
+            <a:r>
+              <a:rPr lang="it-IT" smtClean="0">
+                <a:solidFill>
+                  <a:schemeClr val="bg1"/>
+                </a:solidFill>
+              </a:rPr>
+              <a:t/>
             </a:r>
             <a:br>
-              <a:rPr lang="it-IT" dirty="0" smtClean="0">
+              <a:rPr lang="it-IT" smtClean="0">
                 <a:solidFill>
                   <a:schemeClr val="bg1"/>
                 </a:solidFill>
               </a:rPr>
             </a:br>
             <a:r>
-              <a:rPr lang="it-IT" dirty="0" smtClean="0">
+              <a:rPr lang="it-IT" smtClean="0">
                 <a:solidFill>
                   <a:schemeClr val="bg1"/>
                 </a:solidFill>
               </a:rPr>
-              <a:t>30/06/2020</a:t>
+              <a:t>02/07/2020</a:t>
             </a:r>
             <a:endParaRPr lang="it-IT" dirty="0">
               <a:solidFill>
@@ -3132,6 +3141,507 @@
 </p:sld>
 </file>
 
+<file path=ppt/slides/slide10.xml><?xml version="1.0" encoding="utf-8"?>
+<p:sld xmlns:a="http://schemas.openxmlformats.org/drawingml/2006/main" xmlns:r="http://schemas.openxmlformats.org/officeDocument/2006/relationships" xmlns:p="http://schemas.openxmlformats.org/presentationml/2006/main">
+  <p:cSld>
+    <p:spTree>
+      <p:nvGrpSpPr>
+        <p:cNvPr id="1" name=""/>
+        <p:cNvGrpSpPr/>
+        <p:nvPr/>
+      </p:nvGrpSpPr>
+      <p:grpSpPr>
+        <a:xfrm>
+          <a:off x="0" y="0"/>
+          <a:ext cx="0" cy="0"/>
+          <a:chOff x="0" y="0"/>
+          <a:chExt cx="0" cy="0"/>
+        </a:xfrm>
+      </p:grpSpPr>
+      <p:sp>
+        <p:nvSpPr>
+          <p:cNvPr id="4" name="CasellaDiTesto 3"/>
+          <p:cNvSpPr txBox="1"/>
+          <p:nvPr/>
+        </p:nvSpPr>
+        <p:spPr>
+          <a:xfrm>
+            <a:off x="175491" y="147782"/>
+            <a:ext cx="11914909" cy="369332"/>
+          </a:xfrm>
+          <a:prstGeom prst="rect">
+            <a:avLst/>
+          </a:prstGeom>
+          <a:noFill/>
+        </p:spPr>
+        <p:txBody>
+          <a:bodyPr wrap="square" rtlCol="0">
+            <a:spAutoFit/>
+          </a:bodyPr>
+          <a:lstStyle/>
+          <a:p>
+            <a:r>
+              <a:rPr lang="it-IT" dirty="0" smtClean="0"/>
+              <a:t>SW </a:t>
+            </a:r>
+            <a:r>
+              <a:rPr lang="it-IT" dirty="0" err="1" smtClean="0"/>
+              <a:t>Pre</a:t>
+            </a:r>
+            <a:r>
+              <a:rPr lang="it-IT" dirty="0" smtClean="0"/>
+              <a:t>-requisite</a:t>
+            </a:r>
+            <a:endParaRPr lang="it-IT" dirty="0"/>
+          </a:p>
+        </p:txBody>
+      </p:sp>
+      <p:sp>
+        <p:nvSpPr>
+          <p:cNvPr id="5" name="CasellaDiTesto 4"/>
+          <p:cNvSpPr txBox="1"/>
+          <p:nvPr/>
+        </p:nvSpPr>
+        <p:spPr>
+          <a:xfrm>
+            <a:off x="175491" y="600364"/>
+            <a:ext cx="11914909" cy="4770537"/>
+          </a:xfrm>
+          <a:prstGeom prst="rect">
+            <a:avLst/>
+          </a:prstGeom>
+          <a:noFill/>
+        </p:spPr>
+        <p:txBody>
+          <a:bodyPr wrap="square" rtlCol="0">
+            <a:spAutoFit/>
+          </a:bodyPr>
+          <a:lstStyle/>
+          <a:p>
+            <a:r>
+              <a:rPr lang="it-IT" sz="1600" dirty="0" smtClean="0"/>
+              <a:t>In </a:t>
+            </a:r>
+            <a:r>
+              <a:rPr lang="it-IT" sz="1600" dirty="0" err="1" smtClean="0"/>
+              <a:t>order</a:t>
+            </a:r>
+            <a:r>
+              <a:rPr lang="it-IT" sz="1600" dirty="0" smtClean="0"/>
+              <a:t> to </a:t>
+            </a:r>
+            <a:r>
+              <a:rPr lang="it-IT" sz="1600" dirty="0" err="1" smtClean="0"/>
+              <a:t>run</a:t>
+            </a:r>
+            <a:r>
+              <a:rPr lang="it-IT" sz="1600" dirty="0" smtClean="0"/>
+              <a:t> the SW the </a:t>
+            </a:r>
+            <a:r>
+              <a:rPr lang="it-IT" sz="1600" dirty="0" err="1" smtClean="0"/>
+              <a:t>following</a:t>
+            </a:r>
+            <a:r>
+              <a:rPr lang="it-IT" sz="1600" dirty="0" smtClean="0"/>
+              <a:t> </a:t>
+            </a:r>
+            <a:r>
+              <a:rPr lang="it-IT" sz="1600" dirty="0" err="1" smtClean="0"/>
+              <a:t>prerequisite</a:t>
+            </a:r>
+            <a:r>
+              <a:rPr lang="it-IT" sz="1600" dirty="0" smtClean="0"/>
+              <a:t> are </a:t>
+            </a:r>
+            <a:r>
+              <a:rPr lang="it-IT" sz="1600" dirty="0" err="1" smtClean="0"/>
+              <a:t>needed</a:t>
+            </a:r>
+            <a:endParaRPr lang="it-IT" sz="1600" dirty="0" smtClean="0"/>
+          </a:p>
+          <a:p>
+            <a:endParaRPr lang="it-IT" sz="1600" dirty="0" smtClean="0"/>
+          </a:p>
+          <a:p>
+            <a:r>
+              <a:rPr lang="it-IT" sz="1600" dirty="0" err="1" smtClean="0"/>
+              <a:t>Modbus_PC_Simulator</a:t>
+            </a:r>
+            <a:endParaRPr lang="it-IT" sz="1600" dirty="0" smtClean="0"/>
+          </a:p>
+          <a:p>
+            <a:r>
+              <a:rPr lang="it-IT" sz="1600" dirty="0" smtClean="0"/>
+              <a:t>- </a:t>
+            </a:r>
+            <a:r>
+              <a:rPr lang="it-IT" sz="1600" dirty="0" err="1" smtClean="0"/>
+              <a:t>Python</a:t>
+            </a:r>
+            <a:r>
+              <a:rPr lang="it-IT" sz="1600" dirty="0" smtClean="0"/>
+              <a:t> V.2.7.x</a:t>
+            </a:r>
+          </a:p>
+          <a:p>
+            <a:r>
+              <a:rPr lang="it-IT" sz="1600" dirty="0" smtClean="0"/>
+              <a:t>- </a:t>
+            </a:r>
+            <a:r>
+              <a:rPr lang="it-IT" sz="1600" dirty="0" err="1" smtClean="0"/>
+              <a:t>pymodbus</a:t>
+            </a:r>
+            <a:r>
+              <a:rPr lang="it-IT" sz="1600" dirty="0" smtClean="0"/>
+              <a:t> (</a:t>
+            </a:r>
+            <a:r>
+              <a:rPr lang="it-IT" sz="1600" dirty="0" smtClean="0">
+                <a:hlinkClick r:id="rId2"/>
+              </a:rPr>
+              <a:t>https</a:t>
+            </a:r>
+            <a:r>
+              <a:rPr lang="it-IT" sz="1600" dirty="0">
+                <a:hlinkClick r:id="rId2"/>
+              </a:rPr>
+              <a:t>://</a:t>
+            </a:r>
+            <a:r>
+              <a:rPr lang="it-IT" sz="1600" dirty="0" smtClean="0">
+                <a:hlinkClick r:id="rId2"/>
+              </a:rPr>
+              <a:t>pymodbus.readthedocs.io/en/latest/readme.html#installing</a:t>
+            </a:r>
+            <a:r>
+              <a:rPr lang="it-IT" sz="1600" dirty="0" smtClean="0"/>
+              <a:t>)</a:t>
+            </a:r>
+          </a:p>
+          <a:p>
+            <a:r>
+              <a:rPr lang="it-IT" sz="1600" dirty="0" smtClean="0"/>
+              <a:t>- </a:t>
+            </a:r>
+            <a:r>
+              <a:rPr lang="it-IT" sz="1600" dirty="0" err="1" smtClean="0"/>
+              <a:t>pyserial</a:t>
+            </a:r>
+            <a:r>
+              <a:rPr lang="it-IT" sz="1600" dirty="0" smtClean="0"/>
+              <a:t> </a:t>
+            </a:r>
+            <a:r>
+              <a:rPr lang="it-IT" sz="1600" dirty="0"/>
+              <a:t>(</a:t>
+            </a:r>
+            <a:r>
+              <a:rPr lang="it-IT" sz="1600" dirty="0">
+                <a:hlinkClick r:id="rId3"/>
+              </a:rPr>
+              <a:t>https://pypi.org/project/pyserial</a:t>
+            </a:r>
+            <a:r>
+              <a:rPr lang="it-IT" sz="1600" dirty="0" smtClean="0">
+                <a:hlinkClick r:id="rId3"/>
+              </a:rPr>
+              <a:t>/</a:t>
+            </a:r>
+            <a:r>
+              <a:rPr lang="it-IT" sz="1600" dirty="0" smtClean="0"/>
+              <a:t>)</a:t>
+            </a:r>
+          </a:p>
+          <a:p>
+            <a:endParaRPr lang="it-IT" sz="1600" dirty="0" smtClean="0"/>
+          </a:p>
+          <a:p>
+            <a:r>
+              <a:rPr lang="it-IT" sz="1600" dirty="0" err="1" smtClean="0"/>
+              <a:t>CAREL_GME_Test</a:t>
+            </a:r>
+            <a:endParaRPr lang="it-IT" sz="1600" dirty="0" smtClean="0"/>
+          </a:p>
+          <a:p>
+            <a:pPr marL="285750" indent="-285750">
+              <a:buFontTx/>
+              <a:buChar char="-"/>
+            </a:pPr>
+            <a:r>
+              <a:rPr lang="it-IT" sz="1600" dirty="0" err="1" smtClean="0"/>
+              <a:t>Launch</a:t>
+            </a:r>
+            <a:r>
+              <a:rPr lang="it-IT" sz="1600" dirty="0" smtClean="0"/>
+              <a:t> </a:t>
+            </a:r>
+            <a:r>
+              <a:rPr lang="it-IT" sz="1600" dirty="0" smtClean="0"/>
+              <a:t>the </a:t>
+            </a:r>
+            <a:r>
+              <a:rPr lang="it-IT" sz="1600" dirty="0" err="1" smtClean="0"/>
+              <a:t>program</a:t>
+            </a:r>
+            <a:r>
+              <a:rPr lang="it-IT" sz="1600" dirty="0" smtClean="0"/>
+              <a:t> </a:t>
+            </a:r>
+            <a:r>
+              <a:rPr lang="it-IT" sz="1600" dirty="0" smtClean="0"/>
+              <a:t>CAREL_GME_Test.exe and </a:t>
+            </a:r>
+            <a:r>
+              <a:rPr lang="it-IT" sz="1600" dirty="0" smtClean="0"/>
+              <a:t>download and </a:t>
+            </a:r>
+            <a:r>
+              <a:rPr lang="it-IT" sz="1600" dirty="0" err="1" smtClean="0"/>
+              <a:t>install</a:t>
+            </a:r>
+            <a:r>
+              <a:rPr lang="it-IT" sz="1600" dirty="0" smtClean="0"/>
+              <a:t> the </a:t>
+            </a:r>
+            <a:r>
+              <a:rPr lang="it-IT" sz="1600" dirty="0" err="1" smtClean="0"/>
+              <a:t>requested</a:t>
+            </a:r>
+            <a:r>
+              <a:rPr lang="it-IT" sz="1600" dirty="0" smtClean="0"/>
+              <a:t> .</a:t>
+            </a:r>
+            <a:r>
+              <a:rPr lang="it-IT" sz="1600" dirty="0"/>
+              <a:t>NET </a:t>
+            </a:r>
+            <a:r>
+              <a:rPr lang="it-IT" sz="1600" dirty="0" smtClean="0"/>
+              <a:t>Framework</a:t>
+            </a:r>
+          </a:p>
+          <a:p>
+            <a:endParaRPr lang="it-IT" sz="1600" dirty="0" smtClean="0"/>
+          </a:p>
+          <a:p>
+            <a:r>
+              <a:rPr lang="it-IT" sz="1600" dirty="0" err="1" smtClean="0"/>
+              <a:t>After</a:t>
+            </a:r>
+            <a:r>
+              <a:rPr lang="it-IT" sz="1600" dirty="0" smtClean="0"/>
+              <a:t> the </a:t>
+            </a:r>
+            <a:r>
+              <a:rPr lang="it-IT" sz="1600" dirty="0" err="1" smtClean="0"/>
+              <a:t>installation</a:t>
+            </a:r>
+            <a:r>
+              <a:rPr lang="it-IT" sz="1600" dirty="0" smtClean="0"/>
+              <a:t> </a:t>
+            </a:r>
+            <a:r>
+              <a:rPr lang="it-IT" sz="1600" dirty="0" err="1" smtClean="0"/>
+              <a:t>follow</a:t>
+            </a:r>
+            <a:r>
+              <a:rPr lang="it-IT" sz="1600" dirty="0" smtClean="0"/>
+              <a:t> </a:t>
+            </a:r>
+            <a:r>
+              <a:rPr lang="it-IT" sz="1600" dirty="0" err="1" smtClean="0"/>
+              <a:t>this</a:t>
+            </a:r>
+            <a:r>
+              <a:rPr lang="it-IT" sz="1600" dirty="0" smtClean="0"/>
+              <a:t> </a:t>
+            </a:r>
+            <a:r>
+              <a:rPr lang="it-IT" sz="1600" dirty="0" err="1" smtClean="0"/>
+              <a:t>steps</a:t>
+            </a:r>
+            <a:r>
+              <a:rPr lang="it-IT" sz="1600" dirty="0" smtClean="0"/>
+              <a:t>:</a:t>
+            </a:r>
+          </a:p>
+          <a:p>
+            <a:pPr marL="285750" indent="-285750">
+              <a:buFontTx/>
+              <a:buChar char="-"/>
+            </a:pPr>
+            <a:r>
+              <a:rPr lang="it-IT" sz="1600" dirty="0" err="1" smtClean="0"/>
+              <a:t>Edit</a:t>
+            </a:r>
+            <a:r>
+              <a:rPr lang="it-IT" sz="1600" dirty="0" smtClean="0"/>
+              <a:t> with </a:t>
+            </a:r>
+            <a:r>
+              <a:rPr lang="it-IT" sz="1600" dirty="0" err="1" smtClean="0"/>
+              <a:t>notepad</a:t>
+            </a:r>
+            <a:r>
+              <a:rPr lang="it-IT" sz="1600" dirty="0" smtClean="0"/>
+              <a:t> the file CAREL_GME_Test_CFG.ini and set the COM </a:t>
+            </a:r>
+            <a:r>
+              <a:rPr lang="it-IT" sz="1600" dirty="0" err="1" smtClean="0"/>
+              <a:t>ports</a:t>
+            </a:r>
+            <a:r>
+              <a:rPr lang="it-IT" sz="1600" dirty="0" smtClean="0"/>
+              <a:t> </a:t>
+            </a:r>
+            <a:r>
+              <a:rPr lang="it-IT" sz="1600" dirty="0" err="1" smtClean="0"/>
+              <a:t>according</a:t>
+            </a:r>
+            <a:r>
+              <a:rPr lang="it-IT" sz="1600" dirty="0" smtClean="0"/>
+              <a:t> with </a:t>
+            </a:r>
+            <a:r>
+              <a:rPr lang="it-IT" sz="1600" dirty="0" err="1" smtClean="0"/>
+              <a:t>your</a:t>
+            </a:r>
+            <a:r>
+              <a:rPr lang="it-IT" sz="1600" dirty="0" smtClean="0"/>
+              <a:t> HW </a:t>
+            </a:r>
+            <a:r>
+              <a:rPr lang="it-IT" sz="1600" dirty="0" err="1" smtClean="0"/>
+              <a:t>configuration</a:t>
+            </a:r>
+            <a:endParaRPr lang="it-IT" sz="1600" dirty="0" smtClean="0"/>
+          </a:p>
+          <a:p>
+            <a:pPr marL="285750" indent="-285750">
+              <a:buFontTx/>
+              <a:buChar char="-"/>
+            </a:pPr>
+            <a:r>
+              <a:rPr lang="it-IT" sz="1600" dirty="0" err="1" smtClean="0"/>
+              <a:t>Launch</a:t>
+            </a:r>
+            <a:r>
+              <a:rPr lang="it-IT" sz="1600" dirty="0" smtClean="0"/>
+              <a:t> the CAREL_GME_Test.exe go to the panel on the right «Manual» </a:t>
+            </a:r>
+            <a:r>
+              <a:rPr lang="it-IT" sz="1600" dirty="0" err="1" smtClean="0"/>
+              <a:t>you</a:t>
+            </a:r>
+            <a:r>
+              <a:rPr lang="it-IT" sz="1600" dirty="0" smtClean="0"/>
+              <a:t> </a:t>
+            </a:r>
+            <a:r>
+              <a:rPr lang="it-IT" sz="1600" dirty="0" err="1" smtClean="0"/>
+              <a:t>will</a:t>
+            </a:r>
+            <a:r>
+              <a:rPr lang="it-IT" sz="1600" dirty="0" smtClean="0"/>
+              <a:t> </a:t>
+            </a:r>
+            <a:r>
+              <a:rPr lang="it-IT" sz="1600" dirty="0" err="1" smtClean="0"/>
+              <a:t>find</a:t>
+            </a:r>
+            <a:r>
+              <a:rPr lang="it-IT" sz="1600" dirty="0" smtClean="0"/>
+              <a:t> a </a:t>
+            </a:r>
+            <a:r>
+              <a:rPr lang="it-IT" sz="1600" dirty="0" err="1" smtClean="0"/>
+              <a:t>series</a:t>
+            </a:r>
+            <a:r>
+              <a:rPr lang="it-IT" sz="1600" dirty="0" smtClean="0"/>
+              <a:t> of </a:t>
+            </a:r>
+            <a:r>
+              <a:rPr lang="it-IT" sz="1600" dirty="0" err="1" smtClean="0"/>
+              <a:t>button</a:t>
+            </a:r>
+            <a:r>
+              <a:rPr lang="it-IT" sz="1600" dirty="0" smtClean="0"/>
+              <a:t/>
+            </a:r>
+            <a:br>
+              <a:rPr lang="it-IT" sz="1600" dirty="0" smtClean="0"/>
+            </a:br>
+            <a:r>
+              <a:rPr lang="it-IT" sz="1600" dirty="0" err="1" smtClean="0"/>
+              <a:t>check</a:t>
+            </a:r>
+            <a:r>
+              <a:rPr lang="it-IT" sz="1600" dirty="0" smtClean="0"/>
+              <a:t> the HW connection with the </a:t>
+            </a:r>
+            <a:r>
+              <a:rPr lang="it-IT" sz="1600" dirty="0" err="1" smtClean="0"/>
+              <a:t>aid</a:t>
+            </a:r>
+            <a:r>
+              <a:rPr lang="it-IT" sz="1600" dirty="0" smtClean="0"/>
+              <a:t> of </a:t>
+            </a:r>
+            <a:r>
+              <a:rPr lang="it-IT" sz="1600" dirty="0" err="1" smtClean="0"/>
+              <a:t>these</a:t>
+            </a:r>
+            <a:r>
+              <a:rPr lang="it-IT" sz="1600" dirty="0" smtClean="0"/>
+              <a:t> </a:t>
+            </a:r>
+            <a:r>
+              <a:rPr lang="it-IT" sz="1600" dirty="0" err="1" smtClean="0"/>
+              <a:t>buttons</a:t>
+            </a:r>
+            <a:r>
+              <a:rPr lang="it-IT" sz="1600" dirty="0" smtClean="0"/>
+              <a:t>.</a:t>
+            </a:r>
+            <a:br>
+              <a:rPr lang="it-IT" sz="1600" dirty="0" smtClean="0"/>
+            </a:br>
+            <a:r>
+              <a:rPr lang="it-IT" sz="1600" dirty="0" smtClean="0"/>
+              <a:t>  </a:t>
+            </a:r>
+            <a:endParaRPr lang="it-IT" sz="1600" dirty="0"/>
+          </a:p>
+          <a:p>
+            <a:endParaRPr lang="it-IT" sz="1600" dirty="0" smtClean="0"/>
+          </a:p>
+          <a:p>
+            <a:endParaRPr lang="it-IT" sz="1600" dirty="0"/>
+          </a:p>
+          <a:p>
+            <a:endParaRPr lang="it-IT" sz="1600" dirty="0" smtClean="0"/>
+          </a:p>
+          <a:p>
+            <a:endParaRPr lang="it-IT" sz="1600" dirty="0"/>
+          </a:p>
+        </p:txBody>
+      </p:sp>
+    </p:spTree>
+    <p:extLst>
+      <p:ext uri="{BB962C8B-B14F-4D97-AF65-F5344CB8AC3E}">
+        <p14:creationId xmlns:p14="http://schemas.microsoft.com/office/powerpoint/2010/main" val="355755430"/>
+      </p:ext>
+    </p:extLst>
+  </p:cSld>
+  <p:clrMapOvr>
+    <a:masterClrMapping/>
+  </p:clrMapOvr>
+</p:sld>
+</file>
+
 <file path=ppt/slides/slide2.xml><?xml version="1.0" encoding="utf-8"?>
 <p:sld xmlns:a="http://schemas.openxmlformats.org/drawingml/2006/main" xmlns:r="http://schemas.openxmlformats.org/officeDocument/2006/relationships" xmlns:p="http://schemas.openxmlformats.org/presentationml/2006/main">
   <p:cSld>
@@ -3172,12 +3682,16 @@
           <a:lstStyle/>
           <a:p>
             <a:r>
-              <a:rPr lang="it-IT" sz="2400" dirty="0" err="1" smtClean="0"/>
+              <a:rPr lang="en-US" sz="2400" dirty="0" smtClean="0"/>
               <a:t>Overview</a:t>
             </a:r>
             <a:r>
               <a:rPr lang="it-IT" sz="2400" dirty="0" smtClean="0"/>
-              <a:t> – HW part</a:t>
+              <a:t> </a:t>
+            </a:r>
+            <a:r>
+              <a:rPr lang="it-IT" sz="2400" dirty="0" smtClean="0"/>
+              <a:t>– HW part</a:t>
             </a:r>
             <a:endParaRPr lang="it-IT" sz="2400" dirty="0"/>
           </a:p>
@@ -3206,410 +3720,89 @@
           <a:lstStyle/>
           <a:p>
             <a:r>
-              <a:rPr lang="it-IT" dirty="0" smtClean="0"/>
-              <a:t>On the </a:t>
-            </a:r>
-            <a:r>
-              <a:rPr lang="it-IT" dirty="0" err="1" smtClean="0"/>
-              <a:t>following</a:t>
-            </a:r>
-            <a:r>
-              <a:rPr lang="it-IT" dirty="0" smtClean="0"/>
-              <a:t> </a:t>
-            </a:r>
-            <a:r>
-              <a:rPr lang="it-IT" dirty="0" err="1" smtClean="0"/>
-              <a:t>slides</a:t>
-            </a:r>
-            <a:r>
-              <a:rPr lang="it-IT" dirty="0" smtClean="0"/>
-              <a:t> </a:t>
-            </a:r>
-            <a:r>
-              <a:rPr lang="it-IT" dirty="0" err="1" smtClean="0"/>
-              <a:t>you</a:t>
-            </a:r>
-            <a:r>
-              <a:rPr lang="it-IT" dirty="0" smtClean="0"/>
-              <a:t> </a:t>
-            </a:r>
-            <a:r>
-              <a:rPr lang="it-IT" dirty="0" err="1" smtClean="0"/>
-              <a:t>will</a:t>
-            </a:r>
-            <a:r>
-              <a:rPr lang="it-IT" dirty="0" smtClean="0"/>
-              <a:t> </a:t>
-            </a:r>
-            <a:r>
-              <a:rPr lang="it-IT" dirty="0" err="1" smtClean="0"/>
-              <a:t>find</a:t>
-            </a:r>
-            <a:r>
-              <a:rPr lang="it-IT" dirty="0" smtClean="0"/>
-              <a:t> the </a:t>
-            </a:r>
-            <a:r>
-              <a:rPr lang="it-IT" dirty="0" err="1" smtClean="0"/>
-              <a:t>description</a:t>
-            </a:r>
-            <a:r>
-              <a:rPr lang="it-IT" dirty="0" smtClean="0"/>
-              <a:t> of the </a:t>
-            </a:r>
-            <a:r>
-              <a:rPr lang="it-IT" dirty="0" err="1" smtClean="0"/>
-              <a:t>method</a:t>
-            </a:r>
-            <a:r>
-              <a:rPr lang="it-IT" dirty="0" smtClean="0"/>
-              <a:t> to </a:t>
-            </a:r>
-            <a:r>
-              <a:rPr lang="it-IT" dirty="0" err="1" smtClean="0"/>
-              <a:t>program</a:t>
-            </a:r>
-            <a:r>
-              <a:rPr lang="it-IT" dirty="0" smtClean="0"/>
-              <a:t> the FW and test the HW on the gateway middle end </a:t>
-            </a:r>
-            <a:r>
-              <a:rPr lang="it-IT" dirty="0" err="1" smtClean="0"/>
+              <a:rPr lang="en-US" dirty="0" smtClean="0"/>
+              <a:t>On the following slides you will find the description of the method to program the FW and test the HW on the gateway middle end </a:t>
+            </a:r>
+            <a:r>
+              <a:rPr lang="en-US" dirty="0" err="1" smtClean="0"/>
               <a:t>WiFi</a:t>
             </a:r>
             <a:r>
-              <a:rPr lang="it-IT" dirty="0" smtClean="0"/>
+              <a:rPr lang="en-US" dirty="0" smtClean="0"/>
               <a:t>.</a:t>
             </a:r>
           </a:p>
           <a:p>
             <a:r>
-              <a:rPr lang="it-IT" dirty="0" smtClean="0"/>
-              <a:t>The test HW </a:t>
-            </a:r>
-            <a:r>
-              <a:rPr lang="it-IT" dirty="0" err="1" smtClean="0"/>
-              <a:t>is</a:t>
-            </a:r>
-            <a:r>
-              <a:rPr lang="it-IT" dirty="0" smtClean="0"/>
-              <a:t> </a:t>
-            </a:r>
-            <a:r>
-              <a:rPr lang="it-IT" dirty="0" err="1" smtClean="0"/>
-              <a:t>described</a:t>
-            </a:r>
-            <a:r>
-              <a:rPr lang="it-IT" dirty="0" smtClean="0"/>
-              <a:t> on the </a:t>
-            </a:r>
-            <a:r>
-              <a:rPr lang="it-IT" dirty="0" err="1" smtClean="0"/>
-              <a:t>next</a:t>
-            </a:r>
-            <a:r>
-              <a:rPr lang="it-IT" dirty="0" smtClean="0"/>
-              <a:t> slide and are made </a:t>
-            </a:r>
-            <a:r>
-              <a:rPr lang="it-IT" dirty="0" err="1" smtClean="0"/>
-              <a:t>using</a:t>
-            </a:r>
-            <a:r>
-              <a:rPr lang="it-IT" dirty="0" smtClean="0"/>
-              <a:t> </a:t>
-            </a:r>
-            <a:r>
-              <a:rPr lang="it-IT" dirty="0" err="1" smtClean="0"/>
-              <a:t>this</a:t>
-            </a:r>
-            <a:r>
-              <a:rPr lang="it-IT" dirty="0" smtClean="0"/>
-              <a:t> HW list :</a:t>
-            </a:r>
-            <a:br>
-              <a:rPr lang="it-IT" dirty="0" smtClean="0"/>
-            </a:br>
-            <a:r>
-              <a:rPr lang="it-IT" dirty="0" smtClean="0"/>
-              <a:t>n.1 </a:t>
-            </a:r>
-            <a:r>
-              <a:rPr lang="it-IT" dirty="0" err="1" smtClean="0"/>
-              <a:t>pcs</a:t>
-            </a:r>
-            <a:r>
-              <a:rPr lang="it-IT" dirty="0"/>
-              <a:t> </a:t>
-            </a:r>
-            <a:r>
-              <a:rPr lang="it-IT" dirty="0" smtClean="0"/>
-              <a:t> </a:t>
-            </a:r>
-            <a:r>
-              <a:rPr lang="it-IT" dirty="0"/>
-              <a:t>from RS </a:t>
-            </a:r>
-            <a:r>
-              <a:rPr lang="it-IT" dirty="0" err="1"/>
-              <a:t>components</a:t>
-            </a:r>
-            <a:r>
-              <a:rPr lang="it-IT" dirty="0"/>
-              <a:t> </a:t>
-            </a:r>
-            <a:r>
-              <a:rPr lang="it-IT" dirty="0" smtClean="0"/>
-              <a:t> RS </a:t>
-            </a:r>
-            <a:r>
-              <a:rPr lang="it-IT" dirty="0"/>
-              <a:t>174-3234 </a:t>
-            </a:r>
-            <a:r>
-              <a:rPr lang="en-US" dirty="0"/>
-              <a:t>Shield </a:t>
-            </a:r>
-            <a:r>
-              <a:rPr lang="en-US" dirty="0" err="1"/>
-              <a:t>relè</a:t>
-            </a:r>
-            <a:r>
-              <a:rPr lang="en-US" dirty="0"/>
-              <a:t> 3.0 </a:t>
-            </a:r>
-            <a:r>
               <a:rPr lang="en-US" dirty="0" smtClean="0"/>
-              <a:t>for </a:t>
-            </a:r>
-            <a:r>
-              <a:rPr lang="en-US" dirty="0"/>
-              <a:t>Shield Arduino/</a:t>
-            </a:r>
-            <a:r>
-              <a:rPr lang="en-US" dirty="0" err="1"/>
-              <a:t>Seeeduino</a:t>
-            </a:r>
-            <a:r>
-              <a:rPr lang="en-US" dirty="0"/>
-              <a:t> Relay Shield </a:t>
-            </a:r>
-            <a:r>
-              <a:rPr lang="en-US" dirty="0" smtClean="0"/>
-              <a:t>3.0</a:t>
+              <a:t>The test HW is described on the next slide and are made using this HW list :</a:t>
             </a:r>
             <a:br>
               <a:rPr lang="en-US" dirty="0" smtClean="0"/>
             </a:br>
             <a:r>
               <a:rPr lang="en-US" dirty="0" smtClean="0"/>
-              <a:t>n.1 pcs  </a:t>
-            </a:r>
-            <a:r>
-              <a:rPr lang="it-IT" dirty="0"/>
-              <a:t>from RS </a:t>
-            </a:r>
-            <a:r>
-              <a:rPr lang="it-IT" dirty="0" err="1"/>
-              <a:t>components</a:t>
-            </a:r>
-            <a:r>
-              <a:rPr lang="it-IT" dirty="0"/>
-              <a:t> </a:t>
-            </a:r>
-            <a:r>
-              <a:rPr lang="it-IT" dirty="0" smtClean="0"/>
-              <a:t>RS 715-4081 Arduino Uno Rev.3</a:t>
+              <a:t>n.1 pcs  from RS components  RS 174-3234 Shield </a:t>
+            </a:r>
+            <a:r>
+              <a:rPr lang="en-US" dirty="0" err="1" smtClean="0"/>
+              <a:t>relè</a:t>
             </a:r>
             <a:r>
               <a:rPr lang="en-US" dirty="0" smtClean="0"/>
-              <a:t> </a:t>
-            </a:r>
-          </a:p>
-          <a:p>
+              <a:t> 3.0 for Shield Arduino/</a:t>
+            </a:r>
+            <a:r>
+              <a:rPr lang="en-US" dirty="0" err="1" smtClean="0"/>
+              <a:t>Seeeduino</a:t>
+            </a:r>
             <a:r>
               <a:rPr lang="en-US" dirty="0" smtClean="0"/>
-              <a:t>n.1 pcs </a:t>
-            </a:r>
-            <a:r>
-              <a:rPr lang="it-IT" dirty="0"/>
-              <a:t>from RS </a:t>
-            </a:r>
-            <a:r>
-              <a:rPr lang="it-IT" dirty="0" err="1"/>
-              <a:t>components</a:t>
-            </a:r>
-            <a:r>
-              <a:rPr lang="it-IT" dirty="0"/>
-              <a:t> </a:t>
-            </a:r>
-            <a:r>
-              <a:rPr lang="it-IT" dirty="0" smtClean="0"/>
-              <a:t>RS 429-284  </a:t>
-            </a:r>
-            <a:r>
-              <a:rPr lang="en-US" dirty="0" smtClean="0"/>
-              <a:t>USB/TTL 3V3 converter </a:t>
+              <a:t> Relay Shield 3.0</a:t>
             </a:r>
             <a:br>
               <a:rPr lang="en-US" dirty="0" smtClean="0"/>
             </a:br>
             <a:r>
               <a:rPr lang="en-US" dirty="0" smtClean="0"/>
-              <a:t>n.1 pcs </a:t>
-            </a:r>
-            <a:r>
-              <a:rPr lang="it-IT" dirty="0"/>
-              <a:t>from RS </a:t>
-            </a:r>
-            <a:r>
-              <a:rPr lang="it-IT" dirty="0" err="1" smtClean="0"/>
-              <a:t>components</a:t>
-            </a:r>
-            <a:r>
-              <a:rPr lang="it-IT" dirty="0"/>
-              <a:t> </a:t>
-            </a:r>
-            <a:r>
-              <a:rPr lang="it-IT" dirty="0" smtClean="0"/>
-              <a:t>RS 429-278</a:t>
-            </a:r>
+              <a:t>n.1 pcs  from RS components RS 715-4081 Arduino Uno Rev.3 </a:t>
+            </a:r>
+          </a:p>
+          <a:p>
             <a:r>
               <a:rPr lang="en-US" dirty="0" smtClean="0"/>
-              <a:t>  USB/TTL 5V </a:t>
-            </a:r>
-            <a:r>
-              <a:rPr lang="en-US" dirty="0"/>
-              <a:t>converter </a:t>
-            </a:r>
-            <a:endParaRPr lang="it-IT" dirty="0"/>
-          </a:p>
-          <a:p>
-            <a:r>
-              <a:rPr lang="it-IT" dirty="0" smtClean="0"/>
-              <a:t>n.1 </a:t>
-            </a:r>
-            <a:r>
-              <a:rPr lang="it-IT" dirty="0" err="1" smtClean="0"/>
-              <a:t>pcs</a:t>
-            </a:r>
-            <a:r>
-              <a:rPr lang="it-IT" dirty="0" smtClean="0"/>
-              <a:t> </a:t>
-            </a:r>
-            <a:r>
-              <a:rPr lang="it-IT" dirty="0" err="1" smtClean="0"/>
-              <a:t>power</a:t>
-            </a:r>
-            <a:r>
-              <a:rPr lang="it-IT" dirty="0" smtClean="0"/>
-              <a:t> </a:t>
-            </a:r>
-            <a:r>
-              <a:rPr lang="it-IT" dirty="0" err="1" smtClean="0"/>
-              <a:t>supply</a:t>
-            </a:r>
-            <a:r>
-              <a:rPr lang="it-IT" dirty="0" smtClean="0"/>
-              <a:t> 230V to 12VAC 1°</a:t>
-            </a:r>
-          </a:p>
-          <a:p>
-            <a:endParaRPr lang="it-IT" dirty="0" smtClean="0"/>
-          </a:p>
-          <a:p>
-            <a:r>
-              <a:rPr lang="it-IT" dirty="0" smtClean="0"/>
-              <a:t>The </a:t>
-            </a:r>
-            <a:r>
-              <a:rPr lang="it-IT" dirty="0" err="1" smtClean="0"/>
-              <a:t>same</a:t>
-            </a:r>
-            <a:r>
-              <a:rPr lang="it-IT" dirty="0" smtClean="0"/>
-              <a:t> HW are </a:t>
-            </a:r>
-            <a:r>
-              <a:rPr lang="it-IT" dirty="0" err="1" smtClean="0"/>
-              <a:t>widely</a:t>
-            </a:r>
-            <a:r>
-              <a:rPr lang="it-IT" dirty="0" smtClean="0"/>
-              <a:t> </a:t>
-            </a:r>
-            <a:r>
-              <a:rPr lang="it-IT" dirty="0" err="1" smtClean="0"/>
-              <a:t>available</a:t>
-            </a:r>
-            <a:r>
-              <a:rPr lang="it-IT" dirty="0" smtClean="0"/>
-              <a:t> on Internet from </a:t>
-            </a:r>
-            <a:r>
-              <a:rPr lang="it-IT" dirty="0" err="1" smtClean="0"/>
-              <a:t>other</a:t>
-            </a:r>
-            <a:r>
-              <a:rPr lang="it-IT" dirty="0" smtClean="0"/>
-              <a:t> </a:t>
-            </a:r>
-            <a:r>
-              <a:rPr lang="it-IT" dirty="0" err="1" smtClean="0"/>
-              <a:t>vendors</a:t>
-            </a:r>
-            <a:r>
-              <a:rPr lang="it-IT" dirty="0" smtClean="0"/>
-              <a:t>.</a:t>
-            </a:r>
-          </a:p>
-          <a:p>
-            <a:endParaRPr lang="it-IT" dirty="0"/>
-          </a:p>
-          <a:p>
-            <a:r>
-              <a:rPr lang="it-IT" dirty="0" smtClean="0"/>
-              <a:t>The </a:t>
-            </a:r>
-            <a:r>
-              <a:rPr lang="it-IT" dirty="0" err="1" smtClean="0"/>
-              <a:t>system</a:t>
-            </a:r>
-            <a:r>
-              <a:rPr lang="it-IT" dirty="0" smtClean="0"/>
-              <a:t> </a:t>
-            </a:r>
-            <a:r>
-              <a:rPr lang="it-IT" dirty="0" err="1" smtClean="0"/>
-              <a:t>require</a:t>
-            </a:r>
-            <a:r>
-              <a:rPr lang="it-IT" dirty="0" smtClean="0"/>
-              <a:t> a test bed to </a:t>
-            </a:r>
-            <a:r>
-              <a:rPr lang="it-IT" dirty="0" err="1" smtClean="0"/>
-              <a:t>connect</a:t>
-            </a:r>
-            <a:r>
-              <a:rPr lang="it-IT" dirty="0" smtClean="0"/>
-              <a:t> with </a:t>
-            </a:r>
-            <a:r>
-              <a:rPr lang="it-IT" dirty="0" err="1" smtClean="0"/>
-              <a:t>nails</a:t>
-            </a:r>
-            <a:r>
-              <a:rPr lang="it-IT" dirty="0" smtClean="0"/>
-              <a:t> some test </a:t>
-            </a:r>
-            <a:r>
-              <a:rPr lang="it-IT" dirty="0" err="1" smtClean="0"/>
-              <a:t>points</a:t>
-            </a:r>
-            <a:r>
-              <a:rPr lang="it-IT" dirty="0" smtClean="0"/>
-              <a:t> to the test machine.</a:t>
+              <a:t>n.1 pcs from RS components RS 429-284  USB/TTL 3V3 converter </a:t>
+            </a:r>
+            <a:br>
+              <a:rPr lang="en-US" dirty="0" smtClean="0"/>
+            </a:br>
+            <a:r>
+              <a:rPr lang="en-US" dirty="0" smtClean="0"/>
+              <a:t>n.1 pcs from RS components RS 429-278  USB/TTL 5V converter </a:t>
+            </a:r>
+          </a:p>
+          <a:p>
+            <a:r>
+              <a:rPr lang="en-US" dirty="0" smtClean="0"/>
+              <a:t>n.1 pcs power supply 230V to 12VAC 1°</a:t>
+            </a:r>
+          </a:p>
+          <a:p>
+            <a:endParaRPr lang="en-US" dirty="0" smtClean="0"/>
+          </a:p>
+          <a:p>
+            <a:r>
+              <a:rPr lang="en-US" dirty="0" smtClean="0"/>
+              <a:t>The same HW are widely available on Internet from other vendors.</a:t>
+            </a:r>
+          </a:p>
+          <a:p>
+            <a:endParaRPr lang="en-US" dirty="0" smtClean="0"/>
+          </a:p>
+          <a:p>
+            <a:r>
+              <a:rPr lang="en-US" dirty="0" smtClean="0"/>
+              <a:t>The system require a test bed to connect with nails some test points to the test machine.</a:t>
             </a:r>
           </a:p>
           <a:p>
@@ -3756,8 +3949,13 @@
           <a:p>
             <a:r>
               <a:rPr lang="en-US" sz="1600" dirty="0" smtClean="0"/>
-              <a:t>   1 - the serial protocol used to interact with the HW platform of point 1.   </a:t>
-            </a:r>
+              <a:t>   1 - the serial protocol used to interact with the HW </a:t>
+            </a:r>
+            <a:r>
+              <a:rPr lang="en-US" sz="1600" dirty="0" smtClean="0"/>
+              <a:t>I/O module.   </a:t>
+            </a:r>
+            <a:endParaRPr lang="en-US" sz="1600" dirty="0" smtClean="0"/>
           </a:p>
           <a:p>
             <a:r>
@@ -3782,15 +3980,15 @@
           <a:p>
             <a:r>
               <a:rPr lang="en-US" sz="1600" dirty="0" smtClean="0"/>
-              <a:t>   3 - the test list (under </a:t>
-            </a:r>
-            <a:r>
-              <a:rPr lang="en-US" sz="1600" dirty="0" err="1" smtClean="0"/>
-              <a:t>costruction</a:t>
+              <a:t>   3 - the test </a:t>
             </a:r>
             <a:r>
               <a:rPr lang="en-US" sz="1600" dirty="0" smtClean="0"/>
-              <a:t>)</a:t>
+              <a:t>list</a:t>
+            </a:r>
+            <a:r>
+              <a:rPr lang="en-US" sz="1600" dirty="0" smtClean="0"/>
+              <a:t/>
             </a:r>
             <a:br>
               <a:rPr lang="en-US" sz="1600" dirty="0" smtClean="0"/>
@@ -3874,8 +4072,24 @@
           <a:p>
             <a:r>
               <a:rPr lang="en-US" sz="1600" dirty="0" smtClean="0"/>
-              <a:t>     and use the test demo SW as n implementation reference. </a:t>
-            </a:r>
+              <a:t>     and use the test demo SW as </a:t>
+            </a:r>
+            <a:r>
+              <a:rPr lang="en-US" sz="1600" dirty="0" smtClean="0"/>
+              <a:t>an </a:t>
+            </a:r>
+            <a:r>
+              <a:rPr lang="en-US" sz="1600" dirty="0" smtClean="0"/>
+              <a:t>implementation reference. </a:t>
+            </a:r>
+            <a:r>
+              <a:rPr lang="en-US" sz="1600" dirty="0" smtClean="0"/>
+              <a:t/>
+            </a:r>
+            <a:br>
+              <a:rPr lang="en-US" sz="1600" dirty="0" smtClean="0"/>
+            </a:br>
+            <a:endParaRPr lang="en-US" sz="1600" dirty="0" smtClean="0"/>
           </a:p>
           <a:p>
             <a:r>
@@ -3965,7 +4179,7 @@
         </p:nvSpPr>
         <p:spPr>
           <a:xfrm>
-            <a:off x="4054759" y="2253676"/>
+            <a:off x="4054759" y="2807855"/>
             <a:ext cx="2105891" cy="1265382"/>
           </a:xfrm>
           <a:prstGeom prst="rect">
@@ -4020,7 +4234,7 @@
         </p:nvSpPr>
         <p:spPr>
           <a:xfrm>
-            <a:off x="8719123" y="2253677"/>
+            <a:off x="8719123" y="2807856"/>
             <a:ext cx="1930400" cy="1265382"/>
           </a:xfrm>
           <a:prstGeom prst="roundRect">
@@ -4074,7 +4288,7 @@
         </p:nvSpPr>
         <p:spPr>
           <a:xfrm>
-            <a:off x="2589328" y="3997086"/>
+            <a:off x="2589328" y="4551265"/>
             <a:ext cx="1567032" cy="572655"/>
           </a:xfrm>
           <a:prstGeom prst="rect">
@@ -4129,7 +4343,7 @@
         </p:nvSpPr>
         <p:spPr>
           <a:xfrm>
-            <a:off x="665015" y="1173021"/>
+            <a:off x="665015" y="1727200"/>
             <a:ext cx="1265382" cy="738909"/>
           </a:xfrm>
           <a:prstGeom prst="roundRect">
@@ -4184,7 +4398,7 @@
         </p:nvSpPr>
         <p:spPr>
           <a:xfrm>
-            <a:off x="4054759" y="1173021"/>
+            <a:off x="4054759" y="1727200"/>
             <a:ext cx="2105891" cy="554182"/>
           </a:xfrm>
           <a:prstGeom prst="rect">
@@ -4230,7 +4444,7 @@
         </p:nvCxnSpPr>
         <p:spPr>
           <a:xfrm>
-            <a:off x="6160650" y="1450112"/>
+            <a:off x="6160650" y="2004291"/>
             <a:ext cx="3523673" cy="0"/>
           </a:xfrm>
           <a:prstGeom prst="line">
@@ -4267,7 +4481,7 @@
         </p:nvCxnSpPr>
         <p:spPr>
           <a:xfrm>
-            <a:off x="9684323" y="1450112"/>
+            <a:off x="9684323" y="2004291"/>
             <a:ext cx="0" cy="803565"/>
           </a:xfrm>
           <a:prstGeom prst="line">
@@ -4302,7 +4516,7 @@
         </p:nvSpPr>
         <p:spPr>
           <a:xfrm>
-            <a:off x="9684323" y="1884344"/>
+            <a:off x="9684323" y="2438523"/>
             <a:ext cx="1408546" cy="276999"/>
           </a:xfrm>
           <a:prstGeom prst="rect">
@@ -4336,7 +4550,7 @@
         </p:nvSpPr>
         <p:spPr>
           <a:xfrm>
-            <a:off x="6160650" y="1173021"/>
+            <a:off x="6160650" y="1727200"/>
             <a:ext cx="2124362" cy="276999"/>
           </a:xfrm>
           <a:prstGeom prst="rect">
@@ -4368,7 +4582,7 @@
         </p:nvCxnSpPr>
         <p:spPr>
           <a:xfrm flipH="1" flipV="1">
-            <a:off x="1930397" y="1450020"/>
+            <a:off x="1930397" y="2004199"/>
             <a:ext cx="2124362" cy="92"/>
           </a:xfrm>
           <a:prstGeom prst="line">
@@ -4403,7 +4617,7 @@
         </p:nvSpPr>
         <p:spPr>
           <a:xfrm>
-            <a:off x="1955796" y="1498649"/>
+            <a:off x="1955796" y="2052828"/>
             <a:ext cx="1373912" cy="276999"/>
           </a:xfrm>
           <a:prstGeom prst="rect">
@@ -4433,7 +4647,7 @@
         </p:nvSpPr>
         <p:spPr>
           <a:xfrm>
-            <a:off x="1955796" y="1173021"/>
+            <a:off x="1955796" y="1727200"/>
             <a:ext cx="1373912" cy="276999"/>
           </a:xfrm>
           <a:prstGeom prst="rect">
@@ -4465,7 +4679,7 @@
         </p:nvCxnSpPr>
         <p:spPr>
           <a:xfrm flipH="1">
-            <a:off x="3103415" y="2886367"/>
+            <a:off x="3103415" y="3440546"/>
             <a:ext cx="951344" cy="0"/>
           </a:xfrm>
           <a:prstGeom prst="line">
@@ -4500,7 +4714,7 @@
         </p:nvCxnSpPr>
         <p:spPr>
           <a:xfrm flipH="1" flipV="1">
-            <a:off x="3084366" y="1777818"/>
+            <a:off x="3084366" y="2331997"/>
             <a:ext cx="576" cy="1108550"/>
           </a:xfrm>
           <a:prstGeom prst="line">
@@ -4535,7 +4749,7 @@
         </p:nvCxnSpPr>
         <p:spPr>
           <a:xfrm flipH="1">
-            <a:off x="1930397" y="1773477"/>
+            <a:off x="1930397" y="2327656"/>
             <a:ext cx="1153969" cy="0"/>
           </a:xfrm>
           <a:prstGeom prst="line">
@@ -4570,7 +4784,7 @@
         </p:nvCxnSpPr>
         <p:spPr>
           <a:xfrm>
-            <a:off x="6160650" y="2419930"/>
+            <a:off x="6160650" y="2974109"/>
             <a:ext cx="2558473" cy="9237"/>
           </a:xfrm>
           <a:prstGeom prst="line">
@@ -4605,7 +4819,7 @@
         </p:nvSpPr>
         <p:spPr>
           <a:xfrm>
-            <a:off x="6158341" y="2179939"/>
+            <a:off x="6158341" y="2734118"/>
             <a:ext cx="969818" cy="276999"/>
           </a:xfrm>
           <a:prstGeom prst="rect">
@@ -4635,7 +4849,7 @@
         </p:nvSpPr>
         <p:spPr>
           <a:xfrm>
-            <a:off x="8264232" y="2179938"/>
+            <a:off x="8264232" y="2734117"/>
             <a:ext cx="418704" cy="276999"/>
           </a:xfrm>
           <a:prstGeom prst="rect">
@@ -4665,7 +4879,7 @@
         </p:nvCxnSpPr>
         <p:spPr>
           <a:xfrm>
-            <a:off x="4886031" y="3519058"/>
+            <a:off x="4886031" y="4073237"/>
             <a:ext cx="9236" cy="1542472"/>
           </a:xfrm>
           <a:prstGeom prst="line">
@@ -4700,7 +4914,7 @@
         </p:nvSpPr>
         <p:spPr>
           <a:xfrm>
-            <a:off x="5800435" y="1892249"/>
+            <a:off x="5800435" y="2446428"/>
             <a:ext cx="969818" cy="276999"/>
           </a:xfrm>
           <a:prstGeom prst="rect">
@@ -4730,7 +4944,7 @@
         </p:nvCxnSpPr>
         <p:spPr>
           <a:xfrm>
-            <a:off x="6158341" y="2779903"/>
+            <a:off x="6158341" y="3334082"/>
             <a:ext cx="969818" cy="0"/>
           </a:xfrm>
           <a:prstGeom prst="line">
@@ -4765,7 +4979,7 @@
         </p:nvCxnSpPr>
         <p:spPr>
           <a:xfrm>
-            <a:off x="7128159" y="2779903"/>
+            <a:off x="7128159" y="3334082"/>
             <a:ext cx="0" cy="203445"/>
           </a:xfrm>
           <a:prstGeom prst="line">
@@ -4800,7 +5014,7 @@
         </p:nvCxnSpPr>
         <p:spPr>
           <a:xfrm>
-            <a:off x="7019633" y="2983348"/>
+            <a:off x="7019633" y="3537527"/>
             <a:ext cx="203198" cy="0"/>
           </a:xfrm>
           <a:prstGeom prst="line">
@@ -4835,7 +5049,7 @@
         </p:nvSpPr>
         <p:spPr>
           <a:xfrm>
-            <a:off x="3134638" y="4766075"/>
+            <a:off x="3134638" y="5320254"/>
             <a:ext cx="476412" cy="276999"/>
           </a:xfrm>
           <a:prstGeom prst="rect">
@@ -4867,7 +5081,7 @@
         </p:nvCxnSpPr>
         <p:spPr>
           <a:xfrm>
-            <a:off x="4156360" y="4283414"/>
+            <a:off x="4156360" y="4837593"/>
             <a:ext cx="318653" cy="6880"/>
           </a:xfrm>
           <a:prstGeom prst="line">
@@ -4902,7 +5116,7 @@
         </p:nvSpPr>
         <p:spPr>
           <a:xfrm>
-            <a:off x="4505456" y="3535421"/>
+            <a:off x="4505456" y="4089600"/>
             <a:ext cx="969818" cy="461665"/>
           </a:xfrm>
           <a:prstGeom prst="rect">
@@ -4939,7 +5153,7 @@
         </p:nvSpPr>
         <p:spPr>
           <a:xfrm>
-            <a:off x="4054759" y="397000"/>
+            <a:off x="4054759" y="951179"/>
             <a:ext cx="2105891" cy="554182"/>
           </a:xfrm>
           <a:prstGeom prst="rect">
@@ -4985,7 +5199,7 @@
         </p:nvCxnSpPr>
         <p:spPr>
           <a:xfrm flipH="1">
-            <a:off x="1297706" y="674091"/>
+            <a:off x="1297706" y="1228270"/>
             <a:ext cx="2757053" cy="0"/>
           </a:xfrm>
           <a:prstGeom prst="line">
@@ -5022,7 +5236,7 @@
         </p:nvCxnSpPr>
         <p:spPr>
           <a:xfrm>
-            <a:off x="1297706" y="674091"/>
+            <a:off x="1297706" y="1228270"/>
             <a:ext cx="0" cy="498930"/>
           </a:xfrm>
           <a:prstGeom prst="line">
@@ -5057,7 +5271,7 @@
         </p:nvSpPr>
         <p:spPr>
           <a:xfrm>
-            <a:off x="1960408" y="441177"/>
+            <a:off x="1960408" y="995356"/>
             <a:ext cx="1373912" cy="276999"/>
           </a:xfrm>
           <a:prstGeom prst="rect">
@@ -5087,7 +5301,7 @@
         </p:nvCxnSpPr>
         <p:spPr>
           <a:xfrm flipV="1">
-            <a:off x="10649523" y="2523562"/>
+            <a:off x="10649523" y="3077741"/>
             <a:ext cx="960586" cy="4743"/>
           </a:xfrm>
           <a:prstGeom prst="line">
@@ -5124,7 +5338,7 @@
         </p:nvCxnSpPr>
         <p:spPr>
           <a:xfrm>
-            <a:off x="6160650" y="674091"/>
+            <a:off x="6160650" y="1228270"/>
             <a:ext cx="5449459" cy="0"/>
           </a:xfrm>
           <a:prstGeom prst="line">
@@ -5159,7 +5373,7 @@
         </p:nvCxnSpPr>
         <p:spPr>
           <a:xfrm>
-            <a:off x="11610109" y="674091"/>
+            <a:off x="11610109" y="1228270"/>
             <a:ext cx="0" cy="1849471"/>
           </a:xfrm>
           <a:prstGeom prst="line">
@@ -5194,7 +5408,7 @@
         </p:nvSpPr>
         <p:spPr>
           <a:xfrm>
-            <a:off x="10636820" y="2248934"/>
+            <a:off x="10636820" y="2803113"/>
             <a:ext cx="1373912" cy="276999"/>
           </a:xfrm>
           <a:prstGeom prst="rect">
@@ -5224,7 +5438,7 @@
         </p:nvSpPr>
         <p:spPr>
           <a:xfrm>
-            <a:off x="4169938" y="3542570"/>
+            <a:off x="4169938" y="4096749"/>
             <a:ext cx="969818" cy="461665"/>
           </a:xfrm>
           <a:prstGeom prst="rect">
@@ -5261,7 +5475,7 @@
         </p:nvCxnSpPr>
         <p:spPr>
           <a:xfrm flipV="1">
-            <a:off x="4475013" y="3519058"/>
+            <a:off x="4475013" y="4073237"/>
             <a:ext cx="0" cy="771236"/>
           </a:xfrm>
           <a:prstGeom prst="line">
@@ -5298,7 +5512,7 @@
         </p:nvCxnSpPr>
         <p:spPr>
           <a:xfrm flipV="1">
-            <a:off x="9684323" y="3519059"/>
+            <a:off x="9684323" y="4073238"/>
             <a:ext cx="0" cy="1542471"/>
           </a:xfrm>
           <a:prstGeom prst="line">
@@ -5333,7 +5547,7 @@
         </p:nvCxnSpPr>
         <p:spPr>
           <a:xfrm>
-            <a:off x="4895267" y="5061530"/>
+            <a:off x="4895267" y="5615709"/>
             <a:ext cx="4789056" cy="0"/>
           </a:xfrm>
           <a:prstGeom prst="line">
@@ -5368,7 +5582,7 @@
         </p:nvSpPr>
         <p:spPr>
           <a:xfrm>
-            <a:off x="9684323" y="3593041"/>
+            <a:off x="9684323" y="4147220"/>
             <a:ext cx="835895" cy="646331"/>
           </a:xfrm>
           <a:prstGeom prst="rect">
@@ -5409,7 +5623,7 @@
         </p:nvSpPr>
         <p:spPr>
           <a:xfrm>
-            <a:off x="8058361" y="3149755"/>
+            <a:off x="8058361" y="3703934"/>
             <a:ext cx="660758" cy="276999"/>
           </a:xfrm>
           <a:prstGeom prst="rect">
@@ -5439,7 +5653,7 @@
         </p:nvSpPr>
         <p:spPr>
           <a:xfrm>
-            <a:off x="7128159" y="3592795"/>
+            <a:off x="7128159" y="4146974"/>
             <a:ext cx="94672" cy="311881"/>
           </a:xfrm>
           <a:prstGeom prst="rect">
@@ -5484,7 +5698,7 @@
         </p:nvCxnSpPr>
         <p:spPr>
           <a:xfrm>
-            <a:off x="7177798" y="4366296"/>
+            <a:off x="7177798" y="4920475"/>
             <a:ext cx="0" cy="203445"/>
           </a:xfrm>
           <a:prstGeom prst="line">
@@ -5519,7 +5733,7 @@
         </p:nvCxnSpPr>
         <p:spPr>
           <a:xfrm>
-            <a:off x="7069272" y="4569741"/>
+            <a:off x="7069272" y="5123920"/>
             <a:ext cx="203198" cy="0"/>
           </a:xfrm>
           <a:prstGeom prst="line">
@@ -5557,7 +5771,7 @@
         </p:nvCxnSpPr>
         <p:spPr>
           <a:xfrm>
-            <a:off x="7175495" y="3592795"/>
+            <a:off x="7175495" y="4146974"/>
             <a:ext cx="0" cy="0"/>
           </a:xfrm>
           <a:prstGeom prst="line">
@@ -5587,7 +5801,7 @@
         </p:nvCxnSpPr>
         <p:spPr>
           <a:xfrm>
-            <a:off x="7170871" y="3395522"/>
+            <a:off x="7170871" y="3949701"/>
             <a:ext cx="1541800" cy="0"/>
           </a:xfrm>
           <a:prstGeom prst="line">
@@ -5624,7 +5838,7 @@
         </p:nvCxnSpPr>
         <p:spPr>
           <a:xfrm>
-            <a:off x="7170871" y="3395522"/>
+            <a:off x="7170871" y="3949701"/>
             <a:ext cx="4624" cy="197273"/>
           </a:xfrm>
           <a:prstGeom prst="line">
@@ -5659,7 +5873,7 @@
         </p:nvSpPr>
         <p:spPr>
           <a:xfrm>
-            <a:off x="7130462" y="4046781"/>
+            <a:off x="7130462" y="4600960"/>
             <a:ext cx="94672" cy="311881"/>
           </a:xfrm>
           <a:prstGeom prst="rect">
@@ -5707,7 +5921,7 @@
         </p:nvCxnSpPr>
         <p:spPr>
           <a:xfrm>
-            <a:off x="7175495" y="3904676"/>
+            <a:off x="7175495" y="4458855"/>
             <a:ext cx="2303" cy="142105"/>
           </a:xfrm>
           <a:prstGeom prst="line">
@@ -5737,7 +5951,7 @@
         </p:nvCxnSpPr>
         <p:spPr>
           <a:xfrm flipH="1" flipV="1">
-            <a:off x="5981118" y="3962711"/>
+            <a:off x="5981118" y="4516890"/>
             <a:ext cx="1189753" cy="8927"/>
           </a:xfrm>
           <a:prstGeom prst="line">
@@ -5772,7 +5986,7 @@
         </p:nvCxnSpPr>
         <p:spPr>
           <a:xfrm flipV="1">
-            <a:off x="5977467" y="3516975"/>
+            <a:off x="5977467" y="4071154"/>
             <a:ext cx="1533" cy="452435"/>
           </a:xfrm>
           <a:prstGeom prst="line">
@@ -5807,7 +6021,7 @@
         </p:nvSpPr>
         <p:spPr>
           <a:xfrm>
-            <a:off x="5912610" y="3509728"/>
+            <a:off x="5912610" y="4063907"/>
             <a:ext cx="844733" cy="276999"/>
           </a:xfrm>
           <a:prstGeom prst="rect">
@@ -5837,7 +6051,7 @@
         </p:nvSpPr>
         <p:spPr>
           <a:xfrm>
-            <a:off x="7223817" y="3592795"/>
+            <a:off x="7223817" y="4146974"/>
             <a:ext cx="1195729" cy="276999"/>
           </a:xfrm>
           <a:prstGeom prst="rect">
@@ -5867,7 +6081,7 @@
         </p:nvSpPr>
         <p:spPr>
           <a:xfrm>
-            <a:off x="7222831" y="4091713"/>
+            <a:off x="7222831" y="4645892"/>
             <a:ext cx="1195729" cy="276999"/>
           </a:xfrm>
           <a:prstGeom prst="rect">
@@ -5897,7 +6111,7 @@
         </p:nvSpPr>
         <p:spPr>
           <a:xfrm>
-            <a:off x="4927143" y="3566082"/>
+            <a:off x="4927143" y="4120261"/>
             <a:ext cx="352586" cy="461665"/>
           </a:xfrm>
           <a:prstGeom prst="rect">
@@ -5934,7 +6148,7 @@
         </p:nvSpPr>
         <p:spPr>
           <a:xfrm>
-            <a:off x="5307491" y="3533927"/>
+            <a:off x="5307491" y="4088106"/>
             <a:ext cx="488325" cy="461665"/>
           </a:xfrm>
           <a:prstGeom prst="rect">
@@ -5971,7 +6185,7 @@
         </p:nvCxnSpPr>
         <p:spPr>
           <a:xfrm>
-            <a:off x="5279729" y="3533927"/>
+            <a:off x="5279729" y="4088106"/>
             <a:ext cx="0" cy="1035814"/>
           </a:xfrm>
           <a:prstGeom prst="line">
@@ -6006,7 +6220,7 @@
         </p:nvCxnSpPr>
         <p:spPr>
           <a:xfrm>
-            <a:off x="5178130" y="4569741"/>
+            <a:off x="5178130" y="5123920"/>
             <a:ext cx="203198" cy="0"/>
           </a:xfrm>
           <a:prstGeom prst="line">
@@ -6041,7 +6255,7 @@
         </p:nvCxnSpPr>
         <p:spPr>
           <a:xfrm>
-            <a:off x="3271245" y="4809067"/>
+            <a:off x="3271245" y="5363246"/>
             <a:ext cx="203198" cy="0"/>
           </a:xfrm>
           <a:prstGeom prst="line">
@@ -6079,7 +6293,7 @@
         </p:nvCxnSpPr>
         <p:spPr>
           <a:xfrm>
-            <a:off x="2589328" y="4283414"/>
+            <a:off x="2589328" y="4837593"/>
             <a:ext cx="0" cy="0"/>
           </a:xfrm>
           <a:prstGeom prst="line">
@@ -6111,7 +6325,7 @@
         </p:nvCxnSpPr>
         <p:spPr>
           <a:xfrm flipH="1" flipV="1">
-            <a:off x="2116667" y="4283413"/>
+            <a:off x="2116667" y="4837592"/>
             <a:ext cx="472661" cy="1"/>
           </a:xfrm>
           <a:prstGeom prst="line">
@@ -6146,7 +6360,7 @@
         </p:nvSpPr>
         <p:spPr>
           <a:xfrm>
-            <a:off x="1879092" y="4009690"/>
+            <a:off x="1879092" y="4563869"/>
             <a:ext cx="822316" cy="276999"/>
           </a:xfrm>
           <a:prstGeom prst="rect">
@@ -6176,7 +6390,7 @@
         </p:nvCxnSpPr>
         <p:spPr>
           <a:xfrm>
-            <a:off x="9252857" y="3516975"/>
+            <a:off x="9252857" y="4071154"/>
             <a:ext cx="10886" cy="1218311"/>
           </a:xfrm>
           <a:prstGeom prst="line">
@@ -6211,7 +6425,7 @@
         </p:nvCxnSpPr>
         <p:spPr>
           <a:xfrm flipH="1">
-            <a:off x="5698595" y="3516975"/>
+            <a:off x="5698595" y="4071154"/>
             <a:ext cx="6957" cy="1231379"/>
           </a:xfrm>
           <a:prstGeom prst="line">
@@ -6246,7 +6460,7 @@
         </p:nvCxnSpPr>
         <p:spPr>
           <a:xfrm flipV="1">
-            <a:off x="5693229" y="4724400"/>
+            <a:off x="5693229" y="5278579"/>
             <a:ext cx="3570514" cy="10886"/>
           </a:xfrm>
           <a:prstGeom prst="line">
@@ -6281,7 +6495,7 @@
         </p:nvSpPr>
         <p:spPr>
           <a:xfrm>
-            <a:off x="8690330" y="3463561"/>
+            <a:off x="8690330" y="4017740"/>
             <a:ext cx="662661" cy="369332"/>
           </a:xfrm>
           <a:prstGeom prst="rect">
@@ -6315,7 +6529,7 @@
         </p:nvCxnSpPr>
         <p:spPr>
           <a:xfrm flipH="1" flipV="1">
-            <a:off x="5380567" y="1925903"/>
+            <a:off x="5380567" y="2480082"/>
             <a:ext cx="487303" cy="1"/>
           </a:xfrm>
           <a:prstGeom prst="line">
@@ -6350,7 +6564,7 @@
         </p:nvCxnSpPr>
         <p:spPr>
           <a:xfrm>
-            <a:off x="5381328" y="1927432"/>
+            <a:off x="5381328" y="2481611"/>
             <a:ext cx="0" cy="95411"/>
           </a:xfrm>
           <a:prstGeom prst="line">
@@ -6385,7 +6599,7 @@
         </p:nvCxnSpPr>
         <p:spPr>
           <a:xfrm>
-            <a:off x="5279729" y="2021313"/>
+            <a:off x="5279729" y="2575492"/>
             <a:ext cx="203198" cy="0"/>
           </a:xfrm>
           <a:prstGeom prst="line">
@@ -6420,7 +6634,7 @@
         </p:nvCxnSpPr>
         <p:spPr>
           <a:xfrm>
-            <a:off x="5867870" y="1925903"/>
+            <a:off x="5867870" y="2480082"/>
             <a:ext cx="0" cy="323031"/>
           </a:xfrm>
           <a:prstGeom prst="line">
@@ -6455,7 +6669,7 @@
         </p:nvSpPr>
         <p:spPr>
           <a:xfrm>
-            <a:off x="6119443" y="2549271"/>
+            <a:off x="6119443" y="3103450"/>
             <a:ext cx="969818" cy="276999"/>
           </a:xfrm>
           <a:prstGeom prst="rect">
@@ -6485,7 +6699,7 @@
         </p:nvSpPr>
         <p:spPr>
           <a:xfrm>
-            <a:off x="6116967" y="2879285"/>
+            <a:off x="6116967" y="3433464"/>
             <a:ext cx="969818" cy="276999"/>
           </a:xfrm>
           <a:prstGeom prst="rect">
@@ -6515,7 +6729,7 @@
         </p:nvCxnSpPr>
         <p:spPr>
           <a:xfrm>
-            <a:off x="6158341" y="3112168"/>
+            <a:off x="6158341" y="3666347"/>
             <a:ext cx="2560778" cy="4011"/>
           </a:xfrm>
           <a:prstGeom prst="line">
@@ -6550,7 +6764,7 @@
         </p:nvSpPr>
         <p:spPr>
           <a:xfrm>
-            <a:off x="8156083" y="2871863"/>
+            <a:off x="8156083" y="3426042"/>
             <a:ext cx="591829" cy="276999"/>
           </a:xfrm>
           <a:prstGeom prst="rect">
@@ -6582,7 +6796,7 @@
         </p:nvCxnSpPr>
         <p:spPr>
           <a:xfrm>
-            <a:off x="3372844" y="4569741"/>
+            <a:off x="3372844" y="5123920"/>
             <a:ext cx="0" cy="239326"/>
           </a:xfrm>
           <a:prstGeom prst="line">
@@ -6617,8 +6831,8 @@
         </p:nvSpPr>
         <p:spPr>
           <a:xfrm>
-            <a:off x="726080" y="5525674"/>
-            <a:ext cx="1138385" cy="527993"/>
+            <a:off x="8227803" y="6152160"/>
+            <a:ext cx="3748933" cy="527993"/>
           </a:xfrm>
           <a:prstGeom prst="rect">
             <a:avLst/>
@@ -6647,7 +6861,56 @@
             <a:pPr algn="ctr"/>
             <a:r>
               <a:rPr lang="it-IT" dirty="0" smtClean="0"/>
-              <a:t>TEST_AP</a:t>
+              <a:t>TEST ACCESS POINT</a:t>
+            </a:r>
+            <a:br>
+              <a:rPr lang="it-IT" dirty="0" smtClean="0"/>
+            </a:br>
+            <a:r>
+              <a:rPr lang="it-IT" dirty="0" smtClean="0"/>
+              <a:t>SSID «TEST_AP» PWD «12345678» </a:t>
+            </a:r>
+            <a:endParaRPr lang="it-IT" dirty="0"/>
+          </a:p>
+        </p:txBody>
+      </p:sp>
+      <p:sp>
+        <p:nvSpPr>
+          <p:cNvPr id="2" name="CasellaDiTesto 1"/>
+          <p:cNvSpPr txBox="1"/>
+          <p:nvPr/>
+        </p:nvSpPr>
+        <p:spPr>
+          <a:xfrm>
+            <a:off x="166255" y="101600"/>
+            <a:ext cx="7892106" cy="369332"/>
+          </a:xfrm>
+          <a:prstGeom prst="rect">
+            <a:avLst/>
+          </a:prstGeom>
+          <a:noFill/>
+        </p:spPr>
+        <p:txBody>
+          <a:bodyPr wrap="square" rtlCol="0">
+            <a:spAutoFit/>
+          </a:bodyPr>
+          <a:lstStyle/>
+          <a:p>
+            <a:r>
+              <a:rPr lang="it-IT" dirty="0" smtClean="0"/>
+              <a:t>Test HW </a:t>
+            </a:r>
+            <a:r>
+              <a:rPr lang="it-IT" dirty="0" err="1" smtClean="0"/>
+              <a:t>block</a:t>
+            </a:r>
+            <a:r>
+              <a:rPr lang="it-IT" dirty="0" smtClean="0"/>
+              <a:t> </a:t>
+            </a:r>
+            <a:r>
+              <a:rPr lang="it-IT" dirty="0" err="1" smtClean="0"/>
+              <a:t>diagram</a:t>
             </a:r>
             <a:endParaRPr lang="it-IT" dirty="0"/>
           </a:p>
@@ -7853,7 +8116,7 @@
         <p:spPr>
           <a:xfrm>
             <a:off x="83127" y="665018"/>
-            <a:ext cx="11933382" cy="3693319"/>
+            <a:ext cx="11933382" cy="3970318"/>
           </a:xfrm>
           <a:prstGeom prst="rect">
             <a:avLst/>
@@ -7868,7 +8131,15 @@
           <a:p>
             <a:r>
               <a:rPr lang="en-US" dirty="0" smtClean="0"/>
-              <a:t>The GME have a test FW inside, if during the power on, the test point TP5  is connected to ground the GME start in test mode.</a:t>
+              <a:t>The GME have a test FW inside, if during the power </a:t>
+            </a:r>
+            <a:r>
+              <a:rPr lang="en-US" dirty="0" smtClean="0"/>
+              <a:t>on or a reset, </a:t>
+            </a:r>
+            <a:r>
+              <a:rPr lang="en-US" dirty="0" smtClean="0"/>
+              <a:t>the test point TP5  is connected to ground the GME start in test mode.</a:t>
             </a:r>
             <a:br>
               <a:rPr lang="en-US" dirty="0" smtClean="0"/>
@@ -9044,11 +9315,19 @@
           <a:p>
             <a:r>
               <a:rPr lang="it-IT" dirty="0" smtClean="0"/>
-              <a:t>SW </a:t>
+              <a:t>H</a:t>
+            </a:r>
+            <a:r>
+              <a:rPr lang="it-IT" dirty="0" smtClean="0"/>
+              <a:t>W </a:t>
             </a:r>
             <a:r>
               <a:rPr lang="it-IT" dirty="0" err="1" smtClean="0"/>
-              <a:t>Prerequisite</a:t>
+              <a:t>Pre</a:t>
+            </a:r>
+            <a:r>
+              <a:rPr lang="it-IT" dirty="0" smtClean="0"/>
+              <a:t>-requisite</a:t>
             </a:r>
             <a:endParaRPr lang="it-IT" dirty="0"/>
           </a:p>
@@ -9063,7 +9342,7 @@
         <p:spPr>
           <a:xfrm>
             <a:off x="175491" y="600364"/>
-            <a:ext cx="11914909" cy="3539430"/>
+            <a:ext cx="11914909" cy="5016758"/>
           </a:xfrm>
           <a:prstGeom prst="rect">
             <a:avLst/>
@@ -9078,27 +9357,19 @@
           <a:p>
             <a:r>
               <a:rPr lang="it-IT" sz="1600" dirty="0" smtClean="0"/>
-              <a:t>In </a:t>
+              <a:t>To </a:t>
             </a:r>
             <a:r>
               <a:rPr lang="it-IT" sz="1600" dirty="0" err="1" smtClean="0"/>
-              <a:t>order</a:t>
+              <a:t>program</a:t>
             </a:r>
             <a:r>
               <a:rPr lang="it-IT" sz="1600" dirty="0" smtClean="0"/>
-              <a:t> to </a:t>
+              <a:t> the Arduino </a:t>
             </a:r>
             <a:r>
               <a:rPr lang="it-IT" sz="1600" dirty="0" err="1" smtClean="0"/>
-              <a:t>run</a:t>
-            </a:r>
-            <a:r>
-              <a:rPr lang="it-IT" sz="1600" dirty="0" smtClean="0"/>
-              <a:t> the SW the </a:t>
-            </a:r>
-            <a:r>
-              <a:rPr lang="it-IT" sz="1600" dirty="0" err="1" smtClean="0"/>
-              <a:t>following</a:t>
+              <a:t>board</a:t>
             </a:r>
             <a:r>
               <a:rPr lang="it-IT" sz="1600" dirty="0" smtClean="0"/>
@@ -9106,54 +9377,27 @@
             </a:r>
             <a:r>
               <a:rPr lang="it-IT" sz="1600" dirty="0" err="1" smtClean="0"/>
-              <a:t>prerequisite</a:t>
+              <a:t>install</a:t>
             </a:r>
             <a:r>
               <a:rPr lang="it-IT" sz="1600" dirty="0" smtClean="0"/>
-              <a:t> are </a:t>
+              <a:t> the Arduino IDE </a:t>
             </a:r>
             <a:r>
               <a:rPr lang="it-IT" sz="1600" dirty="0" err="1" smtClean="0"/>
-              <a:t>needed</a:t>
-            </a:r>
-            <a:endParaRPr lang="it-IT" sz="1600" dirty="0" smtClean="0"/>
-          </a:p>
-          <a:p>
-            <a:endParaRPr lang="it-IT" sz="1600" dirty="0" smtClean="0"/>
-          </a:p>
-          <a:p>
+              <a:t>at</a:t>
+            </a:r>
+            <a:r>
+              <a:rPr lang="it-IT" sz="1600" dirty="0" smtClean="0"/>
+              <a:t> </a:t>
+            </a:r>
             <a:r>
               <a:rPr lang="it-IT" sz="1600" dirty="0" err="1" smtClean="0"/>
-              <a:t>Modbus_PC_Simulator</a:t>
-            </a:r>
-            <a:endParaRPr lang="it-IT" sz="1600" dirty="0" smtClean="0"/>
-          </a:p>
-          <a:p>
+              <a:t>this</a:t>
+            </a:r>
             <a:r>
               <a:rPr lang="it-IT" sz="1600" dirty="0" smtClean="0"/>
-              <a:t>- </a:t>
-            </a:r>
-            <a:r>
-              <a:rPr lang="it-IT" sz="1600" dirty="0" err="1" smtClean="0"/>
-              <a:t>Python</a:t>
-            </a:r>
-            <a:r>
-              <a:rPr lang="it-IT" sz="1600" dirty="0" smtClean="0"/>
-              <a:t> V.2.7.x</a:t>
-            </a:r>
-          </a:p>
-          <a:p>
-            <a:r>
-              <a:rPr lang="it-IT" sz="1600" dirty="0" smtClean="0"/>
-              <a:t>- </a:t>
-            </a:r>
-            <a:r>
-              <a:rPr lang="it-IT" sz="1600" dirty="0" err="1" smtClean="0"/>
-              <a:t>pymodbus</a:t>
-            </a:r>
-            <a:r>
-              <a:rPr lang="it-IT" sz="1600" dirty="0" smtClean="0"/>
-              <a:t> (</a:t>
+              <a:t> link </a:t>
             </a:r>
             <a:r>
               <a:rPr lang="it-IT" sz="1600" dirty="0" smtClean="0">
@@ -9171,89 +9415,166 @@
               <a:rPr lang="it-IT" sz="1600" dirty="0" smtClean="0">
                 <a:hlinkClick r:id="rId2"/>
               </a:rPr>
-              <a:t>pymodbus.readthedocs.io/en/latest/readme.html#installing</a:t>
+              <a:t>www.arduino.cc/en/main/software</a:t>
             </a:r>
             <a:r>
               <a:rPr lang="it-IT" sz="1600" dirty="0" smtClean="0"/>
-              <a:t>)</a:t>
-            </a:r>
-          </a:p>
-          <a:p>
-            <a:r>
+              <a:t/>
+            </a:r>
+            <a:br>
               <a:rPr lang="it-IT" sz="1600" dirty="0" smtClean="0"/>
-              <a:t>- </a:t>
+            </a:br>
+            <a:r>
+              <a:rPr lang="it-IT" sz="1600" dirty="0" smtClean="0"/>
+              <a:t>and </a:t>
             </a:r>
             <a:r>
               <a:rPr lang="it-IT" sz="1600" dirty="0" err="1" smtClean="0"/>
-              <a:t>pyserial</a:t>
+              <a:t>follow</a:t>
             </a:r>
             <a:r>
               <a:rPr lang="it-IT" sz="1600" dirty="0" smtClean="0"/>
               <a:t> </a:t>
             </a:r>
             <a:r>
-              <a:rPr lang="it-IT" sz="1600" dirty="0"/>
-              <a:t>(</a:t>
-            </a:r>
-            <a:r>
-              <a:rPr lang="it-IT" sz="1600" dirty="0">
-                <a:hlinkClick r:id="rId3"/>
-              </a:rPr>
-              <a:t>https://pypi.org/project/pyserial</a:t>
-            </a:r>
-            <a:r>
-              <a:rPr lang="it-IT" sz="1600" dirty="0" smtClean="0">
-                <a:hlinkClick r:id="rId3"/>
-              </a:rPr>
-              <a:t>/</a:t>
+              <a:rPr lang="it-IT" sz="1600" dirty="0" err="1" smtClean="0"/>
+              <a:t>this</a:t>
             </a:r>
             <a:r>
               <a:rPr lang="it-IT" sz="1600" dirty="0" smtClean="0"/>
-              <a:t>)</a:t>
-            </a:r>
-          </a:p>
-          <a:p>
+              <a:t> </a:t>
+            </a:r>
+            <a:r>
+              <a:rPr lang="it-IT" sz="1600" dirty="0" err="1" smtClean="0"/>
+              <a:t>steps</a:t>
+            </a:r>
             <a:endParaRPr lang="it-IT" sz="1600" dirty="0" smtClean="0"/>
           </a:p>
           <a:p>
-            <a:r>
-              <a:rPr lang="it-IT" sz="1600" dirty="0" err="1" smtClean="0"/>
-              <a:t>CAREL_GME_Test</a:t>
-            </a:r>
-            <a:endParaRPr lang="it-IT" sz="1600" dirty="0" smtClean="0"/>
-          </a:p>
-          <a:p>
-            <a:r>
-              <a:rPr lang="it-IT" sz="1600" dirty="0" smtClean="0"/>
-              <a:t>- </a:t>
-            </a:r>
+            <a:pPr marL="285750" indent="-285750">
+              <a:buFontTx/>
+              <a:buChar char="-"/>
+            </a:pPr>
             <a:r>
               <a:rPr lang="it-IT" sz="1600" dirty="0" err="1" smtClean="0"/>
               <a:t>Launch</a:t>
             </a:r>
             <a:r>
               <a:rPr lang="it-IT" sz="1600" dirty="0" smtClean="0"/>
-              <a:t> the </a:t>
-            </a:r>
+              <a:t> the Arduino IDE </a:t>
+            </a:r>
+          </a:p>
+          <a:p>
+            <a:pPr marL="285750" indent="-285750">
+              <a:buFontTx/>
+              <a:buChar char="-"/>
+            </a:pPr>
+            <a:r>
+              <a:rPr lang="it-IT" sz="1600" dirty="0"/>
+              <a:t>File &gt; Open the file &gt; </a:t>
+            </a:r>
+            <a:r>
+              <a:rPr lang="it-IT" sz="1600" dirty="0" smtClean="0"/>
+              <a:t>C780_HW_Test_Arduino_FW.ino</a:t>
+            </a:r>
+          </a:p>
+          <a:p>
+            <a:pPr marL="285750" indent="-285750">
+              <a:buFontTx/>
+              <a:buChar char="-"/>
+            </a:pPr>
             <a:r>
               <a:rPr lang="it-IT" sz="1600" dirty="0" err="1" smtClean="0"/>
-              <a:t>program</a:t>
+              <a:t>Choose</a:t>
             </a:r>
             <a:r>
               <a:rPr lang="it-IT" sz="1600" dirty="0" smtClean="0"/>
-              <a:t> and download and </a:t>
-            </a:r>
-            <a:r>
-              <a:rPr lang="it-IT" sz="1600" smtClean="0"/>
-              <a:t>install</a:t>
+              <a:t> on  Port &gt; the serial </a:t>
+            </a:r>
+            <a:r>
+              <a:rPr lang="it-IT" sz="1600" dirty="0" err="1" smtClean="0"/>
+              <a:t>port</a:t>
             </a:r>
             <a:r>
               <a:rPr lang="it-IT" sz="1600" dirty="0" smtClean="0"/>
-              <a:t> the .NET </a:t>
+              <a:t> of the Arduino Uno </a:t>
             </a:r>
             <a:r>
               <a:rPr lang="it-IT" sz="1600" dirty="0" err="1" smtClean="0"/>
-              <a:t>Framwork</a:t>
+              <a:t>board</a:t>
+            </a:r>
+            <a:endParaRPr lang="it-IT" sz="1600" dirty="0" smtClean="0"/>
+          </a:p>
+          <a:p>
+            <a:pPr marL="285750" indent="-285750">
+              <a:buFontTx/>
+              <a:buChar char="-"/>
+            </a:pPr>
+            <a:r>
+              <a:rPr lang="it-IT" sz="1600" dirty="0" err="1" smtClean="0"/>
+              <a:t>Choose</a:t>
+            </a:r>
+            <a:r>
+              <a:rPr lang="it-IT" sz="1600" dirty="0" smtClean="0"/>
+              <a:t> from Board &gt; «Arduino/Genuino Uno» [</a:t>
+            </a:r>
+            <a:r>
+              <a:rPr lang="it-IT" sz="1600" dirty="0" err="1" smtClean="0"/>
+              <a:t>normally</a:t>
+            </a:r>
+            <a:r>
+              <a:rPr lang="it-IT" sz="1600" dirty="0" smtClean="0"/>
+              <a:t> the default]</a:t>
+            </a:r>
+          </a:p>
+          <a:p>
+            <a:pPr marL="285750" indent="-285750">
+              <a:buFontTx/>
+              <a:buChar char="-"/>
+            </a:pPr>
+            <a:r>
+              <a:rPr lang="it-IT" sz="1600" dirty="0" smtClean="0"/>
+              <a:t>Press the </a:t>
+            </a:r>
+            <a:r>
+              <a:rPr lang="it-IT" sz="1600" dirty="0" err="1" smtClean="0"/>
+              <a:t>button</a:t>
+            </a:r>
+            <a:r>
+              <a:rPr lang="it-IT" sz="1600" dirty="0" smtClean="0"/>
+              <a:t>		</a:t>
+            </a:r>
+          </a:p>
+          <a:p>
+            <a:pPr marL="285750" indent="-285750">
+              <a:buFontTx/>
+              <a:buChar char="-"/>
+            </a:pPr>
+            <a:r>
+              <a:rPr lang="it-IT" sz="1600" dirty="0" err="1" smtClean="0"/>
+              <a:t>Wait</a:t>
+            </a:r>
+            <a:r>
+              <a:rPr lang="it-IT" sz="1600" dirty="0" smtClean="0"/>
+              <a:t> the End of the </a:t>
+            </a:r>
+            <a:r>
+              <a:rPr lang="it-IT" sz="1600" dirty="0" err="1" smtClean="0"/>
+              <a:t>operation</a:t>
+            </a:r>
+            <a:endParaRPr lang="it-IT" sz="1600" dirty="0" smtClean="0"/>
+          </a:p>
+          <a:p>
+            <a:endParaRPr lang="it-IT" sz="1600" dirty="0" smtClean="0"/>
+          </a:p>
+          <a:p>
+            <a:r>
+              <a:rPr lang="it-IT" sz="1600" dirty="0" smtClean="0"/>
+              <a:t>To </a:t>
+            </a:r>
+            <a:r>
+              <a:rPr lang="it-IT" sz="1600" dirty="0" err="1" smtClean="0"/>
+              <a:t>quick</a:t>
             </a:r>
             <a:r>
               <a:rPr lang="it-IT" sz="1600" dirty="0" smtClean="0"/>
@@ -9261,12 +9582,176 @@
             </a:r>
             <a:r>
               <a:rPr lang="it-IT" sz="1600" dirty="0" err="1" smtClean="0"/>
-              <a:t>requested</a:t>
+              <a:t>check</a:t>
             </a:r>
             <a:r>
               <a:rPr lang="it-IT" sz="1600" dirty="0" smtClean="0"/>
               <a:t> </a:t>
             </a:r>
+            <a:r>
+              <a:rPr lang="it-IT" sz="1600" dirty="0" err="1" smtClean="0"/>
+              <a:t>if</a:t>
+            </a:r>
+            <a:r>
+              <a:rPr lang="it-IT" sz="1600" dirty="0" smtClean="0"/>
+              <a:t> the </a:t>
+            </a:r>
+            <a:r>
+              <a:rPr lang="it-IT" sz="1600" dirty="0" err="1" smtClean="0"/>
+              <a:t>board</a:t>
+            </a:r>
+            <a:r>
+              <a:rPr lang="it-IT" sz="1600" dirty="0" smtClean="0"/>
+              <a:t> </a:t>
+            </a:r>
+            <a:r>
+              <a:rPr lang="it-IT" sz="1600" dirty="0" err="1" smtClean="0"/>
+              <a:t>is</a:t>
+            </a:r>
+            <a:r>
+              <a:rPr lang="it-IT" sz="1600" dirty="0" smtClean="0"/>
+              <a:t> </a:t>
+            </a:r>
+            <a:r>
+              <a:rPr lang="it-IT" sz="1600" dirty="0" err="1" smtClean="0"/>
+              <a:t>programmed</a:t>
+            </a:r>
+            <a:r>
+              <a:rPr lang="it-IT" sz="1600" dirty="0" smtClean="0"/>
+              <a:t> right :</a:t>
+            </a:r>
+          </a:p>
+          <a:p>
+            <a:pPr marL="285750" indent="-285750">
+              <a:buFontTx/>
+              <a:buChar char="-"/>
+            </a:pPr>
+            <a:r>
+              <a:rPr lang="it-IT" sz="1600" dirty="0" smtClean="0"/>
+              <a:t>Press the </a:t>
+            </a:r>
+            <a:r>
+              <a:rPr lang="it-IT" sz="1600" dirty="0" err="1" smtClean="0"/>
+              <a:t>button</a:t>
+            </a:r>
+            <a:endParaRPr lang="it-IT" sz="1600" dirty="0" smtClean="0"/>
+          </a:p>
+          <a:p>
+            <a:pPr marL="285750" indent="-285750">
+              <a:buFontTx/>
+              <a:buChar char="-"/>
+            </a:pPr>
+            <a:r>
+              <a:rPr lang="it-IT" sz="1600" dirty="0" smtClean="0"/>
+              <a:t>A terminal </a:t>
+            </a:r>
+            <a:r>
+              <a:rPr lang="it-IT" sz="1600" dirty="0" err="1" smtClean="0"/>
+              <a:t>appear</a:t>
+            </a:r>
+            <a:r>
+              <a:rPr lang="it-IT" sz="1600" dirty="0" smtClean="0"/>
+              <a:t> </a:t>
+            </a:r>
+            <a:r>
+              <a:rPr lang="it-IT" sz="1600" dirty="0" err="1" smtClean="0"/>
+              <a:t>check</a:t>
+            </a:r>
+            <a:r>
+              <a:rPr lang="it-IT" sz="1600" dirty="0" smtClean="0"/>
+              <a:t> </a:t>
+            </a:r>
+            <a:r>
+              <a:rPr lang="it-IT" sz="1600" dirty="0" err="1" smtClean="0"/>
+              <a:t>at</a:t>
+            </a:r>
+            <a:r>
+              <a:rPr lang="it-IT" sz="1600" dirty="0" smtClean="0"/>
+              <a:t> the botton of the </a:t>
+            </a:r>
+            <a:r>
+              <a:rPr lang="it-IT" sz="1600" dirty="0" err="1" smtClean="0"/>
+              <a:t>window</a:t>
+            </a:r>
+            <a:r>
+              <a:rPr lang="it-IT" sz="1600" dirty="0" smtClean="0"/>
+              <a:t> </a:t>
+            </a:r>
+            <a:r>
+              <a:rPr lang="it-IT" sz="1600" dirty="0" err="1" smtClean="0"/>
+              <a:t>that</a:t>
+            </a:r>
+            <a:r>
+              <a:rPr lang="it-IT" sz="1600" dirty="0" smtClean="0"/>
+              <a:t> the </a:t>
+            </a:r>
+            <a:r>
+              <a:rPr lang="it-IT" sz="1600" dirty="0" err="1" smtClean="0"/>
+              <a:t>baudrate</a:t>
+            </a:r>
+            <a:r>
+              <a:rPr lang="it-IT" sz="1600" dirty="0" smtClean="0"/>
+              <a:t> </a:t>
+            </a:r>
+            <a:r>
+              <a:rPr lang="it-IT" sz="1600" dirty="0" err="1" smtClean="0"/>
+              <a:t>is</a:t>
+            </a:r>
+            <a:r>
+              <a:rPr lang="it-IT" sz="1600" dirty="0" smtClean="0"/>
+              <a:t> 115200</a:t>
+            </a:r>
+          </a:p>
+          <a:p>
+            <a:pPr marL="285750" indent="-285750">
+              <a:buFontTx/>
+              <a:buChar char="-"/>
+            </a:pPr>
+            <a:r>
+              <a:rPr lang="it-IT" sz="1600" dirty="0" smtClean="0"/>
+              <a:t>In the top box </a:t>
+            </a:r>
+            <a:r>
+              <a:rPr lang="it-IT" sz="1600" dirty="0" err="1" smtClean="0"/>
+              <a:t>type</a:t>
+            </a:r>
+            <a:r>
+              <a:rPr lang="it-IT" sz="1600" dirty="0" smtClean="0"/>
+              <a:t> «V» + </a:t>
+            </a:r>
+            <a:r>
+              <a:rPr lang="it-IT" sz="1600" dirty="0" err="1" smtClean="0"/>
+              <a:t>Enter</a:t>
+            </a:r>
+            <a:endParaRPr lang="it-IT" sz="1600" dirty="0" smtClean="0"/>
+          </a:p>
+          <a:p>
+            <a:pPr marL="285750" indent="-285750">
+              <a:buFontTx/>
+              <a:buChar char="-"/>
+            </a:pPr>
+            <a:r>
+              <a:rPr lang="it-IT" sz="1600" dirty="0" smtClean="0"/>
+              <a:t>The </a:t>
+            </a:r>
+            <a:r>
+              <a:rPr lang="it-IT" sz="1600" dirty="0" err="1" smtClean="0"/>
+              <a:t>board</a:t>
+            </a:r>
+            <a:r>
+              <a:rPr lang="it-IT" sz="1600" dirty="0" smtClean="0"/>
+              <a:t> </a:t>
+            </a:r>
+            <a:r>
+              <a:rPr lang="it-IT" sz="1600" dirty="0" err="1" smtClean="0"/>
+              <a:t>respond</a:t>
+            </a:r>
+            <a:r>
+              <a:rPr lang="it-IT" sz="1600" dirty="0" smtClean="0"/>
+              <a:t>  «V=0» </a:t>
+            </a:r>
+          </a:p>
+          <a:p>
             <a:endParaRPr lang="it-IT" sz="1600" dirty="0"/>
           </a:p>
           <a:p>
@@ -9286,6 +9771,54 @@
           </a:p>
         </p:txBody>
       </p:sp>
+      <p:pic>
+        <p:nvPicPr>
+          <p:cNvPr id="2" name="Immagine 1"/>
+          <p:cNvPicPr>
+            <a:picLocks noChangeAspect="1"/>
+          </p:cNvPicPr>
+          <p:nvPr/>
+        </p:nvPicPr>
+        <p:blipFill>
+          <a:blip r:embed="rId3"/>
+          <a:stretch>
+            <a:fillRect/>
+          </a:stretch>
+        </p:blipFill>
+        <p:spPr>
+          <a:xfrm>
+            <a:off x="1970914" y="2128848"/>
+            <a:ext cx="251482" cy="236240"/>
+          </a:xfrm>
+          <a:prstGeom prst="rect">
+            <a:avLst/>
+          </a:prstGeom>
+        </p:spPr>
+      </p:pic>
+      <p:pic>
+        <p:nvPicPr>
+          <p:cNvPr id="3" name="Immagine 2"/>
+          <p:cNvPicPr>
+            <a:picLocks noChangeAspect="1"/>
+          </p:cNvPicPr>
+          <p:nvPr/>
+        </p:nvPicPr>
+        <p:blipFill>
+          <a:blip r:embed="rId4"/>
+          <a:stretch>
+            <a:fillRect/>
+          </a:stretch>
+        </p:blipFill>
+        <p:spPr>
+          <a:xfrm>
+            <a:off x="1970914" y="3108743"/>
+            <a:ext cx="213378" cy="198137"/>
+          </a:xfrm>
+          <a:prstGeom prst="rect">
+            <a:avLst/>
+          </a:prstGeom>
+        </p:spPr>
+      </p:pic>
     </p:spTree>
     <p:extLst>
       <p:ext uri="{BB962C8B-B14F-4D97-AF65-F5344CB8AC3E}">

</xml_diff>

<commit_message>
v.1.3 added complete test sequence and revised some points
</commit_message>
<xml_diff>
--- a/Utility/USR_Test_HW_Support/Documentation/C780_HW_TEST.pptx
+++ b/Utility/USR_Test_HW_Support/Documentation/C780_HW_TEST.pptx
@@ -12,9 +12,9 @@
     <p:sldId id="260" r:id="rId6"/>
     <p:sldId id="261" r:id="rId7"/>
     <p:sldId id="262" r:id="rId8"/>
-    <p:sldId id="257" r:id="rId9"/>
-    <p:sldId id="264" r:id="rId10"/>
-    <p:sldId id="265" r:id="rId11"/>
+    <p:sldId id="264" r:id="rId9"/>
+    <p:sldId id="265" r:id="rId10"/>
+    <p:sldId id="257" r:id="rId11"/>
   </p:sldIdLst>
   <p:sldSz cx="12192000" cy="6858000"/>
   <p:notesSz cx="6797675" cy="9926638"/>
@@ -252,7 +252,7 @@
           <a:p>
             <a:fld id="{31921840-1B76-44BB-98DD-5857A1343252}" type="datetimeFigureOut">
               <a:rPr lang="it-IT" smtClean="0"/>
-              <a:t>02/07/2020</a:t>
+              <a:t>07/07/2020</a:t>
             </a:fld>
             <a:endParaRPr lang="it-IT"/>
           </a:p>
@@ -422,7 +422,7 @@
           <a:p>
             <a:fld id="{31921840-1B76-44BB-98DD-5857A1343252}" type="datetimeFigureOut">
               <a:rPr lang="it-IT" smtClean="0"/>
-              <a:t>02/07/2020</a:t>
+              <a:t>07/07/2020</a:t>
             </a:fld>
             <a:endParaRPr lang="it-IT"/>
           </a:p>
@@ -602,7 +602,7 @@
           <a:p>
             <a:fld id="{31921840-1B76-44BB-98DD-5857A1343252}" type="datetimeFigureOut">
               <a:rPr lang="it-IT" smtClean="0"/>
-              <a:t>02/07/2020</a:t>
+              <a:t>07/07/2020</a:t>
             </a:fld>
             <a:endParaRPr lang="it-IT"/>
           </a:p>
@@ -772,7 +772,7 @@
           <a:p>
             <a:fld id="{31921840-1B76-44BB-98DD-5857A1343252}" type="datetimeFigureOut">
               <a:rPr lang="it-IT" smtClean="0"/>
-              <a:t>02/07/2020</a:t>
+              <a:t>07/07/2020</a:t>
             </a:fld>
             <a:endParaRPr lang="it-IT"/>
           </a:p>
@@ -1018,7 +1018,7 @@
           <a:p>
             <a:fld id="{31921840-1B76-44BB-98DD-5857A1343252}" type="datetimeFigureOut">
               <a:rPr lang="it-IT" smtClean="0"/>
-              <a:t>02/07/2020</a:t>
+              <a:t>07/07/2020</a:t>
             </a:fld>
             <a:endParaRPr lang="it-IT"/>
           </a:p>
@@ -1250,7 +1250,7 @@
           <a:p>
             <a:fld id="{31921840-1B76-44BB-98DD-5857A1343252}" type="datetimeFigureOut">
               <a:rPr lang="it-IT" smtClean="0"/>
-              <a:t>02/07/2020</a:t>
+              <a:t>07/07/2020</a:t>
             </a:fld>
             <a:endParaRPr lang="it-IT"/>
           </a:p>
@@ -1617,7 +1617,7 @@
           <a:p>
             <a:fld id="{31921840-1B76-44BB-98DD-5857A1343252}" type="datetimeFigureOut">
               <a:rPr lang="it-IT" smtClean="0"/>
-              <a:t>02/07/2020</a:t>
+              <a:t>07/07/2020</a:t>
             </a:fld>
             <a:endParaRPr lang="it-IT"/>
           </a:p>
@@ -1735,7 +1735,7 @@
           <a:p>
             <a:fld id="{31921840-1B76-44BB-98DD-5857A1343252}" type="datetimeFigureOut">
               <a:rPr lang="it-IT" smtClean="0"/>
-              <a:t>02/07/2020</a:t>
+              <a:t>07/07/2020</a:t>
             </a:fld>
             <a:endParaRPr lang="it-IT"/>
           </a:p>
@@ -1830,7 +1830,7 @@
           <a:p>
             <a:fld id="{31921840-1B76-44BB-98DD-5857A1343252}" type="datetimeFigureOut">
               <a:rPr lang="it-IT" smtClean="0"/>
-              <a:t>02/07/2020</a:t>
+              <a:t>07/07/2020</a:t>
             </a:fld>
             <a:endParaRPr lang="it-IT"/>
           </a:p>
@@ -2107,7 +2107,7 @@
           <a:p>
             <a:fld id="{31921840-1B76-44BB-98DD-5857A1343252}" type="datetimeFigureOut">
               <a:rPr lang="it-IT" smtClean="0"/>
-              <a:t>02/07/2020</a:t>
+              <a:t>07/07/2020</a:t>
             </a:fld>
             <a:endParaRPr lang="it-IT"/>
           </a:p>
@@ -2360,7 +2360,7 @@
           <a:p>
             <a:fld id="{31921840-1B76-44BB-98DD-5857A1343252}" type="datetimeFigureOut">
               <a:rPr lang="it-IT" smtClean="0"/>
-              <a:t>02/07/2020</a:t>
+              <a:t>07/07/2020</a:t>
             </a:fld>
             <a:endParaRPr lang="it-IT"/>
           </a:p>
@@ -2573,7 +2573,7 @@
           <a:p>
             <a:fld id="{31921840-1B76-44BB-98DD-5857A1343252}" type="datetimeFigureOut">
               <a:rPr lang="it-IT" smtClean="0"/>
-              <a:t>02/07/2020</a:t>
+              <a:t>07/07/2020</a:t>
             </a:fld>
             <a:endParaRPr lang="it-IT"/>
           </a:p>
@@ -3083,30 +3083,22 @@
           <a:lstStyle/>
           <a:p>
             <a:r>
-              <a:rPr lang="it-IT" smtClean="0">
+              <a:rPr lang="it-IT" dirty="0" smtClean="0">
                 <a:solidFill>
                   <a:schemeClr val="bg1"/>
                 </a:solidFill>
               </a:rPr>
-              <a:t>V.1.2</a:t>
-            </a:r>
-            <a:r>
-              <a:rPr lang="it-IT" smtClean="0">
-                <a:solidFill>
-                  <a:schemeClr val="bg1"/>
-                </a:solidFill>
-              </a:rPr>
-              <a:t/>
+              <a:t>V.1.3</a:t>
             </a:r>
             <a:br>
-              <a:rPr lang="it-IT" smtClean="0">
+              <a:rPr lang="it-IT" dirty="0" smtClean="0">
                 <a:solidFill>
                   <a:schemeClr val="bg1"/>
                 </a:solidFill>
               </a:rPr>
             </a:br>
             <a:r>
-              <a:rPr lang="it-IT" smtClean="0">
+              <a:rPr lang="it-IT" dirty="0" smtClean="0">
                 <a:solidFill>
                   <a:schemeClr val="bg1"/>
                 </a:solidFill>
@@ -3166,8 +3158,8 @@
         </p:nvSpPr>
         <p:spPr>
           <a:xfrm>
-            <a:off x="175491" y="147782"/>
-            <a:ext cx="11914909" cy="369332"/>
+            <a:off x="161925" y="142875"/>
+            <a:ext cx="11744325" cy="6678751"/>
           </a:xfrm>
           <a:prstGeom prst="rect">
             <a:avLst/>
@@ -3181,50 +3173,620 @@
           <a:lstStyle/>
           <a:p>
             <a:r>
-              <a:rPr lang="it-IT" dirty="0" smtClean="0"/>
-              <a:t>SW </a:t>
-            </a:r>
-            <a:r>
-              <a:rPr lang="it-IT" dirty="0" err="1" smtClean="0"/>
-              <a:t>Pre</a:t>
-            </a:r>
-            <a:r>
-              <a:rPr lang="it-IT" dirty="0" smtClean="0"/>
-              <a:t>-requisite</a:t>
-            </a:r>
-            <a:endParaRPr lang="it-IT" dirty="0"/>
-          </a:p>
-        </p:txBody>
-      </p:sp>
-      <p:sp>
-        <p:nvSpPr>
-          <p:cNvPr id="5" name="CasellaDiTesto 4"/>
-          <p:cNvSpPr txBox="1"/>
-          <p:nvPr/>
-        </p:nvSpPr>
-        <p:spPr>
-          <a:xfrm>
-            <a:off x="175491" y="600364"/>
-            <a:ext cx="11914909" cy="4770537"/>
-          </a:xfrm>
-          <a:prstGeom prst="rect">
-            <a:avLst/>
-          </a:prstGeom>
-          <a:noFill/>
-        </p:spPr>
-        <p:txBody>
-          <a:bodyPr wrap="square" rtlCol="0">
-            <a:spAutoFit/>
-          </a:bodyPr>
-          <a:lstStyle/>
-          <a:p>
-            <a:r>
-              <a:rPr lang="it-IT" sz="1600" dirty="0" smtClean="0"/>
-              <a:t>In </a:t>
-            </a:r>
-            <a:r>
-              <a:rPr lang="it-IT" sz="1600" dirty="0" err="1" smtClean="0"/>
-              <a:t>order</a:t>
+              <a:rPr lang="it-IT" sz="2400" dirty="0" smtClean="0"/>
+              <a:t>Test </a:t>
+            </a:r>
+            <a:r>
+              <a:rPr lang="it-IT" sz="2400" dirty="0" err="1" smtClean="0"/>
+              <a:t>sequence</a:t>
+            </a:r>
+            <a:r>
+              <a:rPr lang="it-IT" sz="2400" dirty="0"/>
+              <a:t/>
+            </a:r>
+            <a:br>
+              <a:rPr lang="it-IT" sz="2400" dirty="0"/>
+            </a:br>
+            <a:endParaRPr lang="it-IT" sz="1200" dirty="0" smtClean="0">
+              <a:solidFill>
+                <a:srgbClr val="FF0000"/>
+              </a:solidFill>
+            </a:endParaRPr>
+          </a:p>
+          <a:p>
+            <a:pPr marL="228600" indent="-228600">
+              <a:buFont typeface="+mj-lt"/>
+              <a:buAutoNum type="arabicPeriod"/>
+            </a:pPr>
+            <a:r>
+              <a:rPr lang="it-IT" sz="1600" dirty="0" err="1" smtClean="0"/>
+              <a:t>All</a:t>
+            </a:r>
+            <a:r>
+              <a:rPr lang="it-IT" sz="1600" dirty="0" smtClean="0"/>
+              <a:t> relè open</a:t>
+            </a:r>
+          </a:p>
+          <a:p>
+            <a:pPr marL="228600" indent="-228600">
+              <a:buFont typeface="+mj-lt"/>
+              <a:buAutoNum type="arabicPeriod"/>
+            </a:pPr>
+            <a:r>
+              <a:rPr lang="it-IT" sz="1600" dirty="0" smtClean="0"/>
+              <a:t>Close Relè Button &gt; </a:t>
+            </a:r>
+            <a:r>
+              <a:rPr lang="it-IT" sz="1600" dirty="0" err="1" smtClean="0"/>
+              <a:t>Wait</a:t>
+            </a:r>
+            <a:r>
+              <a:rPr lang="it-IT" sz="1600" dirty="0" smtClean="0"/>
+              <a:t> 500 </a:t>
+            </a:r>
+            <a:r>
+              <a:rPr lang="it-IT" sz="1600" dirty="0" err="1" smtClean="0"/>
+              <a:t>ms</a:t>
+            </a:r>
+            <a:endParaRPr lang="it-IT" sz="1600" dirty="0" smtClean="0"/>
+          </a:p>
+          <a:p>
+            <a:pPr marL="228600" indent="-228600">
+              <a:buFont typeface="+mj-lt"/>
+              <a:buAutoNum type="arabicPeriod"/>
+            </a:pPr>
+            <a:r>
+              <a:rPr lang="it-IT" sz="1600" dirty="0" smtClean="0"/>
+              <a:t>Close Relè </a:t>
+            </a:r>
+            <a:r>
+              <a:rPr lang="it-IT" sz="1600" dirty="0" err="1" smtClean="0"/>
+              <a:t>Power</a:t>
+            </a:r>
+            <a:r>
+              <a:rPr lang="it-IT" sz="1600" dirty="0" smtClean="0"/>
+              <a:t> </a:t>
+            </a:r>
+            <a:r>
+              <a:rPr lang="it-IT" sz="1600" dirty="0"/>
+              <a:t>&gt; </a:t>
+            </a:r>
+            <a:r>
+              <a:rPr lang="it-IT" sz="1600" dirty="0" err="1"/>
+              <a:t>Wait</a:t>
+            </a:r>
+            <a:r>
+              <a:rPr lang="it-IT" sz="1600" dirty="0"/>
+              <a:t> 500 </a:t>
+            </a:r>
+            <a:r>
+              <a:rPr lang="it-IT" sz="1600" dirty="0" err="1"/>
+              <a:t>ms</a:t>
+            </a:r>
+            <a:endParaRPr lang="it-IT" sz="1600" dirty="0"/>
+          </a:p>
+          <a:p>
+            <a:pPr marL="228600" indent="-228600">
+              <a:buFont typeface="+mj-lt"/>
+              <a:buAutoNum type="arabicPeriod"/>
+            </a:pPr>
+            <a:r>
+              <a:rPr lang="it-IT" sz="1600" dirty="0" smtClean="0"/>
+              <a:t>Close Relè EN</a:t>
+            </a:r>
+          </a:p>
+          <a:p>
+            <a:pPr marL="228600" indent="-228600">
+              <a:buFont typeface="+mj-lt"/>
+              <a:buAutoNum type="arabicPeriod"/>
+            </a:pPr>
+            <a:r>
+              <a:rPr lang="it-IT" sz="1600" dirty="0" err="1" smtClean="0"/>
+              <a:t>Ask</a:t>
+            </a:r>
+            <a:r>
+              <a:rPr lang="it-IT" sz="1600" dirty="0" smtClean="0"/>
+              <a:t> the operator </a:t>
+            </a:r>
+            <a:r>
+              <a:rPr lang="en-US" sz="1600" dirty="0"/>
+              <a:t>"Is the power led ON </a:t>
+            </a:r>
+            <a:r>
+              <a:rPr lang="en-US" sz="1600" dirty="0" smtClean="0"/>
+              <a:t>?“  </a:t>
+            </a:r>
+            <a:r>
+              <a:rPr lang="it-IT" sz="1600" dirty="0" err="1" smtClean="0"/>
+              <a:t>if</a:t>
+            </a:r>
+            <a:r>
+              <a:rPr lang="it-IT" sz="1600" dirty="0" smtClean="0"/>
+              <a:t> </a:t>
+            </a:r>
+            <a:r>
+              <a:rPr lang="it-IT" sz="1600" dirty="0"/>
+              <a:t>yes go </a:t>
+            </a:r>
+            <a:r>
+              <a:rPr lang="it-IT" sz="1600" dirty="0" err="1"/>
+              <a:t>ahead</a:t>
+            </a:r>
+            <a:r>
+              <a:rPr lang="it-IT" sz="1600" dirty="0"/>
+              <a:t> </a:t>
+            </a:r>
+            <a:r>
+              <a:rPr lang="it-IT" sz="1600" dirty="0" err="1"/>
+              <a:t>otherwise</a:t>
+            </a:r>
+            <a:r>
+              <a:rPr lang="it-IT" sz="1600" dirty="0"/>
+              <a:t> stop the test</a:t>
+            </a:r>
+          </a:p>
+          <a:p>
+            <a:pPr marL="228600" indent="-228600">
+              <a:buFont typeface="+mj-lt"/>
+              <a:buAutoNum type="arabicPeriod"/>
+            </a:pPr>
+            <a:r>
+              <a:rPr lang="it-IT" sz="1600" dirty="0" err="1" smtClean="0"/>
+              <a:t>Reas</a:t>
+            </a:r>
+            <a:r>
+              <a:rPr lang="it-IT" sz="1600" dirty="0" smtClean="0"/>
+              <a:t> the 3V3 </a:t>
+            </a:r>
+            <a:r>
+              <a:rPr lang="it-IT" sz="1600" dirty="0" err="1" smtClean="0"/>
+              <a:t>voltage</a:t>
+            </a:r>
+            <a:r>
+              <a:rPr lang="it-IT" sz="1600" dirty="0" smtClean="0"/>
+              <a:t> </a:t>
+            </a:r>
+            <a:r>
+              <a:rPr lang="it-IT" sz="1600" dirty="0" err="1" smtClean="0"/>
+              <a:t>level</a:t>
+            </a:r>
+            <a:r>
+              <a:rPr lang="it-IT" sz="1600" dirty="0" smtClean="0"/>
+              <a:t>, </a:t>
+            </a:r>
+            <a:r>
+              <a:rPr lang="it-IT" sz="1600" dirty="0" err="1" smtClean="0"/>
+              <a:t>if</a:t>
+            </a:r>
+            <a:r>
+              <a:rPr lang="it-IT" sz="1600" dirty="0" smtClean="0"/>
+              <a:t> </a:t>
+            </a:r>
+            <a:r>
+              <a:rPr lang="it-IT" sz="1600" dirty="0" err="1" smtClean="0"/>
+              <a:t>within</a:t>
+            </a:r>
+            <a:r>
+              <a:rPr lang="it-IT" sz="1600" dirty="0" smtClean="0"/>
+              <a:t> the </a:t>
+            </a:r>
+            <a:r>
+              <a:rPr lang="it-IT" sz="1600" dirty="0" err="1" smtClean="0"/>
+              <a:t>limits</a:t>
+            </a:r>
+            <a:r>
+              <a:rPr lang="it-IT" sz="1600" dirty="0" smtClean="0"/>
+              <a:t> </a:t>
+            </a:r>
+            <a:r>
+              <a:rPr lang="it-IT" sz="1600" dirty="0"/>
+              <a:t>go </a:t>
+            </a:r>
+            <a:r>
+              <a:rPr lang="it-IT" sz="1600" dirty="0" err="1"/>
+              <a:t>ahead</a:t>
+            </a:r>
+            <a:r>
+              <a:rPr lang="it-IT" sz="1600" dirty="0"/>
+              <a:t> </a:t>
+            </a:r>
+            <a:r>
+              <a:rPr lang="it-IT" sz="1600" dirty="0" err="1"/>
+              <a:t>otherwise</a:t>
+            </a:r>
+            <a:r>
+              <a:rPr lang="it-IT" sz="1600" dirty="0"/>
+              <a:t> stop the test</a:t>
+            </a:r>
+          </a:p>
+          <a:p>
+            <a:pPr marL="228600" indent="-228600">
+              <a:buFont typeface="+mj-lt"/>
+              <a:buAutoNum type="arabicPeriod"/>
+            </a:pPr>
+            <a:r>
+              <a:rPr lang="it-IT" sz="1600" dirty="0" smtClean="0"/>
+              <a:t>Open Relè EN &gt; </a:t>
+            </a:r>
+            <a:r>
+              <a:rPr lang="it-IT" sz="1600" dirty="0" err="1" smtClean="0"/>
+              <a:t>Wait</a:t>
+            </a:r>
+            <a:r>
+              <a:rPr lang="it-IT" sz="1600" dirty="0" smtClean="0"/>
+              <a:t> 1000 </a:t>
+            </a:r>
+            <a:r>
+              <a:rPr lang="it-IT" sz="1600" dirty="0" err="1" smtClean="0"/>
+              <a:t>ms</a:t>
+            </a:r>
+            <a:endParaRPr lang="it-IT" sz="1600" dirty="0" smtClean="0"/>
+          </a:p>
+          <a:p>
+            <a:pPr marL="228600" indent="-228600">
+              <a:buFont typeface="+mj-lt"/>
+              <a:buAutoNum type="arabicPeriod"/>
+            </a:pPr>
+            <a:r>
+              <a:rPr lang="it-IT" sz="1600" dirty="0" smtClean="0"/>
+              <a:t>Open Relè Button &gt; </a:t>
+            </a:r>
+            <a:r>
+              <a:rPr lang="it-IT" sz="1600" dirty="0" err="1" smtClean="0"/>
+              <a:t>wait</a:t>
+            </a:r>
+            <a:r>
+              <a:rPr lang="it-IT" sz="1600" dirty="0" smtClean="0"/>
+              <a:t> 1000 </a:t>
+            </a:r>
+            <a:r>
+              <a:rPr lang="it-IT" sz="1600" dirty="0" err="1" smtClean="0"/>
+              <a:t>ms</a:t>
+            </a:r>
+            <a:endParaRPr lang="it-IT" sz="1600" dirty="0" smtClean="0"/>
+          </a:p>
+          <a:p>
+            <a:pPr marL="228600" indent="-228600">
+              <a:buFont typeface="+mj-lt"/>
+              <a:buAutoNum type="arabicPeriod"/>
+            </a:pPr>
+            <a:r>
+              <a:rPr lang="it-IT" sz="1600" dirty="0" err="1" smtClean="0"/>
+              <a:t>Run</a:t>
+            </a:r>
+            <a:r>
+              <a:rPr lang="it-IT" sz="1600" dirty="0" smtClean="0"/>
+              <a:t> the FW </a:t>
+            </a:r>
+            <a:r>
+              <a:rPr lang="it-IT" sz="1600" dirty="0" err="1" smtClean="0"/>
+              <a:t>programming</a:t>
+            </a:r>
+            <a:r>
+              <a:rPr lang="it-IT" sz="1600" dirty="0" smtClean="0"/>
+              <a:t> routine</a:t>
+            </a:r>
+          </a:p>
+          <a:p>
+            <a:pPr marL="228600" indent="-228600">
+              <a:buFont typeface="+mj-lt"/>
+              <a:buAutoNum type="arabicPeriod"/>
+            </a:pPr>
+            <a:r>
+              <a:rPr lang="it-IT" sz="1600" dirty="0" err="1" smtClean="0"/>
+              <a:t>Check</a:t>
+            </a:r>
+            <a:r>
+              <a:rPr lang="it-IT" sz="1600" dirty="0" smtClean="0"/>
+              <a:t> </a:t>
+            </a:r>
+            <a:r>
+              <a:rPr lang="it-IT" sz="1600" dirty="0" err="1" smtClean="0"/>
+              <a:t>if</a:t>
+            </a:r>
+            <a:r>
+              <a:rPr lang="it-IT" sz="1600" dirty="0" smtClean="0"/>
+              <a:t> the </a:t>
+            </a:r>
+            <a:r>
+              <a:rPr lang="it-IT" sz="1600" dirty="0" err="1" smtClean="0"/>
+              <a:t>programmation</a:t>
+            </a:r>
+            <a:r>
+              <a:rPr lang="it-IT" sz="1600" dirty="0" smtClean="0"/>
+              <a:t> </a:t>
+            </a:r>
+            <a:r>
+              <a:rPr lang="it-IT" sz="1600" dirty="0" err="1" smtClean="0"/>
+              <a:t>is</a:t>
+            </a:r>
+            <a:r>
+              <a:rPr lang="it-IT" sz="1600" dirty="0" smtClean="0"/>
+              <a:t> ok and </a:t>
+            </a:r>
+            <a:r>
+              <a:rPr lang="it-IT" sz="1600" dirty="0"/>
+              <a:t>go </a:t>
+            </a:r>
+            <a:r>
+              <a:rPr lang="it-IT" sz="1600" dirty="0" err="1"/>
+              <a:t>ahead</a:t>
+            </a:r>
+            <a:r>
+              <a:rPr lang="it-IT" sz="1600" dirty="0"/>
+              <a:t> </a:t>
+            </a:r>
+            <a:r>
+              <a:rPr lang="it-IT" sz="1600" dirty="0" err="1"/>
+              <a:t>otherwise</a:t>
+            </a:r>
+            <a:r>
+              <a:rPr lang="it-IT" sz="1600" dirty="0"/>
+              <a:t> stop the test</a:t>
+            </a:r>
+          </a:p>
+          <a:p>
+            <a:pPr marL="228600" indent="-228600">
+              <a:buFont typeface="+mj-lt"/>
+              <a:buAutoNum type="arabicPeriod"/>
+            </a:pPr>
+            <a:r>
+              <a:rPr lang="it-IT" sz="1600" dirty="0" smtClean="0"/>
+              <a:t> </a:t>
+            </a:r>
+            <a:r>
+              <a:rPr lang="it-IT" sz="1600" dirty="0" err="1" smtClean="0"/>
+              <a:t>Initialize</a:t>
+            </a:r>
+            <a:r>
+              <a:rPr lang="it-IT" sz="1600" dirty="0" smtClean="0"/>
+              <a:t> the PC serial </a:t>
+            </a:r>
+            <a:r>
+              <a:rPr lang="it-IT" sz="1600" dirty="0" err="1" smtClean="0"/>
+              <a:t>connected</a:t>
+            </a:r>
+            <a:r>
+              <a:rPr lang="it-IT" sz="1600" dirty="0" smtClean="0"/>
+              <a:t> to the TTL </a:t>
+            </a:r>
+            <a:r>
+              <a:rPr lang="it-IT" sz="1600" dirty="0" err="1" smtClean="0"/>
+              <a:t>port</a:t>
+            </a:r>
+            <a:endParaRPr lang="it-IT" sz="1600" dirty="0" smtClean="0"/>
+          </a:p>
+          <a:p>
+            <a:pPr marL="228600" indent="-228600">
+              <a:buFont typeface="+mj-lt"/>
+              <a:buAutoNum type="arabicPeriod"/>
+            </a:pPr>
+            <a:r>
+              <a:rPr lang="it-IT" sz="1600" dirty="0"/>
+              <a:t> </a:t>
+            </a:r>
+            <a:r>
+              <a:rPr lang="it-IT" sz="1600" dirty="0" err="1"/>
+              <a:t>Ask</a:t>
+            </a:r>
+            <a:r>
+              <a:rPr lang="it-IT" sz="1600" dirty="0"/>
+              <a:t> the </a:t>
+            </a:r>
+            <a:r>
+              <a:rPr lang="it-IT" sz="1600" dirty="0" smtClean="0"/>
+              <a:t>operator </a:t>
+            </a:r>
+            <a:r>
+              <a:rPr lang="en-US" sz="1600" dirty="0" smtClean="0"/>
+              <a:t>"</a:t>
+            </a:r>
+            <a:r>
+              <a:rPr lang="en-US" sz="1600" dirty="0"/>
+              <a:t>Take a look to the status led to see if </a:t>
+            </a:r>
+            <a:r>
+              <a:rPr lang="en-US" sz="1600" dirty="0" smtClean="0"/>
+              <a:t>blink“?“</a:t>
+            </a:r>
+          </a:p>
+          <a:p>
+            <a:pPr marL="228600" indent="-228600">
+              <a:buFont typeface="+mj-lt"/>
+              <a:buAutoNum type="arabicPeriod"/>
+            </a:pPr>
+            <a:r>
+              <a:rPr lang="it-IT" sz="1600" dirty="0" smtClean="0"/>
+              <a:t>Close </a:t>
+            </a:r>
+            <a:r>
+              <a:rPr lang="it-IT" sz="1600" dirty="0"/>
+              <a:t>Relè </a:t>
+            </a:r>
+            <a:r>
+              <a:rPr lang="it-IT" sz="1600" dirty="0" smtClean="0"/>
+              <a:t>EN </a:t>
+            </a:r>
+            <a:r>
+              <a:rPr lang="it-IT" sz="1600" dirty="0"/>
+              <a:t>&gt; </a:t>
+            </a:r>
+            <a:r>
+              <a:rPr lang="it-IT" sz="1600" dirty="0" err="1"/>
+              <a:t>Wait</a:t>
+            </a:r>
+            <a:r>
+              <a:rPr lang="it-IT" sz="1600" dirty="0"/>
+              <a:t> 500 </a:t>
+            </a:r>
+            <a:r>
+              <a:rPr lang="it-IT" sz="1600" dirty="0" err="1" smtClean="0"/>
+              <a:t>ms</a:t>
+            </a:r>
+            <a:endParaRPr lang="it-IT" sz="1600" dirty="0" smtClean="0"/>
+          </a:p>
+          <a:p>
+            <a:pPr marL="228600" indent="-228600">
+              <a:buFont typeface="+mj-lt"/>
+              <a:buAutoNum type="arabicPeriod"/>
+            </a:pPr>
+            <a:r>
+              <a:rPr lang="it-IT" sz="1600" dirty="0" smtClean="0"/>
+              <a:t>Close Relè TP5 &gt; </a:t>
+            </a:r>
+            <a:r>
+              <a:rPr lang="it-IT" sz="1600" dirty="0" err="1" smtClean="0"/>
+              <a:t>Wait</a:t>
+            </a:r>
+            <a:r>
+              <a:rPr lang="it-IT" sz="1600" dirty="0" smtClean="0"/>
+              <a:t> 500 </a:t>
+            </a:r>
+            <a:r>
+              <a:rPr lang="it-IT" sz="1600" dirty="0" err="1" smtClean="0"/>
+              <a:t>ms</a:t>
+            </a:r>
+            <a:endParaRPr lang="it-IT" sz="1600" dirty="0" smtClean="0"/>
+          </a:p>
+          <a:p>
+            <a:pPr marL="228600" indent="-228600">
+              <a:buFont typeface="+mj-lt"/>
+              <a:buAutoNum type="arabicPeriod"/>
+            </a:pPr>
+            <a:r>
+              <a:rPr lang="it-IT" sz="1600" dirty="0" smtClean="0"/>
+              <a:t> </a:t>
+            </a:r>
+            <a:r>
+              <a:rPr lang="it-IT" sz="1600" dirty="0"/>
+              <a:t>Open Relè </a:t>
+            </a:r>
+            <a:r>
+              <a:rPr lang="it-IT" sz="1600" dirty="0" smtClean="0"/>
+              <a:t>EN</a:t>
+            </a:r>
+            <a:endParaRPr lang="it-IT" sz="1600" dirty="0"/>
+          </a:p>
+          <a:p>
+            <a:pPr marL="228600" indent="-228600">
+              <a:buFont typeface="+mj-lt"/>
+              <a:buAutoNum type="arabicPeriod"/>
+            </a:pPr>
+            <a:r>
+              <a:rPr lang="it-IT" sz="1600" dirty="0"/>
+              <a:t> </a:t>
+            </a:r>
+            <a:r>
+              <a:rPr lang="it-IT" sz="1600" dirty="0" err="1"/>
+              <a:t>Ask</a:t>
+            </a:r>
+            <a:r>
+              <a:rPr lang="it-IT" sz="1600" dirty="0"/>
+              <a:t> the </a:t>
+            </a:r>
+            <a:r>
+              <a:rPr lang="it-IT" sz="1600" dirty="0" smtClean="0"/>
+              <a:t>operator </a:t>
+            </a:r>
+            <a:r>
+              <a:rPr lang="en-US" sz="1600" dirty="0" smtClean="0"/>
+              <a:t>"LED </a:t>
+            </a:r>
+            <a:r>
+              <a:rPr lang="en-US" sz="1600" dirty="0"/>
+              <a:t>STATUS TEST", "The status led have blinked green/red </a:t>
+            </a:r>
+            <a:r>
+              <a:rPr lang="en-US" sz="1600" dirty="0" smtClean="0"/>
+              <a:t>?"  </a:t>
+            </a:r>
+            <a:r>
+              <a:rPr lang="it-IT" sz="1600" dirty="0" err="1" smtClean="0"/>
+              <a:t>if</a:t>
+            </a:r>
+            <a:r>
+              <a:rPr lang="it-IT" sz="1600" dirty="0" smtClean="0"/>
+              <a:t> </a:t>
+            </a:r>
+            <a:r>
+              <a:rPr lang="it-IT" sz="1600" dirty="0"/>
+              <a:t>yes go </a:t>
+            </a:r>
+            <a:r>
+              <a:rPr lang="it-IT" sz="1600" dirty="0" err="1"/>
+              <a:t>ahead</a:t>
+            </a:r>
+            <a:r>
+              <a:rPr lang="it-IT" sz="1600" dirty="0"/>
+              <a:t> </a:t>
+            </a:r>
+            <a:r>
+              <a:rPr lang="it-IT" sz="1600" dirty="0" err="1"/>
+              <a:t>otherwise</a:t>
+            </a:r>
+            <a:r>
+              <a:rPr lang="it-IT" sz="1600" dirty="0"/>
+              <a:t> stop the test</a:t>
+            </a:r>
+          </a:p>
+          <a:p>
+            <a:pPr marL="228600" indent="-228600">
+              <a:buFont typeface="+mj-lt"/>
+              <a:buAutoNum type="arabicPeriod"/>
+            </a:pPr>
+            <a:r>
+              <a:rPr lang="it-IT" sz="1600" dirty="0" smtClean="0"/>
+              <a:t>Read the MAC </a:t>
+            </a:r>
+            <a:r>
+              <a:rPr lang="it-IT" sz="1600" dirty="0" err="1" smtClean="0"/>
+              <a:t>address</a:t>
+            </a:r>
+            <a:r>
+              <a:rPr lang="it-IT" sz="1600" dirty="0" smtClean="0"/>
+              <a:t> via serial </a:t>
+            </a:r>
+            <a:r>
+              <a:rPr lang="it-IT" sz="1600" dirty="0" err="1" smtClean="0"/>
+              <a:t>port</a:t>
+            </a:r>
+            <a:r>
+              <a:rPr lang="it-IT" sz="1600" dirty="0" smtClean="0"/>
+              <a:t>, </a:t>
+            </a:r>
+            <a:r>
+              <a:rPr lang="it-IT" sz="1600" dirty="0" err="1"/>
+              <a:t>if</a:t>
+            </a:r>
+            <a:r>
+              <a:rPr lang="it-IT" sz="1600" dirty="0"/>
+              <a:t> yes go </a:t>
+            </a:r>
+            <a:r>
+              <a:rPr lang="it-IT" sz="1600" dirty="0" err="1"/>
+              <a:t>ahead</a:t>
+            </a:r>
+            <a:r>
+              <a:rPr lang="it-IT" sz="1600" dirty="0"/>
+              <a:t> </a:t>
+            </a:r>
+            <a:r>
+              <a:rPr lang="it-IT" sz="1600" dirty="0" err="1"/>
+              <a:t>otherwise</a:t>
+            </a:r>
+            <a:r>
+              <a:rPr lang="it-IT" sz="1600" dirty="0"/>
+              <a:t> stop the test</a:t>
+            </a:r>
+          </a:p>
+          <a:p>
+            <a:pPr marL="228600" indent="-228600">
+              <a:buFont typeface="+mj-lt"/>
+              <a:buAutoNum type="arabicPeriod"/>
+            </a:pPr>
+            <a:r>
+              <a:rPr lang="it-IT" sz="1600" dirty="0" err="1" smtClean="0"/>
+              <a:t>Try</a:t>
             </a:r>
             <a:r>
               <a:rPr lang="it-IT" sz="1600" dirty="0" smtClean="0"/>
@@ -3232,15 +3794,31 @@
             </a:r>
             <a:r>
               <a:rPr lang="it-IT" sz="1600" dirty="0" err="1" smtClean="0"/>
-              <a:t>run</a:t>
-            </a:r>
-            <a:r>
-              <a:rPr lang="it-IT" sz="1600" dirty="0" smtClean="0"/>
-              <a:t> the SW the </a:t>
-            </a:r>
-            <a:r>
-              <a:rPr lang="it-IT" sz="1600" dirty="0" err="1" smtClean="0"/>
-              <a:t>following</a:t>
+              <a:t>connect</a:t>
+            </a:r>
+            <a:r>
+              <a:rPr lang="it-IT" sz="1600" dirty="0" smtClean="0"/>
+              <a:t> to test AP (</a:t>
+            </a:r>
+            <a:r>
+              <a:rPr lang="en-US" sz="1600" dirty="0"/>
+              <a:t>SSID=TEST_AP PWD=12345678 </a:t>
+            </a:r>
+            <a:r>
+              <a:rPr lang="en-US" sz="1600" dirty="0" smtClean="0"/>
+              <a:t>") ?"  </a:t>
+            </a:r>
+            <a:r>
+              <a:rPr lang="it-IT" sz="1600" dirty="0" err="1" smtClean="0"/>
+              <a:t>if</a:t>
+            </a:r>
+            <a:r>
+              <a:rPr lang="it-IT" sz="1600" dirty="0" smtClean="0"/>
+              <a:t> success go </a:t>
+            </a:r>
+            <a:r>
+              <a:rPr lang="it-IT" sz="1600" dirty="0" err="1" smtClean="0"/>
+              <a:t>ahead</a:t>
             </a:r>
             <a:r>
               <a:rPr lang="it-IT" sz="1600" dirty="0" smtClean="0"/>
@@ -3248,391 +3826,137 @@
             </a:r>
             <a:r>
               <a:rPr lang="it-IT" sz="1600" dirty="0" err="1" smtClean="0"/>
-              <a:t>prerequisite</a:t>
-            </a:r>
-            <a:r>
-              <a:rPr lang="it-IT" sz="1600" dirty="0" smtClean="0"/>
-              <a:t> are </a:t>
-            </a:r>
-            <a:r>
-              <a:rPr lang="it-IT" sz="1600" dirty="0" err="1" smtClean="0"/>
-              <a:t>needed</a:t>
-            </a:r>
-            <a:endParaRPr lang="it-IT" sz="1600" dirty="0" smtClean="0"/>
-          </a:p>
-          <a:p>
-            <a:endParaRPr lang="it-IT" sz="1600" dirty="0" smtClean="0"/>
-          </a:p>
-          <a:p>
-            <a:r>
-              <a:rPr lang="it-IT" sz="1600" dirty="0" err="1" smtClean="0"/>
-              <a:t>Modbus_PC_Simulator</a:t>
-            </a:r>
-            <a:endParaRPr lang="it-IT" sz="1600" dirty="0" smtClean="0"/>
-          </a:p>
-          <a:p>
-            <a:r>
-              <a:rPr lang="it-IT" sz="1600" dirty="0" smtClean="0"/>
-              <a:t>- </a:t>
-            </a:r>
-            <a:r>
-              <a:rPr lang="it-IT" sz="1600" dirty="0" err="1" smtClean="0"/>
-              <a:t>Python</a:t>
-            </a:r>
-            <a:r>
-              <a:rPr lang="it-IT" sz="1600" dirty="0" smtClean="0"/>
-              <a:t> V.2.7.x</a:t>
-            </a:r>
-          </a:p>
-          <a:p>
-            <a:r>
-              <a:rPr lang="it-IT" sz="1600" dirty="0" smtClean="0"/>
-              <a:t>- </a:t>
-            </a:r>
-            <a:r>
-              <a:rPr lang="it-IT" sz="1600" dirty="0" err="1" smtClean="0"/>
-              <a:t>pymodbus</a:t>
-            </a:r>
-            <a:r>
-              <a:rPr lang="it-IT" sz="1600" dirty="0" smtClean="0"/>
-              <a:t> (</a:t>
-            </a:r>
-            <a:r>
-              <a:rPr lang="it-IT" sz="1600" dirty="0" smtClean="0">
-                <a:hlinkClick r:id="rId2"/>
-              </a:rPr>
-              <a:t>https</a:t>
-            </a:r>
-            <a:r>
-              <a:rPr lang="it-IT" sz="1600" dirty="0">
-                <a:hlinkClick r:id="rId2"/>
-              </a:rPr>
-              <a:t>://</a:t>
-            </a:r>
-            <a:r>
-              <a:rPr lang="it-IT" sz="1600" dirty="0" smtClean="0">
-                <a:hlinkClick r:id="rId2"/>
-              </a:rPr>
-              <a:t>pymodbus.readthedocs.io/en/latest/readme.html#installing</a:t>
-            </a:r>
-            <a:r>
-              <a:rPr lang="it-IT" sz="1600" dirty="0" smtClean="0"/>
-              <a:t>)</a:t>
-            </a:r>
-          </a:p>
-          <a:p>
-            <a:r>
-              <a:rPr lang="it-IT" sz="1600" dirty="0" smtClean="0"/>
-              <a:t>- </a:t>
-            </a:r>
-            <a:r>
-              <a:rPr lang="it-IT" sz="1600" dirty="0" err="1" smtClean="0"/>
-              <a:t>pyserial</a:t>
+              <a:t>otherwise</a:t>
+            </a:r>
+            <a:r>
+              <a:rPr lang="it-IT" sz="1600" dirty="0" smtClean="0"/>
+              <a:t> stop the test</a:t>
+            </a:r>
+          </a:p>
+          <a:p>
+            <a:pPr marL="228600" indent="-228600">
+              <a:buFont typeface="+mj-lt"/>
+              <a:buAutoNum type="arabicPeriod"/>
+            </a:pPr>
+            <a:r>
+              <a:rPr lang="it-IT" sz="1600" dirty="0" err="1" smtClean="0"/>
+              <a:t>Try</a:t>
+            </a:r>
+            <a:r>
+              <a:rPr lang="it-IT" sz="1600" dirty="0" smtClean="0"/>
+              <a:t> to </a:t>
+            </a:r>
+            <a:r>
+              <a:rPr lang="it-IT" sz="1600" dirty="0" err="1" smtClean="0"/>
+              <a:t>read</a:t>
             </a:r>
             <a:r>
               <a:rPr lang="it-IT" sz="1600" dirty="0" smtClean="0"/>
               <a:t> </a:t>
             </a:r>
             <a:r>
+              <a:rPr lang="it-IT" sz="1600" dirty="0" err="1" smtClean="0"/>
+              <a:t>value</a:t>
+            </a:r>
+            <a:r>
+              <a:rPr lang="it-IT" sz="1600" dirty="0" smtClean="0"/>
+              <a:t> </a:t>
+            </a:r>
+            <a:r>
+              <a:rPr lang="it-IT" sz="1600" dirty="0" err="1" smtClean="0"/>
+              <a:t>through</a:t>
+            </a:r>
+            <a:r>
+              <a:rPr lang="it-IT" sz="1600" dirty="0" smtClean="0"/>
+              <a:t> the RS485 </a:t>
+            </a:r>
+            <a:r>
+              <a:rPr lang="it-IT" sz="1600" dirty="0" err="1" smtClean="0"/>
+              <a:t>port</a:t>
+            </a:r>
+            <a:r>
+              <a:rPr lang="it-IT" sz="1600" dirty="0" smtClean="0"/>
+              <a:t> </a:t>
+            </a:r>
+            <a:r>
+              <a:rPr lang="en-US" sz="1600" dirty="0"/>
+              <a:t>?"  </a:t>
+            </a:r>
+            <a:r>
+              <a:rPr lang="it-IT" sz="1600" dirty="0" err="1"/>
+              <a:t>if</a:t>
+            </a:r>
+            <a:r>
               <a:rPr lang="it-IT" sz="1600" dirty="0"/>
-              <a:t>(</a:t>
-            </a:r>
-            <a:r>
-              <a:rPr lang="it-IT" sz="1600" dirty="0">
-                <a:hlinkClick r:id="rId3"/>
-              </a:rPr>
-              <a:t>https://pypi.org/project/pyserial</a:t>
-            </a:r>
-            <a:r>
-              <a:rPr lang="it-IT" sz="1600" dirty="0" smtClean="0">
-                <a:hlinkClick r:id="rId3"/>
-              </a:rPr>
-              <a:t>/</a:t>
-            </a:r>
-            <a:r>
-              <a:rPr lang="it-IT" sz="1600" dirty="0" smtClean="0"/>
-              <a:t>)</a:t>
-            </a:r>
-          </a:p>
-          <a:p>
-            <a:endParaRPr lang="it-IT" sz="1600" dirty="0" smtClean="0"/>
-          </a:p>
-          <a:p>
-            <a:r>
-              <a:rPr lang="it-IT" sz="1600" dirty="0" err="1" smtClean="0"/>
-              <a:t>CAREL_GME_Test</a:t>
-            </a:r>
-            <a:endParaRPr lang="it-IT" sz="1600" dirty="0" smtClean="0"/>
-          </a:p>
-          <a:p>
-            <a:pPr marL="285750" indent="-285750">
-              <a:buFontTx/>
-              <a:buChar char="-"/>
+              <a:t> success go </a:t>
+            </a:r>
+            <a:r>
+              <a:rPr lang="it-IT" sz="1600" dirty="0" err="1"/>
+              <a:t>ahead</a:t>
+            </a:r>
+            <a:r>
+              <a:rPr lang="it-IT" sz="1600" dirty="0"/>
+              <a:t> </a:t>
+            </a:r>
+            <a:r>
+              <a:rPr lang="it-IT" sz="1600" dirty="0" err="1"/>
+              <a:t>otherwise</a:t>
+            </a:r>
+            <a:r>
+              <a:rPr lang="it-IT" sz="1600" dirty="0"/>
+              <a:t> stop the test</a:t>
+            </a:r>
+          </a:p>
+          <a:p>
+            <a:pPr marL="228600" indent="-228600">
+              <a:buFont typeface="+mj-lt"/>
+              <a:buAutoNum type="arabicPeriod"/>
             </a:pPr>
             <a:r>
-              <a:rPr lang="it-IT" sz="1600" dirty="0" err="1" smtClean="0"/>
-              <a:t>Launch</a:t>
-            </a:r>
-            <a:r>
-              <a:rPr lang="it-IT" sz="1600" dirty="0" smtClean="0"/>
-              <a:t> </a:t>
-            </a:r>
-            <a:r>
-              <a:rPr lang="it-IT" sz="1600" dirty="0" smtClean="0"/>
-              <a:t>the </a:t>
-            </a:r>
-            <a:r>
-              <a:rPr lang="it-IT" sz="1600" dirty="0" err="1" smtClean="0"/>
-              <a:t>program</a:t>
-            </a:r>
-            <a:r>
-              <a:rPr lang="it-IT" sz="1600" dirty="0" smtClean="0"/>
-              <a:t> </a:t>
-            </a:r>
-            <a:r>
-              <a:rPr lang="it-IT" sz="1600" dirty="0" smtClean="0"/>
-              <a:t>CAREL_GME_Test.exe and </a:t>
-            </a:r>
-            <a:r>
-              <a:rPr lang="it-IT" sz="1600" dirty="0" smtClean="0"/>
-              <a:t>download and </a:t>
-            </a:r>
-            <a:r>
-              <a:rPr lang="it-IT" sz="1600" dirty="0" err="1" smtClean="0"/>
-              <a:t>install</a:t>
-            </a:r>
-            <a:r>
-              <a:rPr lang="it-IT" sz="1600" dirty="0" smtClean="0"/>
-              <a:t> the </a:t>
-            </a:r>
-            <a:r>
-              <a:rPr lang="it-IT" sz="1600" dirty="0" err="1" smtClean="0"/>
-              <a:t>requested</a:t>
-            </a:r>
-            <a:r>
-              <a:rPr lang="it-IT" sz="1600" dirty="0" smtClean="0"/>
-              <a:t> .</a:t>
-            </a:r>
-            <a:r>
-              <a:rPr lang="it-IT" sz="1600" dirty="0"/>
-              <a:t>NET </a:t>
-            </a:r>
-            <a:r>
-              <a:rPr lang="it-IT" sz="1600" dirty="0" smtClean="0"/>
-              <a:t>Framework</a:t>
-            </a:r>
-          </a:p>
-          <a:p>
-            <a:endParaRPr lang="it-IT" sz="1600" dirty="0" smtClean="0"/>
-          </a:p>
-          <a:p>
-            <a:r>
-              <a:rPr lang="it-IT" sz="1600" dirty="0" err="1" smtClean="0"/>
-              <a:t>After</a:t>
-            </a:r>
-            <a:r>
-              <a:rPr lang="it-IT" sz="1600" dirty="0" smtClean="0"/>
-              <a:t> the </a:t>
-            </a:r>
-            <a:r>
-              <a:rPr lang="it-IT" sz="1600" dirty="0" err="1" smtClean="0"/>
-              <a:t>installation</a:t>
-            </a:r>
-            <a:r>
-              <a:rPr lang="it-IT" sz="1600" dirty="0" smtClean="0"/>
-              <a:t> </a:t>
-            </a:r>
-            <a:r>
-              <a:rPr lang="it-IT" sz="1600" dirty="0" err="1" smtClean="0"/>
-              <a:t>follow</a:t>
-            </a:r>
-            <a:r>
-              <a:rPr lang="it-IT" sz="1600" dirty="0" smtClean="0"/>
-              <a:t> </a:t>
-            </a:r>
-            <a:r>
-              <a:rPr lang="it-IT" sz="1600" dirty="0" err="1" smtClean="0"/>
-              <a:t>this</a:t>
-            </a:r>
-            <a:r>
-              <a:rPr lang="it-IT" sz="1600" dirty="0" smtClean="0"/>
-              <a:t> </a:t>
-            </a:r>
-            <a:r>
-              <a:rPr lang="it-IT" sz="1600" dirty="0" err="1" smtClean="0"/>
-              <a:t>steps</a:t>
-            </a:r>
-            <a:r>
-              <a:rPr lang="it-IT" sz="1600" dirty="0" smtClean="0"/>
-              <a:t>:</a:t>
-            </a:r>
-          </a:p>
-          <a:p>
-            <a:pPr marL="285750" indent="-285750">
-              <a:buFontTx/>
-              <a:buChar char="-"/>
+              <a:rPr lang="it-IT" sz="1600" dirty="0" smtClean="0"/>
+              <a:t>End of test </a:t>
+            </a:r>
+          </a:p>
+          <a:p>
+            <a:pPr marL="228600" indent="-228600">
+              <a:buFont typeface="+mj-lt"/>
+              <a:buAutoNum type="arabicPeriod"/>
             </a:pPr>
-            <a:r>
-              <a:rPr lang="it-IT" sz="1600" dirty="0" err="1" smtClean="0"/>
-              <a:t>Edit</a:t>
-            </a:r>
-            <a:r>
-              <a:rPr lang="it-IT" sz="1600" dirty="0" smtClean="0"/>
-              <a:t> with </a:t>
-            </a:r>
-            <a:r>
-              <a:rPr lang="it-IT" sz="1600" dirty="0" err="1" smtClean="0"/>
-              <a:t>notepad</a:t>
-            </a:r>
-            <a:r>
-              <a:rPr lang="it-IT" sz="1600" dirty="0" smtClean="0"/>
-              <a:t> the file CAREL_GME_Test_CFG.ini and set the COM </a:t>
-            </a:r>
-            <a:r>
-              <a:rPr lang="it-IT" sz="1600" dirty="0" err="1" smtClean="0"/>
-              <a:t>ports</a:t>
-            </a:r>
-            <a:r>
-              <a:rPr lang="it-IT" sz="1600" dirty="0" smtClean="0"/>
-              <a:t> </a:t>
-            </a:r>
-            <a:r>
-              <a:rPr lang="it-IT" sz="1600" dirty="0" err="1" smtClean="0"/>
-              <a:t>according</a:t>
-            </a:r>
-            <a:r>
-              <a:rPr lang="it-IT" sz="1600" dirty="0" smtClean="0"/>
-              <a:t> with </a:t>
-            </a:r>
-            <a:r>
-              <a:rPr lang="it-IT" sz="1600" dirty="0" err="1" smtClean="0"/>
-              <a:t>your</a:t>
-            </a:r>
-            <a:r>
-              <a:rPr lang="it-IT" sz="1600" dirty="0" smtClean="0"/>
-              <a:t> HW </a:t>
-            </a:r>
-            <a:r>
-              <a:rPr lang="it-IT" sz="1600" dirty="0" err="1" smtClean="0"/>
-              <a:t>configuration</a:t>
-            </a:r>
-            <a:endParaRPr lang="it-IT" sz="1600" dirty="0" smtClean="0"/>
-          </a:p>
-          <a:p>
-            <a:pPr marL="285750" indent="-285750">
-              <a:buFontTx/>
-              <a:buChar char="-"/>
+            <a:endParaRPr lang="it-IT" sz="1200" dirty="0" smtClean="0"/>
+          </a:p>
+          <a:p>
+            <a:endParaRPr lang="it-IT" sz="1200" dirty="0"/>
+          </a:p>
+          <a:p>
+            <a:endParaRPr lang="it-IT" sz="1200" dirty="0"/>
+          </a:p>
+          <a:p>
+            <a:pPr marL="228600" indent="-228600">
+              <a:buFont typeface="+mj-lt"/>
+              <a:buAutoNum type="arabicPeriod"/>
             </a:pPr>
-            <a:r>
-              <a:rPr lang="it-IT" sz="1600" dirty="0" err="1" smtClean="0"/>
-              <a:t>Launch</a:t>
-            </a:r>
-            <a:r>
-              <a:rPr lang="it-IT" sz="1600" dirty="0" smtClean="0"/>
-              <a:t> the CAREL_GME_Test.exe go to the panel on the right «Manual» </a:t>
-            </a:r>
-            <a:r>
-              <a:rPr lang="it-IT" sz="1600" dirty="0" err="1" smtClean="0"/>
-              <a:t>you</a:t>
-            </a:r>
-            <a:r>
-              <a:rPr lang="it-IT" sz="1600" dirty="0" smtClean="0"/>
-              <a:t> </a:t>
-            </a:r>
-            <a:r>
-              <a:rPr lang="it-IT" sz="1600" dirty="0" err="1" smtClean="0"/>
-              <a:t>will</a:t>
-            </a:r>
-            <a:r>
-              <a:rPr lang="it-IT" sz="1600" dirty="0" smtClean="0"/>
-              <a:t> </a:t>
-            </a:r>
-            <a:r>
-              <a:rPr lang="it-IT" sz="1600" dirty="0" err="1" smtClean="0"/>
-              <a:t>find</a:t>
-            </a:r>
-            <a:r>
-              <a:rPr lang="it-IT" sz="1600" dirty="0" smtClean="0"/>
-              <a:t> a </a:t>
-            </a:r>
-            <a:r>
-              <a:rPr lang="it-IT" sz="1600" dirty="0" err="1" smtClean="0"/>
-              <a:t>series</a:t>
-            </a:r>
-            <a:r>
-              <a:rPr lang="it-IT" sz="1600" dirty="0" smtClean="0"/>
-              <a:t> of </a:t>
-            </a:r>
-            <a:r>
-              <a:rPr lang="it-IT" sz="1600" dirty="0" err="1" smtClean="0"/>
-              <a:t>button</a:t>
-            </a:r>
-            <a:r>
-              <a:rPr lang="it-IT" sz="1600" dirty="0" smtClean="0"/>
-              <a:t/>
-            </a:r>
-            <a:br>
-              <a:rPr lang="it-IT" sz="1600" dirty="0" smtClean="0"/>
-            </a:br>
-            <a:r>
-              <a:rPr lang="it-IT" sz="1600" dirty="0" err="1" smtClean="0"/>
-              <a:t>check</a:t>
-            </a:r>
-            <a:r>
-              <a:rPr lang="it-IT" sz="1600" dirty="0" smtClean="0"/>
-              <a:t> the HW connection with the </a:t>
-            </a:r>
-            <a:r>
-              <a:rPr lang="it-IT" sz="1600" dirty="0" err="1" smtClean="0"/>
-              <a:t>aid</a:t>
-            </a:r>
-            <a:r>
-              <a:rPr lang="it-IT" sz="1600" dirty="0" smtClean="0"/>
-              <a:t> of </a:t>
-            </a:r>
-            <a:r>
-              <a:rPr lang="it-IT" sz="1600" dirty="0" err="1" smtClean="0"/>
-              <a:t>these</a:t>
-            </a:r>
-            <a:r>
-              <a:rPr lang="it-IT" sz="1600" dirty="0" smtClean="0"/>
-              <a:t> </a:t>
-            </a:r>
-            <a:r>
-              <a:rPr lang="it-IT" sz="1600" dirty="0" err="1" smtClean="0"/>
-              <a:t>buttons</a:t>
-            </a:r>
-            <a:r>
-              <a:rPr lang="it-IT" sz="1600" dirty="0" smtClean="0"/>
-              <a:t>.</a:t>
-            </a:r>
-            <a:br>
-              <a:rPr lang="it-IT" sz="1600" dirty="0" smtClean="0"/>
-            </a:br>
-            <a:r>
-              <a:rPr lang="it-IT" sz="1600" dirty="0" smtClean="0"/>
-              <a:t>  </a:t>
-            </a:r>
-            <a:endParaRPr lang="it-IT" sz="1600" dirty="0"/>
-          </a:p>
-          <a:p>
-            <a:endParaRPr lang="it-IT" sz="1600" dirty="0" smtClean="0"/>
-          </a:p>
-          <a:p>
-            <a:endParaRPr lang="it-IT" sz="1600" dirty="0"/>
-          </a:p>
-          <a:p>
-            <a:endParaRPr lang="it-IT" sz="1600" dirty="0" smtClean="0"/>
-          </a:p>
-          <a:p>
-            <a:endParaRPr lang="it-IT" sz="1600" dirty="0"/>
+            <a:endParaRPr lang="it-IT" sz="1200" dirty="0" smtClean="0"/>
+          </a:p>
+          <a:p>
+            <a:pPr marL="228600" indent="-228600">
+              <a:buFont typeface="+mj-lt"/>
+              <a:buAutoNum type="arabicPeriod"/>
+            </a:pPr>
+            <a:endParaRPr lang="it-IT" sz="1200" dirty="0" smtClean="0"/>
+          </a:p>
+          <a:p>
+            <a:pPr marL="228600" indent="-228600">
+              <a:buFont typeface="+mj-lt"/>
+              <a:buAutoNum type="arabicPeriod"/>
+            </a:pPr>
+            <a:endParaRPr lang="it-IT" sz="1200" dirty="0"/>
           </a:p>
         </p:txBody>
       </p:sp>
     </p:spTree>
     <p:extLst>
       <p:ext uri="{BB962C8B-B14F-4D97-AF65-F5344CB8AC3E}">
-        <p14:creationId xmlns:p14="http://schemas.microsoft.com/office/powerpoint/2010/main" val="355755430"/>
+        <p14:creationId xmlns:p14="http://schemas.microsoft.com/office/powerpoint/2010/main" val="4078384206"/>
       </p:ext>
     </p:extLst>
   </p:cSld>
@@ -3687,11 +4011,7 @@
             </a:r>
             <a:r>
               <a:rPr lang="it-IT" sz="2400" dirty="0" smtClean="0"/>
-              <a:t> </a:t>
-            </a:r>
-            <a:r>
-              <a:rPr lang="it-IT" sz="2400" dirty="0" smtClean="0"/>
-              <a:t>– HW part</a:t>
+              <a:t> – HW part</a:t>
             </a:r>
             <a:endParaRPr lang="it-IT" sz="2400" dirty="0"/>
           </a:p>
@@ -3949,13 +4269,8 @@
           <a:p>
             <a:r>
               <a:rPr lang="en-US" sz="1600" dirty="0" smtClean="0"/>
-              <a:t>   1 - the serial protocol used to interact with the HW </a:t>
-            </a:r>
-            <a:r>
-              <a:rPr lang="en-US" sz="1600" dirty="0" smtClean="0"/>
-              <a:t>I/O module.   </a:t>
-            </a:r>
-            <a:endParaRPr lang="en-US" sz="1600" dirty="0" smtClean="0"/>
+              <a:t>   1 - the serial protocol used to interact with the HW I/O module.   </a:t>
+            </a:r>
           </a:p>
           <a:p>
             <a:r>
@@ -3980,15 +4295,7 @@
           <a:p>
             <a:r>
               <a:rPr lang="en-US" sz="1600" dirty="0" smtClean="0"/>
-              <a:t>   3 - the test </a:t>
-            </a:r>
-            <a:r>
-              <a:rPr lang="en-US" sz="1600" dirty="0" smtClean="0"/>
-              <a:t>list</a:t>
-            </a:r>
-            <a:r>
-              <a:rPr lang="en-US" sz="1600" dirty="0" smtClean="0"/>
-              <a:t/>
+              <a:t>   3 - the test list</a:t>
             </a:r>
             <a:br>
               <a:rPr lang="en-US" sz="1600" dirty="0" smtClean="0"/>
@@ -4072,19 +4379,7 @@
           <a:p>
             <a:r>
               <a:rPr lang="en-US" sz="1600" dirty="0" smtClean="0"/>
-              <a:t>     and use the test demo SW as </a:t>
-            </a:r>
-            <a:r>
-              <a:rPr lang="en-US" sz="1600" dirty="0" smtClean="0"/>
-              <a:t>an </a:t>
-            </a:r>
-            <a:r>
-              <a:rPr lang="en-US" sz="1600" dirty="0" smtClean="0"/>
-              <a:t>implementation reference. </a:t>
-            </a:r>
-            <a:r>
-              <a:rPr lang="en-US" sz="1600" dirty="0" smtClean="0"/>
-              <a:t/>
+              <a:t>     and use the test demo SW as an implementation reference. </a:t>
             </a:r>
             <a:br>
               <a:rPr lang="en-US" sz="1600" dirty="0" smtClean="0"/>
@@ -6882,8 +7177,8 @@
         </p:nvSpPr>
         <p:spPr>
           <a:xfrm>
-            <a:off x="166255" y="101600"/>
-            <a:ext cx="7892106" cy="369332"/>
+            <a:off x="166255" y="80836"/>
+            <a:ext cx="7892106" cy="461665"/>
           </a:xfrm>
           <a:prstGeom prst="rect">
             <a:avLst/>
@@ -6897,22 +7192,22 @@
           <a:lstStyle/>
           <a:p>
             <a:r>
-              <a:rPr lang="it-IT" dirty="0" smtClean="0"/>
+              <a:rPr lang="it-IT" sz="2400" dirty="0" smtClean="0"/>
               <a:t>Test HW </a:t>
             </a:r>
             <a:r>
-              <a:rPr lang="it-IT" dirty="0" err="1" smtClean="0"/>
+              <a:rPr lang="it-IT" sz="2400" dirty="0" err="1" smtClean="0"/>
               <a:t>block</a:t>
             </a:r>
             <a:r>
-              <a:rPr lang="it-IT" dirty="0" smtClean="0"/>
+              <a:rPr lang="it-IT" sz="2400" dirty="0" smtClean="0"/>
               <a:t> </a:t>
             </a:r>
             <a:r>
-              <a:rPr lang="it-IT" dirty="0" err="1" smtClean="0"/>
+              <a:rPr lang="it-IT" sz="2400" dirty="0" err="1" smtClean="0"/>
               <a:t>diagram</a:t>
             </a:r>
-            <a:endParaRPr lang="it-IT" dirty="0"/>
+            <a:endParaRPr lang="it-IT" sz="2400" dirty="0"/>
           </a:p>
         </p:txBody>
       </p:sp>
@@ -8086,7 +8381,7 @@
         <p:spPr>
           <a:xfrm>
             <a:off x="0" y="92364"/>
-            <a:ext cx="11804073" cy="369332"/>
+            <a:ext cx="11804073" cy="461665"/>
           </a:xfrm>
           <a:prstGeom prst="rect">
             <a:avLst/>
@@ -8100,10 +8395,10 @@
           <a:lstStyle/>
           <a:p>
             <a:r>
-              <a:rPr lang="it-IT" dirty="0" smtClean="0"/>
+              <a:rPr lang="it-IT" sz="2400" dirty="0" smtClean="0"/>
               <a:t>Gateway Middle End (GME) test FW</a:t>
             </a:r>
-            <a:endParaRPr lang="it-IT" dirty="0"/>
+            <a:endParaRPr lang="it-IT" sz="2400" dirty="0"/>
           </a:p>
         </p:txBody>
       </p:sp>
@@ -8131,15 +8426,7 @@
           <a:p>
             <a:r>
               <a:rPr lang="en-US" dirty="0" smtClean="0"/>
-              <a:t>The GME have a test FW inside, if during the power </a:t>
-            </a:r>
-            <a:r>
-              <a:rPr lang="en-US" dirty="0" smtClean="0"/>
-              <a:t>on or a reset, </a:t>
-            </a:r>
-            <a:r>
-              <a:rPr lang="en-US" dirty="0" smtClean="0"/>
-              <a:t>the test point TP5  is connected to ground the GME start in test mode.</a:t>
+              <a:t>The GME have a test FW inside, if during the power on or a reset, the test point TP5  is connected to ground the GME start in test mode.</a:t>
             </a:r>
             <a:br>
               <a:rPr lang="en-US" dirty="0" smtClean="0"/>
@@ -8351,7 +8638,7 @@
         <p:spPr>
           <a:xfrm>
             <a:off x="0" y="92364"/>
-            <a:ext cx="11804073" cy="369332"/>
+            <a:ext cx="11804073" cy="461665"/>
           </a:xfrm>
           <a:prstGeom prst="rect">
             <a:avLst/>
@@ -8365,10 +8652,10 @@
           <a:lstStyle/>
           <a:p>
             <a:r>
-              <a:rPr lang="it-IT" dirty="0" smtClean="0"/>
+              <a:rPr lang="it-IT" sz="2400" dirty="0" smtClean="0"/>
               <a:t>Gateway Middle End (GME) test FW  </a:t>
             </a:r>
-            <a:endParaRPr lang="it-IT" dirty="0"/>
+            <a:endParaRPr lang="it-IT" sz="2400" dirty="0"/>
           </a:p>
         </p:txBody>
       </p:sp>
@@ -8767,8 +9054,8 @@
         </p:nvSpPr>
         <p:spPr>
           <a:xfrm>
-            <a:off x="161925" y="142875"/>
-            <a:ext cx="11744325" cy="4339650"/>
+            <a:off x="175491" y="147782"/>
+            <a:ext cx="11914909" cy="461665"/>
           </a:xfrm>
           <a:prstGeom prst="rect">
             <a:avLst/>
@@ -8783,488 +9070,527 @@
           <a:p>
             <a:r>
               <a:rPr lang="it-IT" sz="2400" dirty="0" smtClean="0"/>
-              <a:t>Test </a:t>
+              <a:t>HW </a:t>
             </a:r>
             <a:r>
               <a:rPr lang="it-IT" sz="2400" dirty="0" err="1" smtClean="0"/>
-              <a:t>sequence</a:t>
+              <a:t>Pre</a:t>
             </a:r>
             <a:r>
               <a:rPr lang="it-IT" sz="2400" dirty="0" smtClean="0"/>
-              <a:t>  </a:t>
-            </a:r>
-            <a:r>
-              <a:rPr lang="it-IT" sz="2400" dirty="0" err="1" smtClean="0">
-                <a:solidFill>
-                  <a:srgbClr val="FF0000"/>
-                </a:solidFill>
+              <a:t>-requisite</a:t>
+            </a:r>
+            <a:endParaRPr lang="it-IT" sz="2400" dirty="0"/>
+          </a:p>
+        </p:txBody>
+      </p:sp>
+      <p:sp>
+        <p:nvSpPr>
+          <p:cNvPr id="5" name="CasellaDiTesto 4"/>
+          <p:cNvSpPr txBox="1"/>
+          <p:nvPr/>
+        </p:nvSpPr>
+        <p:spPr>
+          <a:xfrm>
+            <a:off x="175491" y="942109"/>
+            <a:ext cx="11914909" cy="5016758"/>
+          </a:xfrm>
+          <a:prstGeom prst="rect">
+            <a:avLst/>
+          </a:prstGeom>
+          <a:noFill/>
+        </p:spPr>
+        <p:txBody>
+          <a:bodyPr wrap="square" rtlCol="0">
+            <a:spAutoFit/>
+          </a:bodyPr>
+          <a:lstStyle/>
+          <a:p>
+            <a:r>
+              <a:rPr lang="it-IT" sz="1600" dirty="0" smtClean="0"/>
+              <a:t>To </a:t>
+            </a:r>
+            <a:r>
+              <a:rPr lang="it-IT" sz="1600" dirty="0" err="1" smtClean="0"/>
+              <a:t>program</a:t>
+            </a:r>
+            <a:r>
+              <a:rPr lang="it-IT" sz="1600" dirty="0" smtClean="0"/>
+              <a:t> the Arduino </a:t>
+            </a:r>
+            <a:r>
+              <a:rPr lang="it-IT" sz="1600" dirty="0" err="1" smtClean="0"/>
+              <a:t>board</a:t>
+            </a:r>
+            <a:r>
+              <a:rPr lang="it-IT" sz="1600" dirty="0" smtClean="0"/>
+              <a:t> </a:t>
+            </a:r>
+            <a:r>
+              <a:rPr lang="it-IT" sz="1600" dirty="0" err="1" smtClean="0"/>
+              <a:t>install</a:t>
+            </a:r>
+            <a:r>
+              <a:rPr lang="it-IT" sz="1600" dirty="0" smtClean="0"/>
+              <a:t> the Arduino IDE </a:t>
+            </a:r>
+            <a:r>
+              <a:rPr lang="it-IT" sz="1600" dirty="0" err="1" smtClean="0"/>
+              <a:t>at</a:t>
+            </a:r>
+            <a:r>
+              <a:rPr lang="it-IT" sz="1600" dirty="0" smtClean="0"/>
+              <a:t> </a:t>
+            </a:r>
+            <a:r>
+              <a:rPr lang="it-IT" sz="1600" dirty="0" err="1" smtClean="0"/>
+              <a:t>this</a:t>
+            </a:r>
+            <a:r>
+              <a:rPr lang="it-IT" sz="1600" dirty="0" smtClean="0"/>
+              <a:t> link </a:t>
+            </a:r>
+            <a:r>
+              <a:rPr lang="it-IT" sz="1600" dirty="0" smtClean="0">
+                <a:hlinkClick r:id="rId2"/>
               </a:rPr>
-              <a:t>Not</a:t>
-            </a:r>
-            <a:r>
-              <a:rPr lang="it-IT" sz="2400" dirty="0" smtClean="0">
-                <a:solidFill>
-                  <a:srgbClr val="FF0000"/>
-                </a:solidFill>
+              <a:t>https</a:t>
+            </a:r>
+            <a:r>
+              <a:rPr lang="it-IT" sz="1600" dirty="0">
+                <a:hlinkClick r:id="rId2"/>
               </a:rPr>
+              <a:t>://</a:t>
+            </a:r>
+            <a:r>
+              <a:rPr lang="it-IT" sz="1600" dirty="0" smtClean="0">
+                <a:hlinkClick r:id="rId2"/>
+              </a:rPr>
+              <a:t>www.arduino.cc/en/main/software</a:t>
+            </a:r>
+            <a:r>
+              <a:rPr lang="it-IT" sz="1600" dirty="0" smtClean="0"/>
+              <a:t/>
+            </a:r>
+            <a:br>
+              <a:rPr lang="it-IT" sz="1600" dirty="0" smtClean="0"/>
+            </a:br>
+            <a:r>
+              <a:rPr lang="it-IT" sz="1600" dirty="0" smtClean="0"/>
+              <a:t>and </a:t>
+            </a:r>
+            <a:r>
+              <a:rPr lang="it-IT" sz="1600" dirty="0" err="1" smtClean="0"/>
+              <a:t>follow</a:t>
+            </a:r>
+            <a:r>
+              <a:rPr lang="it-IT" sz="1600" dirty="0" smtClean="0"/>
               <a:t> </a:t>
             </a:r>
             <a:r>
-              <a:rPr lang="it-IT" sz="2400" dirty="0" err="1" smtClean="0">
-                <a:solidFill>
-                  <a:srgbClr val="FF0000"/>
-                </a:solidFill>
-              </a:rPr>
-              <a:t>completed</a:t>
-            </a:r>
-            <a:r>
-              <a:rPr lang="it-IT" sz="2400" dirty="0" smtClean="0"/>
+              <a:rPr lang="it-IT" sz="1600" dirty="0" err="1" smtClean="0"/>
+              <a:t>this</a:t>
+            </a:r>
+            <a:r>
+              <a:rPr lang="it-IT" sz="1600" dirty="0" smtClean="0"/>
               <a:t> </a:t>
             </a:r>
             <a:r>
-              <a:rPr lang="it-IT" sz="2400" dirty="0" err="1" smtClean="0">
-                <a:solidFill>
-                  <a:srgbClr val="FF0000"/>
-                </a:solidFill>
-              </a:rPr>
-              <a:t>will</a:t>
-            </a:r>
-            <a:r>
-              <a:rPr lang="it-IT" sz="2400" dirty="0" smtClean="0">
-                <a:solidFill>
-                  <a:srgbClr val="FF0000"/>
-                </a:solidFill>
-              </a:rPr>
-              <a:t> update </a:t>
-            </a:r>
-            <a:r>
-              <a:rPr lang="it-IT" sz="2400" dirty="0" err="1" smtClean="0">
-                <a:solidFill>
-                  <a:srgbClr val="FF0000"/>
-                </a:solidFill>
-              </a:rPr>
+              <a:rPr lang="it-IT" sz="1600" dirty="0" err="1" smtClean="0"/>
+              <a:t>steps</a:t>
+            </a:r>
+            <a:endParaRPr lang="it-IT" sz="1600" dirty="0" smtClean="0"/>
+          </a:p>
+          <a:p>
+            <a:pPr marL="285750" indent="-285750">
+              <a:buFontTx/>
+              <a:buChar char="-"/>
+            </a:pPr>
+            <a:r>
+              <a:rPr lang="it-IT" sz="1600" dirty="0" err="1" smtClean="0"/>
+              <a:t>Launch</a:t>
+            </a:r>
+            <a:r>
+              <a:rPr lang="it-IT" sz="1600" dirty="0" smtClean="0"/>
+              <a:t> the Arduino IDE </a:t>
+            </a:r>
+          </a:p>
+          <a:p>
+            <a:pPr marL="285750" indent="-285750">
+              <a:buFontTx/>
+              <a:buChar char="-"/>
+            </a:pPr>
+            <a:r>
+              <a:rPr lang="it-IT" sz="1600" dirty="0"/>
+              <a:t>File &gt; Open the file &gt; </a:t>
+            </a:r>
+            <a:r>
+              <a:rPr lang="it-IT" sz="1600" dirty="0" smtClean="0"/>
+              <a:t>C780_HW_Test_Arduino_FW.ino</a:t>
+            </a:r>
+          </a:p>
+          <a:p>
+            <a:pPr marL="285750" indent="-285750">
+              <a:buFontTx/>
+              <a:buChar char="-"/>
+            </a:pPr>
+            <a:r>
+              <a:rPr lang="it-IT" sz="1600" dirty="0" err="1" smtClean="0"/>
+              <a:t>Choose</a:t>
+            </a:r>
+            <a:r>
+              <a:rPr lang="it-IT" sz="1600" dirty="0" smtClean="0"/>
+              <a:t> on  Port &gt; the serial </a:t>
+            </a:r>
+            <a:r>
+              <a:rPr lang="it-IT" sz="1600" dirty="0" err="1" smtClean="0"/>
+              <a:t>port</a:t>
+            </a:r>
+            <a:r>
+              <a:rPr lang="it-IT" sz="1600" dirty="0" smtClean="0"/>
+              <a:t> of the Arduino Uno </a:t>
+            </a:r>
+            <a:r>
+              <a:rPr lang="it-IT" sz="1600" dirty="0" err="1" smtClean="0"/>
+              <a:t>board</a:t>
+            </a:r>
+            <a:endParaRPr lang="it-IT" sz="1600" dirty="0" smtClean="0"/>
+          </a:p>
+          <a:p>
+            <a:pPr marL="285750" indent="-285750">
+              <a:buFontTx/>
+              <a:buChar char="-"/>
+            </a:pPr>
+            <a:r>
+              <a:rPr lang="it-IT" sz="1600" dirty="0" err="1" smtClean="0"/>
+              <a:t>Choose</a:t>
+            </a:r>
+            <a:r>
+              <a:rPr lang="it-IT" sz="1600" dirty="0" smtClean="0"/>
+              <a:t> from Board &gt; «Arduino/Genuino Uno» [</a:t>
+            </a:r>
+            <a:r>
+              <a:rPr lang="it-IT" sz="1600" dirty="0" err="1" smtClean="0"/>
+              <a:t>normally</a:t>
+            </a:r>
+            <a:r>
+              <a:rPr lang="it-IT" sz="1600" dirty="0" smtClean="0"/>
+              <a:t> the default]</a:t>
+            </a:r>
+          </a:p>
+          <a:p>
+            <a:pPr marL="285750" indent="-285750">
+              <a:buFontTx/>
+              <a:buChar char="-"/>
+            </a:pPr>
+            <a:r>
+              <a:rPr lang="it-IT" sz="1600" dirty="0" smtClean="0"/>
+              <a:t>Press the </a:t>
+            </a:r>
+            <a:r>
+              <a:rPr lang="it-IT" sz="1600" dirty="0" err="1" smtClean="0"/>
+              <a:t>button</a:t>
+            </a:r>
+            <a:r>
+              <a:rPr lang="it-IT" sz="1600" dirty="0" smtClean="0"/>
+              <a:t>		</a:t>
+            </a:r>
+          </a:p>
+          <a:p>
+            <a:pPr marL="285750" indent="-285750">
+              <a:buFontTx/>
+              <a:buChar char="-"/>
+            </a:pPr>
+            <a:r>
+              <a:rPr lang="it-IT" sz="1600" dirty="0" err="1" smtClean="0"/>
+              <a:t>Wait</a:t>
+            </a:r>
+            <a:r>
+              <a:rPr lang="it-IT" sz="1600" dirty="0" smtClean="0"/>
+              <a:t> the End of the </a:t>
+            </a:r>
+            <a:r>
+              <a:rPr lang="it-IT" sz="1600" dirty="0" err="1" smtClean="0"/>
+              <a:t>operation</a:t>
+            </a:r>
+            <a:endParaRPr lang="it-IT" sz="1600" dirty="0" smtClean="0"/>
+          </a:p>
+          <a:p>
+            <a:endParaRPr lang="it-IT" sz="1600" dirty="0" smtClean="0"/>
+          </a:p>
+          <a:p>
+            <a:r>
+              <a:rPr lang="it-IT" sz="1600" dirty="0" smtClean="0"/>
+              <a:t>To </a:t>
+            </a:r>
+            <a:r>
+              <a:rPr lang="it-IT" sz="1600" dirty="0" err="1" smtClean="0"/>
+              <a:t>quick</a:t>
+            </a:r>
+            <a:r>
+              <a:rPr lang="it-IT" sz="1600" dirty="0" smtClean="0"/>
+              <a:t> </a:t>
+            </a:r>
+            <a:r>
+              <a:rPr lang="it-IT" sz="1600" dirty="0" err="1" smtClean="0"/>
+              <a:t>check</a:t>
+            </a:r>
+            <a:r>
+              <a:rPr lang="it-IT" sz="1600" dirty="0" smtClean="0"/>
+              <a:t> </a:t>
+            </a:r>
+            <a:r>
+              <a:rPr lang="it-IT" sz="1600" dirty="0" err="1" smtClean="0"/>
+              <a:t>if</a:t>
+            </a:r>
+            <a:r>
+              <a:rPr lang="it-IT" sz="1600" dirty="0" smtClean="0"/>
+              <a:t> the </a:t>
+            </a:r>
+            <a:r>
+              <a:rPr lang="it-IT" sz="1600" dirty="0" err="1" smtClean="0"/>
+              <a:t>board</a:t>
+            </a:r>
+            <a:r>
+              <a:rPr lang="it-IT" sz="1600" dirty="0" smtClean="0"/>
+              <a:t> </a:t>
+            </a:r>
+            <a:r>
+              <a:rPr lang="it-IT" sz="1600" dirty="0" err="1" smtClean="0"/>
+              <a:t>is</a:t>
+            </a:r>
+            <a:r>
+              <a:rPr lang="it-IT" sz="1600" dirty="0" smtClean="0"/>
+              <a:t> </a:t>
+            </a:r>
+            <a:r>
+              <a:rPr lang="it-IT" sz="1600" dirty="0" err="1" smtClean="0"/>
+              <a:t>programmed</a:t>
+            </a:r>
+            <a:r>
+              <a:rPr lang="it-IT" sz="1600" dirty="0" smtClean="0"/>
+              <a:t> right :</a:t>
+            </a:r>
+          </a:p>
+          <a:p>
+            <a:pPr marL="285750" indent="-285750">
+              <a:buFontTx/>
+              <a:buChar char="-"/>
+            </a:pPr>
+            <a:r>
+              <a:rPr lang="it-IT" sz="1600" dirty="0" smtClean="0"/>
+              <a:t>Press the </a:t>
+            </a:r>
+            <a:r>
+              <a:rPr lang="it-IT" sz="1600" dirty="0" err="1" smtClean="0"/>
+              <a:t>button</a:t>
+            </a:r>
+            <a:endParaRPr lang="it-IT" sz="1600" dirty="0" smtClean="0"/>
+          </a:p>
+          <a:p>
+            <a:pPr marL="285750" indent="-285750">
+              <a:buFontTx/>
+              <a:buChar char="-"/>
+            </a:pPr>
+            <a:r>
+              <a:rPr lang="it-IT" sz="1600" dirty="0" smtClean="0"/>
+              <a:t>A terminal </a:t>
+            </a:r>
+            <a:r>
+              <a:rPr lang="it-IT" sz="1600" dirty="0" err="1" smtClean="0"/>
+              <a:t>appear</a:t>
+            </a:r>
+            <a:r>
+              <a:rPr lang="it-IT" sz="1600" dirty="0" smtClean="0"/>
+              <a:t> </a:t>
+            </a:r>
+            <a:r>
+              <a:rPr lang="it-IT" sz="1600" dirty="0" err="1" smtClean="0"/>
+              <a:t>check</a:t>
+            </a:r>
+            <a:r>
+              <a:rPr lang="it-IT" sz="1600" dirty="0" smtClean="0"/>
+              <a:t> </a:t>
+            </a:r>
+            <a:r>
+              <a:rPr lang="it-IT" sz="1600" dirty="0" err="1" smtClean="0"/>
               <a:t>at</a:t>
             </a:r>
             <a:r>
-              <a:rPr lang="it-IT" sz="2400" dirty="0" smtClean="0">
-                <a:solidFill>
-                  <a:srgbClr val="FF0000"/>
-                </a:solidFill>
-              </a:rPr>
-              <a:t> the end of </a:t>
-            </a:r>
-            <a:r>
-              <a:rPr lang="it-IT" sz="2400" dirty="0" err="1" smtClean="0">
-                <a:solidFill>
-                  <a:srgbClr val="FF0000"/>
-                </a:solidFill>
-              </a:rPr>
-              <a:t>development</a:t>
-            </a:r>
-            <a:endParaRPr lang="it-IT" sz="1200" dirty="0" smtClean="0">
-              <a:solidFill>
-                <a:srgbClr val="FF0000"/>
-              </a:solidFill>
-            </a:endParaRPr>
-          </a:p>
-          <a:p>
-            <a:pPr marL="228600" indent="-228600">
-              <a:buFont typeface="+mj-lt"/>
-              <a:buAutoNum type="arabicPeriod"/>
+              <a:rPr lang="it-IT" sz="1600" dirty="0" smtClean="0"/>
+              <a:t> the botton of the </a:t>
+            </a:r>
+            <a:r>
+              <a:rPr lang="it-IT" sz="1600" dirty="0" err="1" smtClean="0"/>
+              <a:t>window</a:t>
+            </a:r>
+            <a:r>
+              <a:rPr lang="it-IT" sz="1600" dirty="0" smtClean="0"/>
+              <a:t> </a:t>
+            </a:r>
+            <a:r>
+              <a:rPr lang="it-IT" sz="1600" dirty="0" err="1" smtClean="0"/>
+              <a:t>that</a:t>
+            </a:r>
+            <a:r>
+              <a:rPr lang="it-IT" sz="1600" dirty="0" smtClean="0"/>
+              <a:t> the </a:t>
+            </a:r>
+            <a:r>
+              <a:rPr lang="it-IT" sz="1600" dirty="0" err="1" smtClean="0"/>
+              <a:t>baudrate</a:t>
+            </a:r>
+            <a:r>
+              <a:rPr lang="it-IT" sz="1600" dirty="0" smtClean="0"/>
+              <a:t> </a:t>
+            </a:r>
+            <a:r>
+              <a:rPr lang="it-IT" sz="1600" dirty="0" err="1" smtClean="0"/>
+              <a:t>is</a:t>
+            </a:r>
+            <a:r>
+              <a:rPr lang="it-IT" sz="1600" dirty="0" smtClean="0"/>
+              <a:t> 115200</a:t>
+            </a:r>
+          </a:p>
+          <a:p>
+            <a:pPr marL="285750" indent="-285750">
+              <a:buFontTx/>
+              <a:buChar char="-"/>
             </a:pPr>
             <a:r>
-              <a:rPr lang="it-IT" sz="1200" dirty="0" err="1" smtClean="0"/>
-              <a:t>All</a:t>
-            </a:r>
-            <a:r>
-              <a:rPr lang="it-IT" sz="1200" dirty="0" smtClean="0"/>
-              <a:t> relè open</a:t>
-            </a:r>
-          </a:p>
-          <a:p>
-            <a:pPr marL="228600" indent="-228600">
-              <a:buFont typeface="+mj-lt"/>
-              <a:buAutoNum type="arabicPeriod"/>
+              <a:rPr lang="it-IT" sz="1600" dirty="0" smtClean="0"/>
+              <a:t>In the top box </a:t>
+            </a:r>
+            <a:r>
+              <a:rPr lang="it-IT" sz="1600" dirty="0" err="1" smtClean="0"/>
+              <a:t>type</a:t>
+            </a:r>
+            <a:r>
+              <a:rPr lang="it-IT" sz="1600" dirty="0" smtClean="0"/>
+              <a:t> «V» + </a:t>
+            </a:r>
+            <a:r>
+              <a:rPr lang="it-IT" sz="1600" dirty="0" err="1" smtClean="0"/>
+              <a:t>Enter</a:t>
+            </a:r>
+            <a:endParaRPr lang="it-IT" sz="1600" dirty="0" smtClean="0"/>
+          </a:p>
+          <a:p>
+            <a:pPr marL="285750" indent="-285750">
+              <a:buFontTx/>
+              <a:buChar char="-"/>
             </a:pPr>
             <a:r>
-              <a:rPr lang="it-IT" sz="1200" dirty="0" smtClean="0"/>
-              <a:t>Close R4</a:t>
-            </a:r>
-          </a:p>
-          <a:p>
-            <a:pPr marL="228600" indent="-228600">
-              <a:buFont typeface="+mj-lt"/>
-              <a:buAutoNum type="arabicPeriod"/>
-            </a:pPr>
-            <a:r>
-              <a:rPr lang="it-IT" sz="1200" dirty="0" smtClean="0"/>
-              <a:t>Close R2</a:t>
-            </a:r>
-          </a:p>
-          <a:p>
-            <a:pPr marL="228600" indent="-228600">
-              <a:buFont typeface="+mj-lt"/>
-              <a:buAutoNum type="arabicPeriod"/>
-            </a:pPr>
-            <a:r>
-              <a:rPr lang="it-IT" sz="1200" dirty="0" smtClean="0"/>
-              <a:t>Close R1</a:t>
-            </a:r>
-          </a:p>
-          <a:p>
-            <a:pPr marL="228600" indent="-228600">
-              <a:buFont typeface="+mj-lt"/>
-              <a:buAutoNum type="arabicPeriod"/>
-            </a:pPr>
-            <a:r>
-              <a:rPr lang="it-IT" sz="1200" dirty="0" err="1" smtClean="0"/>
-              <a:t>Wait</a:t>
-            </a:r>
-            <a:r>
-              <a:rPr lang="it-IT" sz="1200" dirty="0" smtClean="0"/>
-              <a:t> 0,5 sec.</a:t>
-            </a:r>
-          </a:p>
-          <a:p>
-            <a:pPr marL="228600" indent="-228600">
-              <a:buFont typeface="+mj-lt"/>
-              <a:buAutoNum type="arabicPeriod"/>
-            </a:pPr>
-            <a:r>
-              <a:rPr lang="it-IT" sz="1200" dirty="0" err="1" smtClean="0"/>
-              <a:t>Measure</a:t>
-            </a:r>
-            <a:r>
-              <a:rPr lang="it-IT" sz="1200" dirty="0" smtClean="0"/>
-              <a:t> TP_3V3, </a:t>
-            </a:r>
-            <a:r>
-              <a:rPr lang="it-IT" sz="1200" dirty="0" err="1" smtClean="0"/>
-              <a:t>if</a:t>
-            </a:r>
-            <a:r>
-              <a:rPr lang="it-IT" sz="1200" dirty="0" smtClean="0"/>
-              <a:t> &gt;= 3,1 and &lt;= 3,5 </a:t>
-            </a:r>
-            <a:r>
-              <a:rPr lang="it-IT" sz="1200" dirty="0" err="1" smtClean="0"/>
-              <a:t>if</a:t>
-            </a:r>
-            <a:r>
-              <a:rPr lang="it-IT" sz="1200" dirty="0" smtClean="0"/>
-              <a:t> yes go </a:t>
-            </a:r>
-            <a:r>
-              <a:rPr lang="it-IT" sz="1200" dirty="0" err="1" smtClean="0"/>
-              <a:t>ahead</a:t>
-            </a:r>
-            <a:r>
-              <a:rPr lang="it-IT" sz="1200" dirty="0" smtClean="0"/>
+              <a:rPr lang="it-IT" sz="1600" dirty="0" smtClean="0"/>
+              <a:t>The </a:t>
+            </a:r>
+            <a:r>
+              <a:rPr lang="it-IT" sz="1600" dirty="0" err="1" smtClean="0"/>
+              <a:t>board</a:t>
+            </a:r>
+            <a:r>
+              <a:rPr lang="it-IT" sz="1600" dirty="0" smtClean="0"/>
               <a:t> </a:t>
             </a:r>
             <a:r>
-              <a:rPr lang="it-IT" sz="1200" dirty="0" err="1" smtClean="0"/>
-              <a:t>otherwise</a:t>
-            </a:r>
-            <a:r>
-              <a:rPr lang="it-IT" sz="1200" dirty="0" smtClean="0"/>
-              <a:t> stop the test</a:t>
-            </a:r>
-          </a:p>
-          <a:p>
-            <a:pPr marL="228600" indent="-228600">
-              <a:buFont typeface="+mj-lt"/>
-              <a:buAutoNum type="arabicPeriod"/>
-            </a:pPr>
-            <a:r>
-              <a:rPr lang="it-IT" sz="1200" dirty="0" smtClean="0"/>
-              <a:t>Open R4</a:t>
-            </a:r>
-          </a:p>
-          <a:p>
-            <a:pPr marL="228600" indent="-228600">
-              <a:buFont typeface="+mj-lt"/>
-              <a:buAutoNum type="arabicPeriod"/>
-            </a:pPr>
-            <a:r>
-              <a:rPr lang="it-IT" sz="1200" dirty="0" err="1" smtClean="0"/>
-              <a:t>Wait</a:t>
-            </a:r>
-            <a:r>
-              <a:rPr lang="it-IT" sz="1200" dirty="0" smtClean="0"/>
-              <a:t> 1 sec</a:t>
-            </a:r>
-          </a:p>
-          <a:p>
-            <a:pPr marL="228600" indent="-228600">
-              <a:buFont typeface="+mj-lt"/>
-              <a:buAutoNum type="arabicPeriod"/>
-            </a:pPr>
-            <a:r>
-              <a:rPr lang="it-IT" sz="1200" dirty="0" smtClean="0"/>
-              <a:t>Open R2</a:t>
-            </a:r>
-          </a:p>
-          <a:p>
-            <a:pPr marL="228600" indent="-228600">
-              <a:buFont typeface="+mj-lt"/>
-              <a:buAutoNum type="arabicPeriod"/>
-            </a:pPr>
-            <a:r>
-              <a:rPr lang="it-IT" sz="1200" dirty="0" smtClean="0"/>
-              <a:t>Call the routine to transfer the FW to the </a:t>
-            </a:r>
-            <a:r>
-              <a:rPr lang="it-IT" sz="1200" dirty="0" err="1" smtClean="0"/>
-              <a:t>device</a:t>
-            </a:r>
-            <a:r>
-              <a:rPr lang="it-IT" sz="1200" dirty="0" smtClean="0"/>
-              <a:t>, </a:t>
-            </a:r>
-            <a:r>
-              <a:rPr lang="it-IT" sz="1200" dirty="0" err="1" smtClean="0"/>
-              <a:t>wait</a:t>
-            </a:r>
-            <a:r>
-              <a:rPr lang="it-IT" sz="1200" dirty="0" smtClean="0"/>
-              <a:t> the end, </a:t>
-            </a:r>
-            <a:r>
-              <a:rPr lang="it-IT" sz="1200" dirty="0" err="1" smtClean="0"/>
-              <a:t>check</a:t>
-            </a:r>
-            <a:r>
-              <a:rPr lang="it-IT" sz="1200" dirty="0" smtClean="0"/>
+              <a:rPr lang="it-IT" sz="1600" dirty="0" err="1" smtClean="0"/>
+              <a:t>respond</a:t>
+            </a:r>
+            <a:r>
+              <a:rPr lang="it-IT" sz="1600" dirty="0" smtClean="0"/>
+              <a:t>  «V=0» </a:t>
+            </a:r>
+            <a:r>
+              <a:rPr lang="it-IT" sz="1600" dirty="0" smtClean="0"/>
+              <a:t>or </a:t>
+            </a:r>
+            <a:r>
+              <a:rPr lang="it-IT" sz="1600" dirty="0" err="1" smtClean="0"/>
+              <a:t>similar</a:t>
+            </a:r>
+            <a:r>
+              <a:rPr lang="it-IT" sz="1600" dirty="0" smtClean="0"/>
               <a:t> </a:t>
             </a:r>
             <a:r>
-              <a:rPr lang="it-IT" sz="1200" dirty="0" err="1" smtClean="0"/>
-              <a:t>if</a:t>
-            </a:r>
-            <a:r>
-              <a:rPr lang="it-IT" sz="1200" dirty="0" smtClean="0"/>
-              <a:t> ok go </a:t>
-            </a:r>
-            <a:r>
-              <a:rPr lang="it-IT" sz="1200" dirty="0" err="1" smtClean="0"/>
-              <a:t>ahead</a:t>
-            </a:r>
-            <a:r>
-              <a:rPr lang="it-IT" sz="1200" dirty="0" smtClean="0"/>
-              <a:t> </a:t>
-            </a:r>
-            <a:r>
-              <a:rPr lang="it-IT" sz="1200" dirty="0" err="1" smtClean="0"/>
-              <a:t>otherwise</a:t>
-            </a:r>
-            <a:r>
-              <a:rPr lang="it-IT" sz="1200" dirty="0" smtClean="0"/>
-              <a:t> stop the test</a:t>
-            </a:r>
-          </a:p>
-          <a:p>
-            <a:pPr marL="228600" indent="-228600">
-              <a:buFont typeface="+mj-lt"/>
-              <a:buAutoNum type="arabicPeriod"/>
-            </a:pPr>
-            <a:r>
-              <a:rPr lang="it-IT" sz="1200" dirty="0" err="1" smtClean="0"/>
-              <a:t>Ask</a:t>
-            </a:r>
-            <a:r>
-              <a:rPr lang="it-IT" sz="1200" dirty="0" smtClean="0"/>
-              <a:t> the operator to Press a </a:t>
-            </a:r>
-            <a:r>
-              <a:rPr lang="it-IT" sz="1200" dirty="0" err="1" smtClean="0"/>
-              <a:t>button</a:t>
-            </a:r>
-            <a:r>
-              <a:rPr lang="it-IT" sz="1200" dirty="0" smtClean="0"/>
-              <a:t> on a </a:t>
-            </a:r>
-            <a:r>
-              <a:rPr lang="it-IT" sz="1200" dirty="0" err="1" smtClean="0"/>
-              <a:t>messagebox</a:t>
-            </a:r>
-            <a:r>
-              <a:rPr lang="it-IT" sz="1200" dirty="0" smtClean="0"/>
-              <a:t> an take a look to the status led, «Press ..»</a:t>
-            </a:r>
-          </a:p>
-          <a:p>
-            <a:pPr marL="228600" indent="-228600">
-              <a:buFont typeface="+mj-lt"/>
-              <a:buAutoNum type="arabicPeriod"/>
-            </a:pPr>
-            <a:r>
-              <a:rPr lang="it-IT" sz="1200" dirty="0" smtClean="0"/>
-              <a:t>Close R2, </a:t>
-            </a:r>
-            <a:r>
-              <a:rPr lang="it-IT" sz="1200" dirty="0" err="1" smtClean="0"/>
-              <a:t>wait</a:t>
-            </a:r>
-            <a:r>
-              <a:rPr lang="it-IT" sz="1200" smtClean="0"/>
-              <a:t> 0,5 </a:t>
-            </a:r>
-            <a:r>
-              <a:rPr lang="it-IT" sz="1200" dirty="0" smtClean="0"/>
-              <a:t>sec. , Open R2 (reset)</a:t>
-            </a:r>
-          </a:p>
-          <a:p>
-            <a:pPr marL="228600" indent="-228600">
-              <a:buFont typeface="+mj-lt"/>
-              <a:buAutoNum type="arabicPeriod"/>
-            </a:pPr>
-            <a:r>
-              <a:rPr lang="it-IT" sz="1200" dirty="0" smtClean="0"/>
-              <a:t>Are the led status </a:t>
-            </a:r>
-            <a:r>
-              <a:rPr lang="it-IT" sz="1200" dirty="0" err="1" smtClean="0"/>
-              <a:t>blinking</a:t>
-            </a:r>
-            <a:r>
-              <a:rPr lang="it-IT" sz="1200" dirty="0" smtClean="0"/>
-              <a:t> ? </a:t>
-            </a:r>
-            <a:r>
-              <a:rPr lang="it-IT" sz="1200" dirty="0" err="1" smtClean="0"/>
-              <a:t>if</a:t>
-            </a:r>
-            <a:r>
-              <a:rPr lang="it-IT" sz="1200" dirty="0" smtClean="0"/>
-              <a:t> ok go </a:t>
-            </a:r>
-            <a:r>
-              <a:rPr lang="it-IT" sz="1200" dirty="0" err="1" smtClean="0"/>
-              <a:t>ahead</a:t>
-            </a:r>
-            <a:r>
-              <a:rPr lang="it-IT" sz="1200" dirty="0" smtClean="0"/>
-              <a:t> </a:t>
-            </a:r>
-            <a:r>
-              <a:rPr lang="it-IT" sz="1200" dirty="0" err="1" smtClean="0"/>
-              <a:t>otherwise</a:t>
-            </a:r>
-            <a:r>
-              <a:rPr lang="it-IT" sz="1200" dirty="0" smtClean="0"/>
-              <a:t> stop the test</a:t>
-            </a:r>
-          </a:p>
-          <a:p>
-            <a:pPr marL="228600" indent="-228600">
-              <a:buFont typeface="+mj-lt"/>
-              <a:buAutoNum type="arabicPeriod"/>
-            </a:pPr>
-            <a:r>
-              <a:rPr lang="it-IT" sz="1200" dirty="0" err="1" smtClean="0"/>
-              <a:t>Retrieve</a:t>
-            </a:r>
-            <a:r>
-              <a:rPr lang="it-IT" sz="1200" dirty="0" smtClean="0"/>
-              <a:t> the MAC </a:t>
-            </a:r>
-            <a:r>
-              <a:rPr lang="it-IT" sz="1200" dirty="0" err="1" smtClean="0"/>
-              <a:t>address</a:t>
-            </a:r>
-            <a:r>
-              <a:rPr lang="it-IT" sz="1200" dirty="0" smtClean="0"/>
-              <a:t> from the </a:t>
-            </a:r>
-            <a:r>
-              <a:rPr lang="it-IT" sz="1200" dirty="0" err="1" smtClean="0"/>
-              <a:t>device</a:t>
-            </a:r>
-            <a:endParaRPr lang="it-IT" sz="1200" dirty="0" smtClean="0"/>
-          </a:p>
-          <a:p>
-            <a:pPr marL="228600" indent="-228600">
-              <a:buFont typeface="+mj-lt"/>
-              <a:buAutoNum type="arabicPeriod"/>
-            </a:pPr>
-            <a:r>
-              <a:rPr lang="it-IT" sz="1200" dirty="0" err="1" smtClean="0"/>
-              <a:t>Check</a:t>
-            </a:r>
-            <a:r>
-              <a:rPr lang="it-IT" sz="1200" dirty="0" smtClean="0"/>
-              <a:t> </a:t>
-            </a:r>
-            <a:r>
-              <a:rPr lang="it-IT" sz="1200" dirty="0" err="1" smtClean="0"/>
-              <a:t>if</a:t>
-            </a:r>
-            <a:r>
-              <a:rPr lang="it-IT" sz="1200" dirty="0" smtClean="0"/>
-              <a:t> the RS485 </a:t>
-            </a:r>
-            <a:r>
-              <a:rPr lang="it-IT" sz="1200" dirty="0" err="1" smtClean="0"/>
-              <a:t>works</a:t>
-            </a:r>
-            <a:r>
-              <a:rPr lang="it-IT" sz="1200" dirty="0" smtClean="0"/>
-              <a:t> </a:t>
-            </a:r>
-          </a:p>
-          <a:p>
-            <a:pPr marL="228600" indent="-228600">
-              <a:buFont typeface="+mj-lt"/>
-              <a:buAutoNum type="arabicPeriod"/>
-            </a:pPr>
-            <a:r>
-              <a:rPr lang="it-IT" sz="1200" dirty="0" smtClean="0"/>
-              <a:t>End of test </a:t>
-            </a:r>
-          </a:p>
-          <a:p>
-            <a:pPr marL="228600" indent="-228600">
-              <a:buFont typeface="+mj-lt"/>
-              <a:buAutoNum type="arabicPeriod"/>
-            </a:pPr>
-            <a:endParaRPr lang="it-IT" sz="1200" dirty="0" smtClean="0"/>
-          </a:p>
-          <a:p>
-            <a:pPr marL="228600" indent="-228600">
-              <a:buFont typeface="+mj-lt"/>
-              <a:buAutoNum type="arabicPeriod"/>
-            </a:pPr>
-            <a:endParaRPr lang="it-IT" sz="1200" dirty="0" smtClean="0"/>
-          </a:p>
-          <a:p>
-            <a:pPr marL="228600" indent="-228600">
-              <a:buFont typeface="+mj-lt"/>
-              <a:buAutoNum type="arabicPeriod"/>
-            </a:pPr>
-            <a:endParaRPr lang="it-IT" sz="1200" dirty="0" smtClean="0"/>
-          </a:p>
-          <a:p>
-            <a:pPr marL="228600" indent="-228600">
-              <a:buFont typeface="+mj-lt"/>
-              <a:buAutoNum type="arabicPeriod"/>
-            </a:pPr>
-            <a:endParaRPr lang="it-IT" sz="1200" dirty="0" smtClean="0"/>
-          </a:p>
-          <a:p>
-            <a:pPr marL="228600" indent="-228600">
-              <a:buFont typeface="+mj-lt"/>
-              <a:buAutoNum type="arabicPeriod"/>
-            </a:pPr>
-            <a:endParaRPr lang="it-IT" sz="1200" dirty="0"/>
-          </a:p>
-        </p:txBody>
-      </p:sp>
+              <a:rPr lang="it-IT" sz="1600" dirty="0" err="1" smtClean="0"/>
+              <a:t>answer</a:t>
+            </a:r>
+            <a:endParaRPr lang="it-IT" sz="1600" dirty="0" smtClean="0"/>
+          </a:p>
+          <a:p>
+            <a:endParaRPr lang="it-IT" sz="1600" dirty="0"/>
+          </a:p>
+          <a:p>
+            <a:endParaRPr lang="it-IT" sz="1600" dirty="0"/>
+          </a:p>
+          <a:p>
+            <a:endParaRPr lang="it-IT" sz="1600" dirty="0" smtClean="0"/>
+          </a:p>
+          <a:p>
+            <a:endParaRPr lang="it-IT" sz="1600" dirty="0"/>
+          </a:p>
+          <a:p>
+            <a:endParaRPr lang="it-IT" sz="1600" dirty="0" smtClean="0"/>
+          </a:p>
+          <a:p>
+            <a:endParaRPr lang="it-IT" sz="1600" dirty="0"/>
+          </a:p>
+        </p:txBody>
+      </p:sp>
+      <p:pic>
+        <p:nvPicPr>
+          <p:cNvPr id="2" name="Immagine 1"/>
+          <p:cNvPicPr>
+            <a:picLocks noChangeAspect="1"/>
+          </p:cNvPicPr>
+          <p:nvPr/>
+        </p:nvPicPr>
+        <p:blipFill>
+          <a:blip r:embed="rId3"/>
+          <a:stretch>
+            <a:fillRect/>
+          </a:stretch>
+        </p:blipFill>
+        <p:spPr>
+          <a:xfrm>
+            <a:off x="1970914" y="2128848"/>
+            <a:ext cx="251482" cy="236240"/>
+          </a:xfrm>
+          <a:prstGeom prst="rect">
+            <a:avLst/>
+          </a:prstGeom>
+        </p:spPr>
+      </p:pic>
+      <p:pic>
+        <p:nvPicPr>
+          <p:cNvPr id="3" name="Immagine 2"/>
+          <p:cNvPicPr>
+            <a:picLocks noChangeAspect="1"/>
+          </p:cNvPicPr>
+          <p:nvPr/>
+        </p:nvPicPr>
+        <p:blipFill>
+          <a:blip r:embed="rId4"/>
+          <a:stretch>
+            <a:fillRect/>
+          </a:stretch>
+        </p:blipFill>
+        <p:spPr>
+          <a:xfrm>
+            <a:off x="1970914" y="3108743"/>
+            <a:ext cx="213378" cy="198137"/>
+          </a:xfrm>
+          <a:prstGeom prst="rect">
+            <a:avLst/>
+          </a:prstGeom>
+        </p:spPr>
+      </p:pic>
     </p:spTree>
     <p:extLst>
       <p:ext uri="{BB962C8B-B14F-4D97-AF65-F5344CB8AC3E}">
-        <p14:creationId xmlns:p14="http://schemas.microsoft.com/office/powerpoint/2010/main" val="4078384206"/>
+        <p14:creationId xmlns:p14="http://schemas.microsoft.com/office/powerpoint/2010/main" val="3272224210"/>
       </p:ext>
     </p:extLst>
   </p:cSld>
@@ -9300,7 +9626,7 @@
         <p:spPr>
           <a:xfrm>
             <a:off x="175491" y="147782"/>
-            <a:ext cx="11914909" cy="369332"/>
+            <a:ext cx="11914909" cy="461665"/>
           </a:xfrm>
           <a:prstGeom prst="rect">
             <a:avLst/>
@@ -9314,22 +9640,18 @@
           <a:lstStyle/>
           <a:p>
             <a:r>
-              <a:rPr lang="it-IT" dirty="0" smtClean="0"/>
-              <a:t>H</a:t>
-            </a:r>
-            <a:r>
-              <a:rPr lang="it-IT" dirty="0" smtClean="0"/>
-              <a:t>W </a:t>
-            </a:r>
-            <a:r>
-              <a:rPr lang="it-IT" dirty="0" err="1" smtClean="0"/>
+              <a:rPr lang="it-IT" sz="2400" dirty="0" smtClean="0"/>
+              <a:t>SW </a:t>
+            </a:r>
+            <a:r>
+              <a:rPr lang="it-IT" sz="2400" dirty="0" err="1" smtClean="0"/>
               <a:t>Pre</a:t>
             </a:r>
             <a:r>
-              <a:rPr lang="it-IT" dirty="0" smtClean="0"/>
+              <a:rPr lang="it-IT" sz="2400" dirty="0" smtClean="0"/>
               <a:t>-requisite</a:t>
             </a:r>
-            <a:endParaRPr lang="it-IT" dirty="0"/>
+            <a:endParaRPr lang="it-IT" sz="2400" dirty="0"/>
           </a:p>
         </p:txBody>
       </p:sp>
@@ -9341,8 +9663,8 @@
         </p:nvSpPr>
         <p:spPr>
           <a:xfrm>
-            <a:off x="175491" y="600364"/>
-            <a:ext cx="11914909" cy="5016758"/>
+            <a:off x="175490" y="895927"/>
+            <a:ext cx="11914909" cy="4770537"/>
           </a:xfrm>
           <a:prstGeom prst="rect">
             <a:avLst/>
@@ -9357,19 +9679,27 @@
           <a:p>
             <a:r>
               <a:rPr lang="it-IT" sz="1600" dirty="0" smtClean="0"/>
-              <a:t>To </a:t>
-            </a:r>
-            <a:r>
-              <a:rPr lang="it-IT" sz="1600" dirty="0" err="1" smtClean="0"/>
-              <a:t>program</a:t>
-            </a:r>
-            <a:r>
-              <a:rPr lang="it-IT" sz="1600" dirty="0" smtClean="0"/>
-              <a:t> the Arduino </a:t>
-            </a:r>
-            <a:r>
-              <a:rPr lang="it-IT" sz="1600" dirty="0" err="1" smtClean="0"/>
-              <a:t>board</a:t>
+              <a:t>In </a:t>
+            </a:r>
+            <a:r>
+              <a:rPr lang="it-IT" sz="1600" dirty="0" err="1" smtClean="0"/>
+              <a:t>order</a:t>
+            </a:r>
+            <a:r>
+              <a:rPr lang="it-IT" sz="1600" dirty="0" smtClean="0"/>
+              <a:t> to </a:t>
+            </a:r>
+            <a:r>
+              <a:rPr lang="it-IT" sz="1600" dirty="0" err="1" smtClean="0"/>
+              <a:t>run</a:t>
+            </a:r>
+            <a:r>
+              <a:rPr lang="it-IT" sz="1600" dirty="0" smtClean="0"/>
+              <a:t> the SW the </a:t>
+            </a:r>
+            <a:r>
+              <a:rPr lang="it-IT" sz="1600" dirty="0" err="1" smtClean="0"/>
+              <a:t>following</a:t>
             </a:r>
             <a:r>
               <a:rPr lang="it-IT" sz="1600" dirty="0" smtClean="0"/>
@@ -9377,27 +9707,54 @@
             </a:r>
             <a:r>
               <a:rPr lang="it-IT" sz="1600" dirty="0" err="1" smtClean="0"/>
-              <a:t>install</a:t>
-            </a:r>
-            <a:r>
-              <a:rPr lang="it-IT" sz="1600" dirty="0" smtClean="0"/>
-              <a:t> the Arduino IDE </a:t>
-            </a:r>
-            <a:r>
-              <a:rPr lang="it-IT" sz="1600" dirty="0" err="1" smtClean="0"/>
-              <a:t>at</a:t>
-            </a:r>
-            <a:r>
-              <a:rPr lang="it-IT" sz="1600" dirty="0" smtClean="0"/>
-              <a:t> </a:t>
-            </a:r>
-            <a:r>
-              <a:rPr lang="it-IT" sz="1600" dirty="0" err="1" smtClean="0"/>
-              <a:t>this</a:t>
-            </a:r>
-            <a:r>
-              <a:rPr lang="it-IT" sz="1600" dirty="0" smtClean="0"/>
-              <a:t> link </a:t>
+              <a:t>prerequisite</a:t>
+            </a:r>
+            <a:r>
+              <a:rPr lang="it-IT" sz="1600" dirty="0" smtClean="0"/>
+              <a:t> are </a:t>
+            </a:r>
+            <a:r>
+              <a:rPr lang="it-IT" sz="1600" dirty="0" err="1" smtClean="0"/>
+              <a:t>needed</a:t>
+            </a:r>
+            <a:endParaRPr lang="it-IT" sz="1600" dirty="0" smtClean="0"/>
+          </a:p>
+          <a:p>
+            <a:endParaRPr lang="it-IT" sz="1600" dirty="0" smtClean="0"/>
+          </a:p>
+          <a:p>
+            <a:r>
+              <a:rPr lang="it-IT" sz="1600" dirty="0" err="1" smtClean="0"/>
+              <a:t>Modbus_PC_Simulator</a:t>
+            </a:r>
+            <a:endParaRPr lang="it-IT" sz="1600" dirty="0" smtClean="0"/>
+          </a:p>
+          <a:p>
+            <a:r>
+              <a:rPr lang="it-IT" sz="1600" dirty="0" smtClean="0"/>
+              <a:t>- </a:t>
+            </a:r>
+            <a:r>
+              <a:rPr lang="it-IT" sz="1600" dirty="0" err="1" smtClean="0"/>
+              <a:t>Python</a:t>
+            </a:r>
+            <a:r>
+              <a:rPr lang="it-IT" sz="1600" dirty="0" smtClean="0"/>
+              <a:t> V.2.7.x</a:t>
+            </a:r>
+          </a:p>
+          <a:p>
+            <a:r>
+              <a:rPr lang="it-IT" sz="1600" dirty="0" smtClean="0"/>
+              <a:t>- </a:t>
+            </a:r>
+            <a:r>
+              <a:rPr lang="it-IT" sz="1600" dirty="0" err="1" smtClean="0"/>
+              <a:t>pymodbus</a:t>
+            </a:r>
+            <a:r>
+              <a:rPr lang="it-IT" sz="1600" dirty="0" smtClean="0"/>
+              <a:t> (</a:t>
             </a:r>
             <a:r>
               <a:rPr lang="it-IT" sz="1600" dirty="0" smtClean="0">
@@ -9415,38 +9772,54 @@
               <a:rPr lang="it-IT" sz="1600" dirty="0" smtClean="0">
                 <a:hlinkClick r:id="rId2"/>
               </a:rPr>
-              <a:t>www.arduino.cc/en/main/software</a:t>
-            </a:r>
-            <a:r>
-              <a:rPr lang="it-IT" sz="1600" dirty="0" smtClean="0"/>
-              <a:t/>
-            </a:r>
-            <a:br>
-              <a:rPr lang="it-IT" sz="1600" dirty="0" smtClean="0"/>
-            </a:br>
-            <a:r>
-              <a:rPr lang="it-IT" sz="1600" dirty="0" smtClean="0"/>
-              <a:t>and </a:t>
-            </a:r>
-            <a:r>
-              <a:rPr lang="it-IT" sz="1600" dirty="0" err="1" smtClean="0"/>
-              <a:t>follow</a:t>
+              <a:t>pymodbus.readthedocs.io/en/latest/readme.html#installing</a:t>
+            </a:r>
+            <a:r>
+              <a:rPr lang="it-IT" sz="1600" dirty="0" smtClean="0"/>
+              <a:t>)</a:t>
+            </a:r>
+          </a:p>
+          <a:p>
+            <a:r>
+              <a:rPr lang="it-IT" sz="1600" dirty="0" smtClean="0"/>
+              <a:t>- </a:t>
+            </a:r>
+            <a:r>
+              <a:rPr lang="it-IT" sz="1600" dirty="0" err="1" smtClean="0"/>
+              <a:t>pyserial</a:t>
             </a:r>
             <a:r>
               <a:rPr lang="it-IT" sz="1600" dirty="0" smtClean="0"/>
               <a:t> </a:t>
             </a:r>
             <a:r>
-              <a:rPr lang="it-IT" sz="1600" dirty="0" err="1" smtClean="0"/>
-              <a:t>this</a:t>
-            </a:r>
-            <a:r>
-              <a:rPr lang="it-IT" sz="1600" dirty="0" smtClean="0"/>
-              <a:t> </a:t>
-            </a:r>
-            <a:r>
-              <a:rPr lang="it-IT" sz="1600" dirty="0" err="1" smtClean="0"/>
-              <a:t>steps</a:t>
+              <a:rPr lang="it-IT" sz="1600" dirty="0"/>
+              <a:t>(</a:t>
+            </a:r>
+            <a:r>
+              <a:rPr lang="it-IT" sz="1600" dirty="0">
+                <a:hlinkClick r:id="rId3"/>
+              </a:rPr>
+              <a:t>https://pypi.org/project/pyserial</a:t>
+            </a:r>
+            <a:r>
+              <a:rPr lang="it-IT" sz="1600" dirty="0" smtClean="0">
+                <a:hlinkClick r:id="rId3"/>
+              </a:rPr>
+              <a:t>/</a:t>
+            </a:r>
+            <a:r>
+              <a:rPr lang="it-IT" sz="1600" dirty="0" smtClean="0"/>
+              <a:t>)</a:t>
+            </a:r>
+          </a:p>
+          <a:p>
+            <a:endParaRPr lang="it-IT" sz="1600" dirty="0" smtClean="0"/>
+          </a:p>
+          <a:p>
+            <a:r>
+              <a:rPr lang="it-IT" sz="1600" dirty="0" err="1" smtClean="0"/>
+              <a:t>CAREL_GME_Test</a:t>
             </a:r>
             <a:endParaRPr lang="it-IT" sz="1600" dirty="0" smtClean="0"/>
           </a:p>
@@ -9461,7 +9834,84 @@
             </a:r>
             <a:r>
               <a:rPr lang="it-IT" sz="1600" dirty="0" smtClean="0"/>
-              <a:t> the Arduino IDE </a:t>
+              <a:t> the </a:t>
+            </a:r>
+            <a:r>
+              <a:rPr lang="it-IT" sz="1600" dirty="0" err="1" smtClean="0"/>
+              <a:t>program</a:t>
+            </a:r>
+            <a:r>
+              <a:rPr lang="it-IT" sz="1600" dirty="0" smtClean="0"/>
+              <a:t> CAREL_GME_Test.exe and download and </a:t>
+            </a:r>
+            <a:r>
+              <a:rPr lang="it-IT" sz="1600" dirty="0" err="1" smtClean="0"/>
+              <a:t>install</a:t>
+            </a:r>
+            <a:r>
+              <a:rPr lang="it-IT" sz="1600" dirty="0" smtClean="0"/>
+              <a:t> the </a:t>
+            </a:r>
+            <a:r>
+              <a:rPr lang="it-IT" sz="1600" dirty="0" err="1" smtClean="0"/>
+              <a:t>requested</a:t>
+            </a:r>
+            <a:r>
+              <a:rPr lang="it-IT" sz="1600" dirty="0" smtClean="0"/>
+              <a:t> .</a:t>
+            </a:r>
+            <a:r>
+              <a:rPr lang="it-IT" sz="1600" dirty="0"/>
+              <a:t>NET </a:t>
+            </a:r>
+            <a:r>
+              <a:rPr lang="it-IT" sz="1600" dirty="0" smtClean="0"/>
+              <a:t>Framework</a:t>
+            </a:r>
+          </a:p>
+          <a:p>
+            <a:endParaRPr lang="it-IT" sz="1600" dirty="0" smtClean="0"/>
+          </a:p>
+          <a:p>
+            <a:r>
+              <a:rPr lang="it-IT" sz="1600" dirty="0" err="1" smtClean="0"/>
+              <a:t>After</a:t>
+            </a:r>
+            <a:r>
+              <a:rPr lang="it-IT" sz="1600" dirty="0" smtClean="0"/>
+              <a:t> the </a:t>
+            </a:r>
+            <a:r>
+              <a:rPr lang="it-IT" sz="1600" dirty="0" err="1" smtClean="0"/>
+              <a:t>installation</a:t>
+            </a:r>
+            <a:r>
+              <a:rPr lang="it-IT" sz="1600" dirty="0" smtClean="0"/>
+              <a:t> </a:t>
+            </a:r>
+            <a:r>
+              <a:rPr lang="it-IT" sz="1600" dirty="0" err="1" smtClean="0"/>
+              <a:t>follow</a:t>
+            </a:r>
+            <a:r>
+              <a:rPr lang="it-IT" sz="1600" dirty="0" smtClean="0"/>
+              <a:t> </a:t>
+            </a:r>
+            <a:r>
+              <a:rPr lang="it-IT" sz="1600" dirty="0" err="1" smtClean="0"/>
+              <a:t>this</a:t>
+            </a:r>
+            <a:r>
+              <a:rPr lang="it-IT" sz="1600" dirty="0" smtClean="0"/>
+              <a:t> </a:t>
+            </a:r>
+            <a:r>
+              <a:rPr lang="it-IT" sz="1600" dirty="0" err="1" smtClean="0"/>
+              <a:t>steps</a:t>
+            </a:r>
+            <a:r>
+              <a:rPr lang="it-IT" sz="1600" dirty="0" smtClean="0"/>
+              <a:t>:</a:t>
             </a:r>
           </a:p>
           <a:p>
@@ -9470,13 +9920,50 @@
               <a:buChar char="-"/>
             </a:pPr>
             <a:r>
-              <a:rPr lang="it-IT" sz="1600" dirty="0"/>
-              <a:t>File &gt; Open the file &gt; </a:t>
-            </a:r>
-            <a:r>
-              <a:rPr lang="it-IT" sz="1600" dirty="0" smtClean="0"/>
-              <a:t>C780_HW_Test_Arduino_FW.ino</a:t>
-            </a:r>
+              <a:rPr lang="it-IT" sz="1600" dirty="0" err="1" smtClean="0"/>
+              <a:t>Edit</a:t>
+            </a:r>
+            <a:r>
+              <a:rPr lang="it-IT" sz="1600" dirty="0" smtClean="0"/>
+              <a:t> with </a:t>
+            </a:r>
+            <a:r>
+              <a:rPr lang="it-IT" sz="1600" dirty="0" err="1" smtClean="0"/>
+              <a:t>notepad</a:t>
+            </a:r>
+            <a:r>
+              <a:rPr lang="it-IT" sz="1600" dirty="0" smtClean="0"/>
+              <a:t> the file CAREL_GME_Test_CFG.ini and set the COM </a:t>
+            </a:r>
+            <a:r>
+              <a:rPr lang="it-IT" sz="1600" dirty="0" err="1" smtClean="0"/>
+              <a:t>ports</a:t>
+            </a:r>
+            <a:r>
+              <a:rPr lang="it-IT" sz="1600" dirty="0" smtClean="0"/>
+              <a:t> </a:t>
+            </a:r>
+            <a:r>
+              <a:rPr lang="it-IT" sz="1600" dirty="0" err="1" smtClean="0"/>
+              <a:t>according</a:t>
+            </a:r>
+            <a:r>
+              <a:rPr lang="it-IT" sz="1600" dirty="0" smtClean="0"/>
+              <a:t> with </a:t>
+            </a:r>
+            <a:r>
+              <a:rPr lang="it-IT" sz="1600" dirty="0" err="1" smtClean="0"/>
+              <a:t>your</a:t>
+            </a:r>
+            <a:r>
+              <a:rPr lang="it-IT" sz="1600" dirty="0" smtClean="0"/>
+              <a:t> HW </a:t>
+            </a:r>
+            <a:r>
+              <a:rPr lang="it-IT" sz="1600" dirty="0" err="1" smtClean="0"/>
+              <a:t>configuration</a:t>
+            </a:r>
+            <a:endParaRPr lang="it-IT" sz="1600" dirty="0" smtClean="0"/>
           </a:p>
           <a:p>
             <a:pPr marL="285750" indent="-285750">
@@ -9485,344 +9972,126 @@
             </a:pPr>
             <a:r>
               <a:rPr lang="it-IT" sz="1600" dirty="0" err="1" smtClean="0"/>
-              <a:t>Choose</a:t>
-            </a:r>
-            <a:r>
-              <a:rPr lang="it-IT" sz="1600" dirty="0" smtClean="0"/>
-              <a:t> on  Port &gt; the serial </a:t>
-            </a:r>
-            <a:r>
-              <a:rPr lang="it-IT" sz="1600" dirty="0" err="1" smtClean="0"/>
-              <a:t>port</a:t>
-            </a:r>
-            <a:r>
-              <a:rPr lang="it-IT" sz="1600" dirty="0" smtClean="0"/>
-              <a:t> of the Arduino Uno </a:t>
-            </a:r>
-            <a:r>
-              <a:rPr lang="it-IT" sz="1600" dirty="0" err="1" smtClean="0"/>
-              <a:t>board</a:t>
-            </a:r>
+              <a:t>Launch</a:t>
+            </a:r>
+            <a:r>
+              <a:rPr lang="it-IT" sz="1600" dirty="0" smtClean="0"/>
+              <a:t> the CAREL_GME_Test.exe go to the panel on the right «Manual» </a:t>
+            </a:r>
+            <a:r>
+              <a:rPr lang="it-IT" sz="1600" dirty="0" err="1" smtClean="0"/>
+              <a:t>you</a:t>
+            </a:r>
+            <a:r>
+              <a:rPr lang="it-IT" sz="1600" dirty="0" smtClean="0"/>
+              <a:t> </a:t>
+            </a:r>
+            <a:r>
+              <a:rPr lang="it-IT" sz="1600" dirty="0" err="1" smtClean="0"/>
+              <a:t>will</a:t>
+            </a:r>
+            <a:r>
+              <a:rPr lang="it-IT" sz="1600" dirty="0" smtClean="0"/>
+              <a:t> </a:t>
+            </a:r>
+            <a:r>
+              <a:rPr lang="it-IT" sz="1600" dirty="0" err="1" smtClean="0"/>
+              <a:t>find</a:t>
+            </a:r>
+            <a:r>
+              <a:rPr lang="it-IT" sz="1600" dirty="0" smtClean="0"/>
+              <a:t> a </a:t>
+            </a:r>
+            <a:r>
+              <a:rPr lang="it-IT" sz="1600" dirty="0" err="1" smtClean="0"/>
+              <a:t>series</a:t>
+            </a:r>
+            <a:r>
+              <a:rPr lang="it-IT" sz="1600" dirty="0" smtClean="0"/>
+              <a:t> of </a:t>
+            </a:r>
+            <a:r>
+              <a:rPr lang="it-IT" sz="1600" dirty="0" err="1" smtClean="0"/>
+              <a:t>button</a:t>
+            </a:r>
+            <a:r>
+              <a:rPr lang="it-IT" sz="1600" dirty="0" smtClean="0"/>
+              <a:t/>
+            </a:r>
+            <a:br>
+              <a:rPr lang="it-IT" sz="1600" dirty="0" smtClean="0"/>
+            </a:br>
+            <a:r>
+              <a:rPr lang="it-IT" sz="1600" dirty="0" err="1" smtClean="0"/>
+              <a:t>check</a:t>
+            </a:r>
+            <a:r>
+              <a:rPr lang="it-IT" sz="1600" dirty="0" smtClean="0"/>
+              <a:t> the HW </a:t>
+            </a:r>
+            <a:r>
+              <a:rPr lang="it-IT" sz="1600" dirty="0" err="1" smtClean="0"/>
+              <a:t>connections</a:t>
+            </a:r>
+            <a:r>
+              <a:rPr lang="it-IT" sz="1600" dirty="0" smtClean="0"/>
+              <a:t> </a:t>
+            </a:r>
+            <a:r>
+              <a:rPr lang="it-IT" sz="1600" dirty="0" smtClean="0"/>
+              <a:t>with the </a:t>
+            </a:r>
+            <a:r>
+              <a:rPr lang="it-IT" sz="1600" dirty="0" err="1" smtClean="0"/>
+              <a:t>aid</a:t>
+            </a:r>
+            <a:r>
+              <a:rPr lang="it-IT" sz="1600" dirty="0" smtClean="0"/>
+              <a:t> of </a:t>
+            </a:r>
+            <a:r>
+              <a:rPr lang="it-IT" sz="1600" dirty="0" err="1" smtClean="0"/>
+              <a:t>these</a:t>
+            </a:r>
+            <a:r>
+              <a:rPr lang="it-IT" sz="1600" dirty="0" smtClean="0"/>
+              <a:t> </a:t>
+            </a:r>
+            <a:r>
+              <a:rPr lang="it-IT" sz="1600" dirty="0" err="1" smtClean="0"/>
+              <a:t>buttons</a:t>
+            </a:r>
+            <a:r>
+              <a:rPr lang="it-IT" sz="1600" dirty="0" smtClean="0"/>
+              <a:t>.</a:t>
+            </a:r>
+            <a:br>
+              <a:rPr lang="it-IT" sz="1600" dirty="0" smtClean="0"/>
+            </a:br>
+            <a:r>
+              <a:rPr lang="it-IT" sz="1600" dirty="0" smtClean="0"/>
+              <a:t>  </a:t>
+            </a:r>
+            <a:endParaRPr lang="it-IT" sz="1600" dirty="0"/>
+          </a:p>
+          <a:p>
             <a:endParaRPr lang="it-IT" sz="1600" dirty="0" smtClean="0"/>
           </a:p>
           <a:p>
-            <a:pPr marL="285750" indent="-285750">
-              <a:buFontTx/>
-              <a:buChar char="-"/>
-            </a:pPr>
-            <a:r>
-              <a:rPr lang="it-IT" sz="1600" dirty="0" err="1" smtClean="0"/>
-              <a:t>Choose</a:t>
-            </a:r>
-            <a:r>
-              <a:rPr lang="it-IT" sz="1600" dirty="0" smtClean="0"/>
-              <a:t> from Board &gt; «Arduino/Genuino Uno» [</a:t>
-            </a:r>
-            <a:r>
-              <a:rPr lang="it-IT" sz="1600" dirty="0" err="1" smtClean="0"/>
-              <a:t>normally</a:t>
-            </a:r>
-            <a:r>
-              <a:rPr lang="it-IT" sz="1600" dirty="0" smtClean="0"/>
-              <a:t> the default]</a:t>
-            </a:r>
-          </a:p>
-          <a:p>
-            <a:pPr marL="285750" indent="-285750">
-              <a:buFontTx/>
-              <a:buChar char="-"/>
-            </a:pPr>
-            <a:r>
-              <a:rPr lang="it-IT" sz="1600" dirty="0" smtClean="0"/>
-              <a:t>Press the </a:t>
-            </a:r>
-            <a:r>
-              <a:rPr lang="it-IT" sz="1600" dirty="0" err="1" smtClean="0"/>
-              <a:t>button</a:t>
-            </a:r>
-            <a:r>
-              <a:rPr lang="it-IT" sz="1600" dirty="0" smtClean="0"/>
-              <a:t>		</a:t>
-            </a:r>
-          </a:p>
-          <a:p>
-            <a:pPr marL="285750" indent="-285750">
-              <a:buFontTx/>
-              <a:buChar char="-"/>
-            </a:pPr>
-            <a:r>
-              <a:rPr lang="it-IT" sz="1600" dirty="0" err="1" smtClean="0"/>
-              <a:t>Wait</a:t>
-            </a:r>
-            <a:r>
-              <a:rPr lang="it-IT" sz="1600" dirty="0" smtClean="0"/>
-              <a:t> the End of the </a:t>
-            </a:r>
-            <a:r>
-              <a:rPr lang="it-IT" sz="1600" dirty="0" err="1" smtClean="0"/>
-              <a:t>operation</a:t>
-            </a:r>
+            <a:endParaRPr lang="it-IT" sz="1600" dirty="0"/>
+          </a:p>
+          <a:p>
             <a:endParaRPr lang="it-IT" sz="1600" dirty="0" smtClean="0"/>
           </a:p>
           <a:p>
-            <a:endParaRPr lang="it-IT" sz="1600" dirty="0" smtClean="0"/>
-          </a:p>
-          <a:p>
-            <a:r>
-              <a:rPr lang="it-IT" sz="1600" dirty="0" smtClean="0"/>
-              <a:t>To </a:t>
-            </a:r>
-            <a:r>
-              <a:rPr lang="it-IT" sz="1600" dirty="0" err="1" smtClean="0"/>
-              <a:t>quick</a:t>
-            </a:r>
-            <a:r>
-              <a:rPr lang="it-IT" sz="1600" dirty="0" smtClean="0"/>
-              <a:t> </a:t>
-            </a:r>
-            <a:r>
-              <a:rPr lang="it-IT" sz="1600" dirty="0" err="1" smtClean="0"/>
-              <a:t>check</a:t>
-            </a:r>
-            <a:r>
-              <a:rPr lang="it-IT" sz="1600" dirty="0" smtClean="0"/>
-              <a:t> </a:t>
-            </a:r>
-            <a:r>
-              <a:rPr lang="it-IT" sz="1600" dirty="0" err="1" smtClean="0"/>
-              <a:t>if</a:t>
-            </a:r>
-            <a:r>
-              <a:rPr lang="it-IT" sz="1600" dirty="0" smtClean="0"/>
-              <a:t> the </a:t>
-            </a:r>
-            <a:r>
-              <a:rPr lang="it-IT" sz="1600" dirty="0" err="1" smtClean="0"/>
-              <a:t>board</a:t>
-            </a:r>
-            <a:r>
-              <a:rPr lang="it-IT" sz="1600" dirty="0" smtClean="0"/>
-              <a:t> </a:t>
-            </a:r>
-            <a:r>
-              <a:rPr lang="it-IT" sz="1600" dirty="0" err="1" smtClean="0"/>
-              <a:t>is</a:t>
-            </a:r>
-            <a:r>
-              <a:rPr lang="it-IT" sz="1600" dirty="0" smtClean="0"/>
-              <a:t> </a:t>
-            </a:r>
-            <a:r>
-              <a:rPr lang="it-IT" sz="1600" dirty="0" err="1" smtClean="0"/>
-              <a:t>programmed</a:t>
-            </a:r>
-            <a:r>
-              <a:rPr lang="it-IT" sz="1600" dirty="0" smtClean="0"/>
-              <a:t> right :</a:t>
-            </a:r>
-          </a:p>
-          <a:p>
-            <a:pPr marL="285750" indent="-285750">
-              <a:buFontTx/>
-              <a:buChar char="-"/>
-            </a:pPr>
-            <a:r>
-              <a:rPr lang="it-IT" sz="1600" dirty="0" smtClean="0"/>
-              <a:t>Press the </a:t>
-            </a:r>
-            <a:r>
-              <a:rPr lang="it-IT" sz="1600" dirty="0" err="1" smtClean="0"/>
-              <a:t>button</a:t>
-            </a:r>
-            <a:endParaRPr lang="it-IT" sz="1600" dirty="0" smtClean="0"/>
-          </a:p>
-          <a:p>
-            <a:pPr marL="285750" indent="-285750">
-              <a:buFontTx/>
-              <a:buChar char="-"/>
-            </a:pPr>
-            <a:r>
-              <a:rPr lang="it-IT" sz="1600" dirty="0" smtClean="0"/>
-              <a:t>A terminal </a:t>
-            </a:r>
-            <a:r>
-              <a:rPr lang="it-IT" sz="1600" dirty="0" err="1" smtClean="0"/>
-              <a:t>appear</a:t>
-            </a:r>
-            <a:r>
-              <a:rPr lang="it-IT" sz="1600" dirty="0" smtClean="0"/>
-              <a:t> </a:t>
-            </a:r>
-            <a:r>
-              <a:rPr lang="it-IT" sz="1600" dirty="0" err="1" smtClean="0"/>
-              <a:t>check</a:t>
-            </a:r>
-            <a:r>
-              <a:rPr lang="it-IT" sz="1600" dirty="0" smtClean="0"/>
-              <a:t> </a:t>
-            </a:r>
-            <a:r>
-              <a:rPr lang="it-IT" sz="1600" dirty="0" err="1" smtClean="0"/>
-              <a:t>at</a:t>
-            </a:r>
-            <a:r>
-              <a:rPr lang="it-IT" sz="1600" dirty="0" smtClean="0"/>
-              <a:t> the botton of the </a:t>
-            </a:r>
-            <a:r>
-              <a:rPr lang="it-IT" sz="1600" dirty="0" err="1" smtClean="0"/>
-              <a:t>window</a:t>
-            </a:r>
-            <a:r>
-              <a:rPr lang="it-IT" sz="1600" dirty="0" smtClean="0"/>
-              <a:t> </a:t>
-            </a:r>
-            <a:r>
-              <a:rPr lang="it-IT" sz="1600" dirty="0" err="1" smtClean="0"/>
-              <a:t>that</a:t>
-            </a:r>
-            <a:r>
-              <a:rPr lang="it-IT" sz="1600" dirty="0" smtClean="0"/>
-              <a:t> the </a:t>
-            </a:r>
-            <a:r>
-              <a:rPr lang="it-IT" sz="1600" dirty="0" err="1" smtClean="0"/>
-              <a:t>baudrate</a:t>
-            </a:r>
-            <a:r>
-              <a:rPr lang="it-IT" sz="1600" dirty="0" smtClean="0"/>
-              <a:t> </a:t>
-            </a:r>
-            <a:r>
-              <a:rPr lang="it-IT" sz="1600" dirty="0" err="1" smtClean="0"/>
-              <a:t>is</a:t>
-            </a:r>
-            <a:r>
-              <a:rPr lang="it-IT" sz="1600" dirty="0" smtClean="0"/>
-              <a:t> 115200</a:t>
-            </a:r>
-          </a:p>
-          <a:p>
-            <a:pPr marL="285750" indent="-285750">
-              <a:buFontTx/>
-              <a:buChar char="-"/>
-            </a:pPr>
-            <a:r>
-              <a:rPr lang="it-IT" sz="1600" dirty="0" smtClean="0"/>
-              <a:t>In the top box </a:t>
-            </a:r>
-            <a:r>
-              <a:rPr lang="it-IT" sz="1600" dirty="0" err="1" smtClean="0"/>
-              <a:t>type</a:t>
-            </a:r>
-            <a:r>
-              <a:rPr lang="it-IT" sz="1600" dirty="0" smtClean="0"/>
-              <a:t> «V» + </a:t>
-            </a:r>
-            <a:r>
-              <a:rPr lang="it-IT" sz="1600" dirty="0" err="1" smtClean="0"/>
-              <a:t>Enter</a:t>
-            </a:r>
-            <a:endParaRPr lang="it-IT" sz="1600" dirty="0" smtClean="0"/>
-          </a:p>
-          <a:p>
-            <a:pPr marL="285750" indent="-285750">
-              <a:buFontTx/>
-              <a:buChar char="-"/>
-            </a:pPr>
-            <a:r>
-              <a:rPr lang="it-IT" sz="1600" dirty="0" smtClean="0"/>
-              <a:t>The </a:t>
-            </a:r>
-            <a:r>
-              <a:rPr lang="it-IT" sz="1600" dirty="0" err="1" smtClean="0"/>
-              <a:t>board</a:t>
-            </a:r>
-            <a:r>
-              <a:rPr lang="it-IT" sz="1600" dirty="0" smtClean="0"/>
-              <a:t> </a:t>
-            </a:r>
-            <a:r>
-              <a:rPr lang="it-IT" sz="1600" dirty="0" err="1" smtClean="0"/>
-              <a:t>respond</a:t>
-            </a:r>
-            <a:r>
-              <a:rPr lang="it-IT" sz="1600" dirty="0" smtClean="0"/>
-              <a:t>  «V=0» </a:t>
-            </a:r>
-          </a:p>
-          <a:p>
             <a:endParaRPr lang="it-IT" sz="1600" dirty="0"/>
           </a:p>
-          <a:p>
-            <a:endParaRPr lang="it-IT" sz="1600" dirty="0"/>
-          </a:p>
-          <a:p>
-            <a:endParaRPr lang="it-IT" sz="1600" dirty="0" smtClean="0"/>
-          </a:p>
-          <a:p>
-            <a:endParaRPr lang="it-IT" sz="1600" dirty="0"/>
-          </a:p>
-          <a:p>
-            <a:endParaRPr lang="it-IT" sz="1600" dirty="0" smtClean="0"/>
-          </a:p>
-          <a:p>
-            <a:endParaRPr lang="it-IT" sz="1600" dirty="0"/>
-          </a:p>
-        </p:txBody>
-      </p:sp>
-      <p:pic>
-        <p:nvPicPr>
-          <p:cNvPr id="2" name="Immagine 1"/>
-          <p:cNvPicPr>
-            <a:picLocks noChangeAspect="1"/>
-          </p:cNvPicPr>
-          <p:nvPr/>
-        </p:nvPicPr>
-        <p:blipFill>
-          <a:blip r:embed="rId3"/>
-          <a:stretch>
-            <a:fillRect/>
-          </a:stretch>
-        </p:blipFill>
-        <p:spPr>
-          <a:xfrm>
-            <a:off x="1970914" y="2128848"/>
-            <a:ext cx="251482" cy="236240"/>
-          </a:xfrm>
-          <a:prstGeom prst="rect">
-            <a:avLst/>
-          </a:prstGeom>
-        </p:spPr>
-      </p:pic>
-      <p:pic>
-        <p:nvPicPr>
-          <p:cNvPr id="3" name="Immagine 2"/>
-          <p:cNvPicPr>
-            <a:picLocks noChangeAspect="1"/>
-          </p:cNvPicPr>
-          <p:nvPr/>
-        </p:nvPicPr>
-        <p:blipFill>
-          <a:blip r:embed="rId4"/>
-          <a:stretch>
-            <a:fillRect/>
-          </a:stretch>
-        </p:blipFill>
-        <p:spPr>
-          <a:xfrm>
-            <a:off x="1970914" y="3108743"/>
-            <a:ext cx="213378" cy="198137"/>
-          </a:xfrm>
-          <a:prstGeom prst="rect">
-            <a:avLst/>
-          </a:prstGeom>
-        </p:spPr>
-      </p:pic>
+        </p:txBody>
+      </p:sp>
     </p:spTree>
     <p:extLst>
       <p:ext uri="{BB962C8B-B14F-4D97-AF65-F5344CB8AC3E}">
-        <p14:creationId xmlns:p14="http://schemas.microsoft.com/office/powerpoint/2010/main" val="3272224210"/>
+        <p14:creationId xmlns:p14="http://schemas.microsoft.com/office/powerpoint/2010/main" val="355755430"/>
       </p:ext>
     </p:extLst>
   </p:cSld>

</xml_diff>